<commit_message>
second draft / remove fig6 for now
Signed-off-by: Atsuko Tominaga <Tominaga_Atsuko@phd.ceu.edu>
</commit_message>
<xml_diff>
--- a/paper/image/supplementary.pptx
+++ b/paper/image/supplementary.pptx
@@ -3600,7 +3600,7 @@
         <p:spPr>
           <a:xfrm>
             <a:off x="20029853" y="5342783"/>
-            <a:ext cx="11033934" cy="1015663"/>
+            <a:ext cx="9307153" cy="1015663"/>
           </a:xfrm>
           <a:prstGeom prst="rect">
             <a:avLst/>
@@ -3639,7 +3639,7 @@
         <p:spPr>
           <a:xfrm>
             <a:off x="20029853" y="7612223"/>
-            <a:ext cx="10515496" cy="1015663"/>
+            <a:ext cx="9398259" cy="1009701"/>
           </a:xfrm>
           <a:prstGeom prst="rect">
             <a:avLst/>
@@ -3697,15 +3697,7 @@
                 <a:ea typeface="Helvetica Neue Condensed" panose="02000503000000020004" pitchFamily="2" charset="0"/>
                 <a:cs typeface="Helvetica Neue Condensed" panose="02000503000000020004" pitchFamily="2" charset="0"/>
               </a:rPr>
-              <a:t>(I) Extract </a:t>
-            </a:r>
-            <a:r>
-              <a:rPr lang="en-US" sz="6000" b="1" dirty="0">
-                <a:latin typeface="Helvetica Neue Condensed" panose="02000503000000020004" pitchFamily="2" charset="0"/>
-                <a:ea typeface="Helvetica Neue Condensed" panose="02000503000000020004" pitchFamily="2" charset="0"/>
-                <a:cs typeface="Helvetica Neue Condensed" panose="02000503000000020004" pitchFamily="2" charset="0"/>
-              </a:rPr>
-              <a:t>performances features from dataset</a:t>
+              <a:t>(I) Extract performances features from dataset</a:t>
             </a:r>
           </a:p>
         </p:txBody>
@@ -3925,8 +3917,8 @@
         </p:nvSpPr>
         <p:spPr>
           <a:xfrm>
-            <a:off x="20029853" y="12996627"/>
-            <a:ext cx="11076931" cy="1015663"/>
+            <a:off x="20029853" y="12996628"/>
+            <a:ext cx="9398259" cy="1009700"/>
           </a:xfrm>
           <a:prstGeom prst="rect">
             <a:avLst/>
@@ -3964,8 +3956,8 @@
         </p:nvSpPr>
         <p:spPr>
           <a:xfrm>
-            <a:off x="20029853" y="19373925"/>
-            <a:ext cx="10476105" cy="1015663"/>
+            <a:off x="20029853" y="19373926"/>
+            <a:ext cx="9307153" cy="1015662"/>
           </a:xfrm>
           <a:prstGeom prst="rect">
             <a:avLst/>
@@ -4003,7 +3995,7 @@
         </p:nvSpPr>
         <p:spPr>
           <a:xfrm>
-            <a:off x="1550694" y="28698175"/>
+            <a:off x="1550694" y="27250375"/>
             <a:ext cx="13891713" cy="10248960"/>
           </a:xfrm>
           <a:prstGeom prst="rect">
@@ -4269,7 +4261,7 @@
         <p:spPr>
           <a:xfrm>
             <a:off x="20029853" y="14456893"/>
-            <a:ext cx="9845108" cy="2037289"/>
+            <a:ext cx="9307153" cy="2037289"/>
           </a:xfrm>
           <a:prstGeom prst="rect">
             <a:avLst/>
@@ -4528,7 +4520,7 @@
         </p:nvSpPr>
         <p:spPr>
           <a:xfrm>
-            <a:off x="1550694" y="25645591"/>
+            <a:off x="1550694" y="24197791"/>
             <a:ext cx="13830814" cy="1015663"/>
           </a:xfrm>
           <a:prstGeom prst="rect">
@@ -4567,7 +4559,7 @@
         </p:nvSpPr>
         <p:spPr>
           <a:xfrm>
-            <a:off x="15501775" y="28696086"/>
+            <a:off x="15501775" y="27248286"/>
             <a:ext cx="13891713" cy="12095619"/>
           </a:xfrm>
           <a:prstGeom prst="rect">
@@ -4711,7 +4703,7 @@
         </p:nvSpPr>
         <p:spPr>
           <a:xfrm>
-            <a:off x="15506192" y="25623819"/>
+            <a:off x="15506192" y="24176019"/>
             <a:ext cx="13830814" cy="1938992"/>
           </a:xfrm>
           <a:prstGeom prst="rect">

</xml_diff>

<commit_message>
update figure for supplementary materials
Signed-off-by: Atsuko Tominaga <Tominaga_Atsuko@phd.ceu.edu>
</commit_message>
<xml_diff>
--- a/paper/image/supplementary.pptx
+++ b/paper/image/supplementary.pptx
@@ -2,7 +2,7 @@
 <file path=ppt/presentation.xml><?xml version="1.0" encoding="utf-8"?>
 <p:presentation xmlns:a="http://schemas.openxmlformats.org/drawingml/2006/main" xmlns:r="http://schemas.openxmlformats.org/officeDocument/2006/relationships" xmlns:p="http://schemas.openxmlformats.org/presentationml/2006/main" saveSubsetFonts="1" autoCompressPictures="0">
   <p:sldMasterIdLst>
-    <p:sldMasterId id="2147483696" r:id="rId1"/>
+    <p:sldMasterId id="2147483720" r:id="rId1"/>
   </p:sldMasterIdLst>
   <p:notesMasterIdLst>
     <p:notesMasterId r:id="rId3"/>
@@ -10,7 +10,7 @@
   <p:sldIdLst>
     <p:sldId id="257" r:id="rId2"/>
   </p:sldIdLst>
-  <p:sldSz cx="30275213" cy="42803763"/>
+  <p:sldSz cx="9906000" cy="6858000" type="A4"/>
   <p:notesSz cx="6858000" cy="9144000"/>
   <p:defaultTextStyle>
     <a:defPPr>
@@ -110,12 +110,12 @@
   <p:extLst>
     <p:ext uri="{EFAFB233-063F-42B5-8137-9DF3F51BA10A}">
       <p15:sldGuideLst xmlns:p15="http://schemas.microsoft.com/office/powerpoint/2012/main">
-        <p15:guide id="1" orient="horz" pos="13482" userDrawn="1">
+        <p15:guide id="1" orient="horz" pos="2160" userDrawn="1">
           <p15:clr>
             <a:srgbClr val="A4A3A4"/>
           </p15:clr>
         </p15:guide>
-        <p15:guide id="2" pos="9558" userDrawn="1">
+        <p15:guide id="2" pos="3127" userDrawn="1">
           <p15:clr>
             <a:srgbClr val="A4A3A4"/>
           </p15:clr>
@@ -208,7 +208,7 @@
           <a:p>
             <a:fld id="{B82C364D-D81D-0845-9A9B-3DC1F0A57A0F}" type="datetimeFigureOut">
               <a:rPr lang="en-US" smtClean="0"/>
-              <a:t>1/17/23</a:t>
+              <a:t>1/30/23</a:t>
             </a:fld>
             <a:endParaRPr lang="en-US"/>
           </a:p>
@@ -226,8 +226,8 @@
         </p:nvSpPr>
         <p:spPr>
           <a:xfrm>
-            <a:off x="2338388" y="1143000"/>
-            <a:ext cx="2181225" cy="3086100"/>
+            <a:off x="1200150" y="1143000"/>
+            <a:ext cx="4457700" cy="3086100"/>
           </a:xfrm>
           <a:prstGeom prst="rect">
             <a:avLst/>
@@ -382,8 +382,8 @@
   </p:cSld>
   <p:clrMap bg1="lt1" tx1="dk1" bg2="lt2" tx2="dk2" accent1="accent1" accent2="accent2" accent3="accent3" accent4="accent4" accent5="accent5" accent6="accent6" hlink="hlink" folHlink="folHlink"/>
   <p:notesStyle>
-    <a:lvl1pPr marL="0" algn="l" defTabSz="3506633" rtl="0" eaLnBrk="1" latinLnBrk="0" hangingPunct="1">
-      <a:defRPr sz="4603" kern="1200">
+    <a:lvl1pPr marL="0" algn="l" defTabSz="804071" rtl="0" eaLnBrk="1" latinLnBrk="0" hangingPunct="1">
+      <a:defRPr sz="1055" kern="1200">
         <a:solidFill>
           <a:schemeClr val="tx1"/>
         </a:solidFill>
@@ -392,8 +392,8 @@
         <a:cs typeface="+mn-cs"/>
       </a:defRPr>
     </a:lvl1pPr>
-    <a:lvl2pPr marL="1753316" algn="l" defTabSz="3506633" rtl="0" eaLnBrk="1" latinLnBrk="0" hangingPunct="1">
-      <a:defRPr sz="4603" kern="1200">
+    <a:lvl2pPr marL="402035" algn="l" defTabSz="804071" rtl="0" eaLnBrk="1" latinLnBrk="0" hangingPunct="1">
+      <a:defRPr sz="1055" kern="1200">
         <a:solidFill>
           <a:schemeClr val="tx1"/>
         </a:solidFill>
@@ -402,8 +402,8 @@
         <a:cs typeface="+mn-cs"/>
       </a:defRPr>
     </a:lvl2pPr>
-    <a:lvl3pPr marL="3506633" algn="l" defTabSz="3506633" rtl="0" eaLnBrk="1" latinLnBrk="0" hangingPunct="1">
-      <a:defRPr sz="4603" kern="1200">
+    <a:lvl3pPr marL="804071" algn="l" defTabSz="804071" rtl="0" eaLnBrk="1" latinLnBrk="0" hangingPunct="1">
+      <a:defRPr sz="1055" kern="1200">
         <a:solidFill>
           <a:schemeClr val="tx1"/>
         </a:solidFill>
@@ -412,8 +412,8 @@
         <a:cs typeface="+mn-cs"/>
       </a:defRPr>
     </a:lvl3pPr>
-    <a:lvl4pPr marL="5259953" algn="l" defTabSz="3506633" rtl="0" eaLnBrk="1" latinLnBrk="0" hangingPunct="1">
-      <a:defRPr sz="4603" kern="1200">
+    <a:lvl4pPr marL="1206107" algn="l" defTabSz="804071" rtl="0" eaLnBrk="1" latinLnBrk="0" hangingPunct="1">
+      <a:defRPr sz="1055" kern="1200">
         <a:solidFill>
           <a:schemeClr val="tx1"/>
         </a:solidFill>
@@ -422,8 +422,8 @@
         <a:cs typeface="+mn-cs"/>
       </a:defRPr>
     </a:lvl4pPr>
-    <a:lvl5pPr marL="7013269" algn="l" defTabSz="3506633" rtl="0" eaLnBrk="1" latinLnBrk="0" hangingPunct="1">
-      <a:defRPr sz="4603" kern="1200">
+    <a:lvl5pPr marL="1608143" algn="l" defTabSz="804071" rtl="0" eaLnBrk="1" latinLnBrk="0" hangingPunct="1">
+      <a:defRPr sz="1055" kern="1200">
         <a:solidFill>
           <a:schemeClr val="tx1"/>
         </a:solidFill>
@@ -432,8 +432,8 @@
         <a:cs typeface="+mn-cs"/>
       </a:defRPr>
     </a:lvl5pPr>
-    <a:lvl6pPr marL="8766586" algn="l" defTabSz="3506633" rtl="0" eaLnBrk="1" latinLnBrk="0" hangingPunct="1">
-      <a:defRPr sz="4603" kern="1200">
+    <a:lvl6pPr marL="2010178" algn="l" defTabSz="804071" rtl="0" eaLnBrk="1" latinLnBrk="0" hangingPunct="1">
+      <a:defRPr sz="1055" kern="1200">
         <a:solidFill>
           <a:schemeClr val="tx1"/>
         </a:solidFill>
@@ -442,8 +442,8 @@
         <a:cs typeface="+mn-cs"/>
       </a:defRPr>
     </a:lvl6pPr>
-    <a:lvl7pPr marL="10519902" algn="l" defTabSz="3506633" rtl="0" eaLnBrk="1" latinLnBrk="0" hangingPunct="1">
-      <a:defRPr sz="4603" kern="1200">
+    <a:lvl7pPr marL="2412214" algn="l" defTabSz="804071" rtl="0" eaLnBrk="1" latinLnBrk="0" hangingPunct="1">
+      <a:defRPr sz="1055" kern="1200">
         <a:solidFill>
           <a:schemeClr val="tx1"/>
         </a:solidFill>
@@ -452,8 +452,8 @@
         <a:cs typeface="+mn-cs"/>
       </a:defRPr>
     </a:lvl7pPr>
-    <a:lvl8pPr marL="12273218" algn="l" defTabSz="3506633" rtl="0" eaLnBrk="1" latinLnBrk="0" hangingPunct="1">
-      <a:defRPr sz="4603" kern="1200">
+    <a:lvl8pPr marL="2814249" algn="l" defTabSz="804071" rtl="0" eaLnBrk="1" latinLnBrk="0" hangingPunct="1">
+      <a:defRPr sz="1055" kern="1200">
         <a:solidFill>
           <a:schemeClr val="tx1"/>
         </a:solidFill>
@@ -462,8 +462,8 @@
         <a:cs typeface="+mn-cs"/>
       </a:defRPr>
     </a:lvl8pPr>
-    <a:lvl9pPr marL="14026535" algn="l" defTabSz="3506633" rtl="0" eaLnBrk="1" latinLnBrk="0" hangingPunct="1">
-      <a:defRPr sz="4603" kern="1200">
+    <a:lvl9pPr marL="3216284" algn="l" defTabSz="804071" rtl="0" eaLnBrk="1" latinLnBrk="0" hangingPunct="1">
+      <a:defRPr sz="1055" kern="1200">
         <a:solidFill>
           <a:schemeClr val="tx1"/>
         </a:solidFill>
@@ -505,8 +505,8 @@
         </p:nvSpPr>
         <p:spPr>
           <a:xfrm>
-            <a:off x="2338388" y="1143000"/>
-            <a:ext cx="2181225" cy="3086100"/>
+            <a:off x="1200150" y="1143000"/>
+            <a:ext cx="4457700" cy="3086100"/>
           </a:xfrm>
         </p:spPr>
       </p:sp>
@@ -594,15 +594,15 @@
         </p:nvSpPr>
         <p:spPr>
           <a:xfrm>
-            <a:off x="2270641" y="7005156"/>
-            <a:ext cx="25733931" cy="14902051"/>
+            <a:off x="742950" y="1122363"/>
+            <a:ext cx="8420100" cy="2387600"/>
           </a:xfrm>
         </p:spPr>
         <p:txBody>
           <a:bodyPr anchor="b"/>
           <a:lstStyle>
             <a:lvl1pPr algn="ctr">
-              <a:defRPr sz="19865"/>
+              <a:defRPr sz="6000"/>
             </a:lvl1pPr>
           </a:lstStyle>
           <a:p>
@@ -626,8 +626,8 @@
         </p:nvSpPr>
         <p:spPr>
           <a:xfrm>
-            <a:off x="3784402" y="22481887"/>
-            <a:ext cx="22706410" cy="10334331"/>
+            <a:off x="1238250" y="3602038"/>
+            <a:ext cx="7429500" cy="1655762"/>
           </a:xfrm>
         </p:spPr>
         <p:txBody>
@@ -635,39 +635,39 @@
           <a:lstStyle>
             <a:lvl1pPr marL="0" indent="0" algn="ctr">
               <a:buNone/>
-              <a:defRPr sz="7946"/>
+              <a:defRPr sz="2400"/>
             </a:lvl1pPr>
-            <a:lvl2pPr marL="1513743" indent="0" algn="ctr">
-              <a:buNone/>
-              <a:defRPr sz="6622"/>
+            <a:lvl2pPr marL="457200" indent="0" algn="ctr">
+              <a:buNone/>
+              <a:defRPr sz="2000"/>
             </a:lvl2pPr>
-            <a:lvl3pPr marL="3027487" indent="0" algn="ctr">
-              <a:buNone/>
-              <a:defRPr sz="5960"/>
+            <a:lvl3pPr marL="914400" indent="0" algn="ctr">
+              <a:buNone/>
+              <a:defRPr sz="1800"/>
             </a:lvl3pPr>
-            <a:lvl4pPr marL="4541230" indent="0" algn="ctr">
-              <a:buNone/>
-              <a:defRPr sz="5297"/>
+            <a:lvl4pPr marL="1371600" indent="0" algn="ctr">
+              <a:buNone/>
+              <a:defRPr sz="1600"/>
             </a:lvl4pPr>
-            <a:lvl5pPr marL="6054974" indent="0" algn="ctr">
-              <a:buNone/>
-              <a:defRPr sz="5297"/>
+            <a:lvl5pPr marL="1828800" indent="0" algn="ctr">
+              <a:buNone/>
+              <a:defRPr sz="1600"/>
             </a:lvl5pPr>
-            <a:lvl6pPr marL="7568717" indent="0" algn="ctr">
-              <a:buNone/>
-              <a:defRPr sz="5297"/>
+            <a:lvl6pPr marL="2286000" indent="0" algn="ctr">
+              <a:buNone/>
+              <a:defRPr sz="1600"/>
             </a:lvl6pPr>
-            <a:lvl7pPr marL="9082461" indent="0" algn="ctr">
-              <a:buNone/>
-              <a:defRPr sz="5297"/>
+            <a:lvl7pPr marL="2743200" indent="0" algn="ctr">
+              <a:buNone/>
+              <a:defRPr sz="1600"/>
             </a:lvl7pPr>
-            <a:lvl8pPr marL="10596204" indent="0" algn="ctr">
-              <a:buNone/>
-              <a:defRPr sz="5297"/>
+            <a:lvl8pPr marL="3200400" indent="0" algn="ctr">
+              <a:buNone/>
+              <a:defRPr sz="1600"/>
             </a:lvl8pPr>
-            <a:lvl9pPr marL="12109948" indent="0" algn="ctr">
-              <a:buNone/>
-              <a:defRPr sz="5297"/>
+            <a:lvl9pPr marL="3657600" indent="0" algn="ctr">
+              <a:buNone/>
+              <a:defRPr sz="1600"/>
             </a:lvl9pPr>
           </a:lstStyle>
           <a:p>
@@ -696,7 +696,7 @@
           <a:p>
             <a:fld id="{0B3969E3-A65B-4F43-9099-EDE3BF01F7BC}" type="datetimeFigureOut">
               <a:rPr lang="en-US" smtClean="0"/>
-              <a:t>1/17/23</a:t>
+              <a:t>1/30/23</a:t>
             </a:fld>
             <a:endParaRPr lang="en-US"/>
           </a:p>
@@ -747,7 +747,7 @@
     </p:spTree>
     <p:extLst>
       <p:ext uri="{BB962C8B-B14F-4D97-AF65-F5344CB8AC3E}">
-        <p14:creationId xmlns:p14="http://schemas.microsoft.com/office/powerpoint/2010/main" val="267451130"/>
+        <p14:creationId xmlns:p14="http://schemas.microsoft.com/office/powerpoint/2010/main" val="4229084591"/>
       </p:ext>
     </p:extLst>
   </p:cSld>
@@ -866,7 +866,7 @@
           <a:p>
             <a:fld id="{0B3969E3-A65B-4F43-9099-EDE3BF01F7BC}" type="datetimeFigureOut">
               <a:rPr lang="en-US" smtClean="0"/>
-              <a:t>1/17/23</a:t>
+              <a:t>1/30/23</a:t>
             </a:fld>
             <a:endParaRPr lang="en-US"/>
           </a:p>
@@ -917,7 +917,7 @@
     </p:spTree>
     <p:extLst>
       <p:ext uri="{BB962C8B-B14F-4D97-AF65-F5344CB8AC3E}">
-        <p14:creationId xmlns:p14="http://schemas.microsoft.com/office/powerpoint/2010/main" val="3655464732"/>
+        <p14:creationId xmlns:p14="http://schemas.microsoft.com/office/powerpoint/2010/main" val="3011346675"/>
       </p:ext>
     </p:extLst>
   </p:cSld>
@@ -956,8 +956,8 @@
         </p:nvSpPr>
         <p:spPr>
           <a:xfrm>
-            <a:off x="21665701" y="2278904"/>
-            <a:ext cx="6528093" cy="36274211"/>
+            <a:off x="7088982" y="365125"/>
+            <a:ext cx="2135981" cy="5811838"/>
           </a:xfrm>
         </p:spPr>
         <p:txBody>
@@ -984,8 +984,8 @@
         </p:nvSpPr>
         <p:spPr>
           <a:xfrm>
-            <a:off x="2081423" y="2278904"/>
-            <a:ext cx="19205838" cy="36274211"/>
+            <a:off x="681038" y="365125"/>
+            <a:ext cx="6284119" cy="5811838"/>
           </a:xfrm>
         </p:spPr>
         <p:txBody>
@@ -1046,7 +1046,7 @@
           <a:p>
             <a:fld id="{0B3969E3-A65B-4F43-9099-EDE3BF01F7BC}" type="datetimeFigureOut">
               <a:rPr lang="en-US" smtClean="0"/>
-              <a:t>1/17/23</a:t>
+              <a:t>1/30/23</a:t>
             </a:fld>
             <a:endParaRPr lang="en-US"/>
           </a:p>
@@ -1097,7 +1097,7 @@
     </p:spTree>
     <p:extLst>
       <p:ext uri="{BB962C8B-B14F-4D97-AF65-F5344CB8AC3E}">
-        <p14:creationId xmlns:p14="http://schemas.microsoft.com/office/powerpoint/2010/main" val="2439303623"/>
+        <p14:creationId xmlns:p14="http://schemas.microsoft.com/office/powerpoint/2010/main" val="1556137436"/>
       </p:ext>
     </p:extLst>
   </p:cSld>
@@ -1216,7 +1216,7 @@
           <a:p>
             <a:fld id="{0B3969E3-A65B-4F43-9099-EDE3BF01F7BC}" type="datetimeFigureOut">
               <a:rPr lang="en-US" smtClean="0"/>
-              <a:t>1/17/23</a:t>
+              <a:t>1/30/23</a:t>
             </a:fld>
             <a:endParaRPr lang="en-US"/>
           </a:p>
@@ -1267,7 +1267,7 @@
     </p:spTree>
     <p:extLst>
       <p:ext uri="{BB962C8B-B14F-4D97-AF65-F5344CB8AC3E}">
-        <p14:creationId xmlns:p14="http://schemas.microsoft.com/office/powerpoint/2010/main" val="3744964988"/>
+        <p14:creationId xmlns:p14="http://schemas.microsoft.com/office/powerpoint/2010/main" val="1229340076"/>
       </p:ext>
     </p:extLst>
   </p:cSld>
@@ -1306,15 +1306,15 @@
         </p:nvSpPr>
         <p:spPr>
           <a:xfrm>
-            <a:off x="2065654" y="10671229"/>
-            <a:ext cx="26112371" cy="17805173"/>
+            <a:off x="675879" y="1709740"/>
+            <a:ext cx="8543925" cy="2852737"/>
           </a:xfrm>
         </p:spPr>
         <p:txBody>
           <a:bodyPr anchor="b"/>
           <a:lstStyle>
             <a:lvl1pPr>
-              <a:defRPr sz="19865"/>
+              <a:defRPr sz="6000"/>
             </a:lvl1pPr>
           </a:lstStyle>
           <a:p>
@@ -1338,8 +1338,8 @@
         </p:nvSpPr>
         <p:spPr>
           <a:xfrm>
-            <a:off x="2065654" y="28644846"/>
-            <a:ext cx="26112371" cy="9363320"/>
+            <a:off x="675879" y="4589465"/>
+            <a:ext cx="8543925" cy="1500187"/>
           </a:xfrm>
         </p:spPr>
         <p:txBody>
@@ -1347,15 +1347,15 @@
           <a:lstStyle>
             <a:lvl1pPr marL="0" indent="0">
               <a:buNone/>
-              <a:defRPr sz="7946">
+              <a:defRPr sz="2400">
                 <a:solidFill>
                   <a:schemeClr val="tx1"/>
                 </a:solidFill>
               </a:defRPr>
             </a:lvl1pPr>
-            <a:lvl2pPr marL="1513743" indent="0">
-              <a:buNone/>
-              <a:defRPr sz="6622">
+            <a:lvl2pPr marL="457200" indent="0">
+              <a:buNone/>
+              <a:defRPr sz="2000">
                 <a:solidFill>
                   <a:schemeClr val="tx1">
                     <a:tint val="75000"/>
@@ -1363,9 +1363,9 @@
                 </a:solidFill>
               </a:defRPr>
             </a:lvl2pPr>
-            <a:lvl3pPr marL="3027487" indent="0">
-              <a:buNone/>
-              <a:defRPr sz="5960">
+            <a:lvl3pPr marL="914400" indent="0">
+              <a:buNone/>
+              <a:defRPr sz="1800">
                 <a:solidFill>
                   <a:schemeClr val="tx1">
                     <a:tint val="75000"/>
@@ -1373,9 +1373,9 @@
                 </a:solidFill>
               </a:defRPr>
             </a:lvl3pPr>
-            <a:lvl4pPr marL="4541230" indent="0">
-              <a:buNone/>
-              <a:defRPr sz="5297">
+            <a:lvl4pPr marL="1371600" indent="0">
+              <a:buNone/>
+              <a:defRPr sz="1600">
                 <a:solidFill>
                   <a:schemeClr val="tx1">
                     <a:tint val="75000"/>
@@ -1383,9 +1383,9 @@
                 </a:solidFill>
               </a:defRPr>
             </a:lvl4pPr>
-            <a:lvl5pPr marL="6054974" indent="0">
-              <a:buNone/>
-              <a:defRPr sz="5297">
+            <a:lvl5pPr marL="1828800" indent="0">
+              <a:buNone/>
+              <a:defRPr sz="1600">
                 <a:solidFill>
                   <a:schemeClr val="tx1">
                     <a:tint val="75000"/>
@@ -1393,9 +1393,9 @@
                 </a:solidFill>
               </a:defRPr>
             </a:lvl5pPr>
-            <a:lvl6pPr marL="7568717" indent="0">
-              <a:buNone/>
-              <a:defRPr sz="5297">
+            <a:lvl6pPr marL="2286000" indent="0">
+              <a:buNone/>
+              <a:defRPr sz="1600">
                 <a:solidFill>
                   <a:schemeClr val="tx1">
                     <a:tint val="75000"/>
@@ -1403,9 +1403,9 @@
                 </a:solidFill>
               </a:defRPr>
             </a:lvl6pPr>
-            <a:lvl7pPr marL="9082461" indent="0">
-              <a:buNone/>
-              <a:defRPr sz="5297">
+            <a:lvl7pPr marL="2743200" indent="0">
+              <a:buNone/>
+              <a:defRPr sz="1600">
                 <a:solidFill>
                   <a:schemeClr val="tx1">
                     <a:tint val="75000"/>
@@ -1413,9 +1413,9 @@
                 </a:solidFill>
               </a:defRPr>
             </a:lvl7pPr>
-            <a:lvl8pPr marL="10596204" indent="0">
-              <a:buNone/>
-              <a:defRPr sz="5297">
+            <a:lvl8pPr marL="3200400" indent="0">
+              <a:buNone/>
+              <a:defRPr sz="1600">
                 <a:solidFill>
                   <a:schemeClr val="tx1">
                     <a:tint val="75000"/>
@@ -1423,9 +1423,9 @@
                 </a:solidFill>
               </a:defRPr>
             </a:lvl8pPr>
-            <a:lvl9pPr marL="12109948" indent="0">
-              <a:buNone/>
-              <a:defRPr sz="5297">
+            <a:lvl9pPr marL="3657600" indent="0">
+              <a:buNone/>
+              <a:defRPr sz="1600">
                 <a:solidFill>
                   <a:schemeClr val="tx1">
                     <a:tint val="75000"/>
@@ -1460,7 +1460,7 @@
           <a:p>
             <a:fld id="{0B3969E3-A65B-4F43-9099-EDE3BF01F7BC}" type="datetimeFigureOut">
               <a:rPr lang="en-US" smtClean="0"/>
-              <a:t>1/17/23</a:t>
+              <a:t>1/30/23</a:t>
             </a:fld>
             <a:endParaRPr lang="en-US"/>
           </a:p>
@@ -1511,7 +1511,7 @@
     </p:spTree>
     <p:extLst>
       <p:ext uri="{BB962C8B-B14F-4D97-AF65-F5344CB8AC3E}">
-        <p14:creationId xmlns:p14="http://schemas.microsoft.com/office/powerpoint/2010/main" val="2942385930"/>
+        <p14:creationId xmlns:p14="http://schemas.microsoft.com/office/powerpoint/2010/main" val="1941647525"/>
       </p:ext>
     </p:extLst>
   </p:cSld>
@@ -1573,8 +1573,8 @@
         </p:nvSpPr>
         <p:spPr>
           <a:xfrm>
-            <a:off x="2081421" y="11394520"/>
-            <a:ext cx="12866966" cy="27158594"/>
+            <a:off x="681038" y="1825625"/>
+            <a:ext cx="4210050" cy="4351338"/>
           </a:xfrm>
         </p:spPr>
         <p:txBody>
@@ -1630,8 +1630,8 @@
         </p:nvSpPr>
         <p:spPr>
           <a:xfrm>
-            <a:off x="15326826" y="11394520"/>
-            <a:ext cx="12866966" cy="27158594"/>
+            <a:off x="5014913" y="1825625"/>
+            <a:ext cx="4210050" cy="4351338"/>
           </a:xfrm>
         </p:spPr>
         <p:txBody>
@@ -1692,7 +1692,7 @@
           <a:p>
             <a:fld id="{0B3969E3-A65B-4F43-9099-EDE3BF01F7BC}" type="datetimeFigureOut">
               <a:rPr lang="en-US" smtClean="0"/>
-              <a:t>1/17/23</a:t>
+              <a:t>1/30/23</a:t>
             </a:fld>
             <a:endParaRPr lang="en-US"/>
           </a:p>
@@ -1743,7 +1743,7 @@
     </p:spTree>
     <p:extLst>
       <p:ext uri="{BB962C8B-B14F-4D97-AF65-F5344CB8AC3E}">
-        <p14:creationId xmlns:p14="http://schemas.microsoft.com/office/powerpoint/2010/main" val="2128035437"/>
+        <p14:creationId xmlns:p14="http://schemas.microsoft.com/office/powerpoint/2010/main" val="2708702751"/>
       </p:ext>
     </p:extLst>
   </p:cSld>
@@ -1782,8 +1782,8 @@
         </p:nvSpPr>
         <p:spPr>
           <a:xfrm>
-            <a:off x="2085364" y="2278913"/>
-            <a:ext cx="26112371" cy="8273416"/>
+            <a:off x="682328" y="365127"/>
+            <a:ext cx="8543925" cy="1325563"/>
           </a:xfrm>
         </p:spPr>
         <p:txBody>
@@ -1810,8 +1810,8 @@
         </p:nvSpPr>
         <p:spPr>
           <a:xfrm>
-            <a:off x="2085368" y="10492870"/>
-            <a:ext cx="12807832" cy="5142393"/>
+            <a:off x="682329" y="1681163"/>
+            <a:ext cx="4190702" cy="823912"/>
           </a:xfrm>
         </p:spPr>
         <p:txBody>
@@ -1819,39 +1819,39 @@
           <a:lstStyle>
             <a:lvl1pPr marL="0" indent="0">
               <a:buNone/>
-              <a:defRPr sz="7946" b="1"/>
+              <a:defRPr sz="2400" b="1"/>
             </a:lvl1pPr>
-            <a:lvl2pPr marL="1513743" indent="0">
-              <a:buNone/>
-              <a:defRPr sz="6622" b="1"/>
+            <a:lvl2pPr marL="457200" indent="0">
+              <a:buNone/>
+              <a:defRPr sz="2000" b="1"/>
             </a:lvl2pPr>
-            <a:lvl3pPr marL="3027487" indent="0">
-              <a:buNone/>
-              <a:defRPr sz="5960" b="1"/>
+            <a:lvl3pPr marL="914400" indent="0">
+              <a:buNone/>
+              <a:defRPr sz="1800" b="1"/>
             </a:lvl3pPr>
-            <a:lvl4pPr marL="4541230" indent="0">
-              <a:buNone/>
-              <a:defRPr sz="5297" b="1"/>
+            <a:lvl4pPr marL="1371600" indent="0">
+              <a:buNone/>
+              <a:defRPr sz="1600" b="1"/>
             </a:lvl4pPr>
-            <a:lvl5pPr marL="6054974" indent="0">
-              <a:buNone/>
-              <a:defRPr sz="5297" b="1"/>
+            <a:lvl5pPr marL="1828800" indent="0">
+              <a:buNone/>
+              <a:defRPr sz="1600" b="1"/>
             </a:lvl5pPr>
-            <a:lvl6pPr marL="7568717" indent="0">
-              <a:buNone/>
-              <a:defRPr sz="5297" b="1"/>
+            <a:lvl6pPr marL="2286000" indent="0">
+              <a:buNone/>
+              <a:defRPr sz="1600" b="1"/>
             </a:lvl6pPr>
-            <a:lvl7pPr marL="9082461" indent="0">
-              <a:buNone/>
-              <a:defRPr sz="5297" b="1"/>
+            <a:lvl7pPr marL="2743200" indent="0">
+              <a:buNone/>
+              <a:defRPr sz="1600" b="1"/>
             </a:lvl7pPr>
-            <a:lvl8pPr marL="10596204" indent="0">
-              <a:buNone/>
-              <a:defRPr sz="5297" b="1"/>
+            <a:lvl8pPr marL="3200400" indent="0">
+              <a:buNone/>
+              <a:defRPr sz="1600" b="1"/>
             </a:lvl8pPr>
-            <a:lvl9pPr marL="12109948" indent="0">
-              <a:buNone/>
-              <a:defRPr sz="5297" b="1"/>
+            <a:lvl9pPr marL="3657600" indent="0">
+              <a:buNone/>
+              <a:defRPr sz="1600" b="1"/>
             </a:lvl9pPr>
           </a:lstStyle>
           <a:p>
@@ -1875,8 +1875,8 @@
         </p:nvSpPr>
         <p:spPr>
           <a:xfrm>
-            <a:off x="2085368" y="15635264"/>
-            <a:ext cx="12807832" cy="22997117"/>
+            <a:off x="682329" y="2505075"/>
+            <a:ext cx="4190702" cy="3684588"/>
           </a:xfrm>
         </p:spPr>
         <p:txBody>
@@ -1932,8 +1932,8 @@
         </p:nvSpPr>
         <p:spPr>
           <a:xfrm>
-            <a:off x="15326828" y="10492870"/>
-            <a:ext cx="12870909" cy="5142393"/>
+            <a:off x="5014913" y="1681163"/>
+            <a:ext cx="4211340" cy="823912"/>
           </a:xfrm>
         </p:spPr>
         <p:txBody>
@@ -1941,39 +1941,39 @@
           <a:lstStyle>
             <a:lvl1pPr marL="0" indent="0">
               <a:buNone/>
-              <a:defRPr sz="7946" b="1"/>
+              <a:defRPr sz="2400" b="1"/>
             </a:lvl1pPr>
-            <a:lvl2pPr marL="1513743" indent="0">
-              <a:buNone/>
-              <a:defRPr sz="6622" b="1"/>
+            <a:lvl2pPr marL="457200" indent="0">
+              <a:buNone/>
+              <a:defRPr sz="2000" b="1"/>
             </a:lvl2pPr>
-            <a:lvl3pPr marL="3027487" indent="0">
-              <a:buNone/>
-              <a:defRPr sz="5960" b="1"/>
+            <a:lvl3pPr marL="914400" indent="0">
+              <a:buNone/>
+              <a:defRPr sz="1800" b="1"/>
             </a:lvl3pPr>
-            <a:lvl4pPr marL="4541230" indent="0">
-              <a:buNone/>
-              <a:defRPr sz="5297" b="1"/>
+            <a:lvl4pPr marL="1371600" indent="0">
+              <a:buNone/>
+              <a:defRPr sz="1600" b="1"/>
             </a:lvl4pPr>
-            <a:lvl5pPr marL="6054974" indent="0">
-              <a:buNone/>
-              <a:defRPr sz="5297" b="1"/>
+            <a:lvl5pPr marL="1828800" indent="0">
+              <a:buNone/>
+              <a:defRPr sz="1600" b="1"/>
             </a:lvl5pPr>
-            <a:lvl6pPr marL="7568717" indent="0">
-              <a:buNone/>
-              <a:defRPr sz="5297" b="1"/>
+            <a:lvl6pPr marL="2286000" indent="0">
+              <a:buNone/>
+              <a:defRPr sz="1600" b="1"/>
             </a:lvl6pPr>
-            <a:lvl7pPr marL="9082461" indent="0">
-              <a:buNone/>
-              <a:defRPr sz="5297" b="1"/>
+            <a:lvl7pPr marL="2743200" indent="0">
+              <a:buNone/>
+              <a:defRPr sz="1600" b="1"/>
             </a:lvl7pPr>
-            <a:lvl8pPr marL="10596204" indent="0">
-              <a:buNone/>
-              <a:defRPr sz="5297" b="1"/>
+            <a:lvl8pPr marL="3200400" indent="0">
+              <a:buNone/>
+              <a:defRPr sz="1600" b="1"/>
             </a:lvl8pPr>
-            <a:lvl9pPr marL="12109948" indent="0">
-              <a:buNone/>
-              <a:defRPr sz="5297" b="1"/>
+            <a:lvl9pPr marL="3657600" indent="0">
+              <a:buNone/>
+              <a:defRPr sz="1600" b="1"/>
             </a:lvl9pPr>
           </a:lstStyle>
           <a:p>
@@ -1997,8 +1997,8 @@
         </p:nvSpPr>
         <p:spPr>
           <a:xfrm>
-            <a:off x="15326828" y="15635264"/>
-            <a:ext cx="12870909" cy="22997117"/>
+            <a:off x="5014913" y="2505075"/>
+            <a:ext cx="4211340" cy="3684588"/>
           </a:xfrm>
         </p:spPr>
         <p:txBody>
@@ -2059,7 +2059,7 @@
           <a:p>
             <a:fld id="{0B3969E3-A65B-4F43-9099-EDE3BF01F7BC}" type="datetimeFigureOut">
               <a:rPr lang="en-US" smtClean="0"/>
-              <a:t>1/17/23</a:t>
+              <a:t>1/30/23</a:t>
             </a:fld>
             <a:endParaRPr lang="en-US"/>
           </a:p>
@@ -2110,7 +2110,7 @@
     </p:spTree>
     <p:extLst>
       <p:ext uri="{BB962C8B-B14F-4D97-AF65-F5344CB8AC3E}">
-        <p14:creationId xmlns:p14="http://schemas.microsoft.com/office/powerpoint/2010/main" val="736955779"/>
+        <p14:creationId xmlns:p14="http://schemas.microsoft.com/office/powerpoint/2010/main" val="1837602204"/>
       </p:ext>
     </p:extLst>
   </p:cSld>
@@ -2177,7 +2177,7 @@
           <a:p>
             <a:fld id="{0B3969E3-A65B-4F43-9099-EDE3BF01F7BC}" type="datetimeFigureOut">
               <a:rPr lang="en-US" smtClean="0"/>
-              <a:t>1/17/23</a:t>
+              <a:t>1/30/23</a:t>
             </a:fld>
             <a:endParaRPr lang="en-US"/>
           </a:p>
@@ -2228,7 +2228,7 @@
     </p:spTree>
     <p:extLst>
       <p:ext uri="{BB962C8B-B14F-4D97-AF65-F5344CB8AC3E}">
-        <p14:creationId xmlns:p14="http://schemas.microsoft.com/office/powerpoint/2010/main" val="2308757091"/>
+        <p14:creationId xmlns:p14="http://schemas.microsoft.com/office/powerpoint/2010/main" val="493929767"/>
       </p:ext>
     </p:extLst>
   </p:cSld>
@@ -2272,7 +2272,7 @@
           <a:p>
             <a:fld id="{0B3969E3-A65B-4F43-9099-EDE3BF01F7BC}" type="datetimeFigureOut">
               <a:rPr lang="en-US" smtClean="0"/>
-              <a:t>1/17/23</a:t>
+              <a:t>1/30/23</a:t>
             </a:fld>
             <a:endParaRPr lang="en-US"/>
           </a:p>
@@ -2323,7 +2323,7 @@
     </p:spTree>
     <p:extLst>
       <p:ext uri="{BB962C8B-B14F-4D97-AF65-F5344CB8AC3E}">
-        <p14:creationId xmlns:p14="http://schemas.microsoft.com/office/powerpoint/2010/main" val="2042958225"/>
+        <p14:creationId xmlns:p14="http://schemas.microsoft.com/office/powerpoint/2010/main" val="2422403296"/>
       </p:ext>
     </p:extLst>
   </p:cSld>
@@ -2362,15 +2362,15 @@
         </p:nvSpPr>
         <p:spPr>
           <a:xfrm>
-            <a:off x="2085364" y="2853584"/>
-            <a:ext cx="9764544" cy="9987545"/>
+            <a:off x="682328" y="457200"/>
+            <a:ext cx="3194943" cy="1600200"/>
           </a:xfrm>
         </p:spPr>
         <p:txBody>
           <a:bodyPr anchor="b"/>
           <a:lstStyle>
             <a:lvl1pPr>
-              <a:defRPr sz="10595"/>
+              <a:defRPr sz="3200"/>
             </a:lvl1pPr>
           </a:lstStyle>
           <a:p>
@@ -2394,39 +2394,39 @@
         </p:nvSpPr>
         <p:spPr>
           <a:xfrm>
-            <a:off x="12870909" y="6162959"/>
-            <a:ext cx="15326827" cy="30418415"/>
+            <a:off x="4211340" y="987427"/>
+            <a:ext cx="5014913" cy="4873625"/>
           </a:xfrm>
         </p:spPr>
         <p:txBody>
           <a:bodyPr/>
           <a:lstStyle>
             <a:lvl1pPr>
-              <a:defRPr sz="10595"/>
+              <a:defRPr sz="3200"/>
             </a:lvl1pPr>
             <a:lvl2pPr>
-              <a:defRPr sz="9271"/>
+              <a:defRPr sz="2800"/>
             </a:lvl2pPr>
             <a:lvl3pPr>
-              <a:defRPr sz="7946"/>
+              <a:defRPr sz="2400"/>
             </a:lvl3pPr>
             <a:lvl4pPr>
-              <a:defRPr sz="6622"/>
+              <a:defRPr sz="2000"/>
             </a:lvl4pPr>
             <a:lvl5pPr>
-              <a:defRPr sz="6622"/>
+              <a:defRPr sz="2000"/>
             </a:lvl5pPr>
             <a:lvl6pPr>
-              <a:defRPr sz="6622"/>
+              <a:defRPr sz="2000"/>
             </a:lvl6pPr>
             <a:lvl7pPr>
-              <a:defRPr sz="6622"/>
+              <a:defRPr sz="2000"/>
             </a:lvl7pPr>
             <a:lvl8pPr>
-              <a:defRPr sz="6622"/>
+              <a:defRPr sz="2000"/>
             </a:lvl8pPr>
             <a:lvl9pPr>
-              <a:defRPr sz="6622"/>
+              <a:defRPr sz="2000"/>
             </a:lvl9pPr>
           </a:lstStyle>
           <a:p>
@@ -2479,8 +2479,8 @@
         </p:nvSpPr>
         <p:spPr>
           <a:xfrm>
-            <a:off x="2085364" y="12841129"/>
-            <a:ext cx="9764544" cy="23789780"/>
+            <a:off x="682328" y="2057400"/>
+            <a:ext cx="3194943" cy="3811588"/>
           </a:xfrm>
         </p:spPr>
         <p:txBody>
@@ -2488,39 +2488,39 @@
           <a:lstStyle>
             <a:lvl1pPr marL="0" indent="0">
               <a:buNone/>
-              <a:defRPr sz="5297"/>
+              <a:defRPr sz="1600"/>
             </a:lvl1pPr>
-            <a:lvl2pPr marL="1513743" indent="0">
-              <a:buNone/>
-              <a:defRPr sz="4635"/>
+            <a:lvl2pPr marL="457200" indent="0">
+              <a:buNone/>
+              <a:defRPr sz="1400"/>
             </a:lvl2pPr>
-            <a:lvl3pPr marL="3027487" indent="0">
-              <a:buNone/>
-              <a:defRPr sz="3973"/>
+            <a:lvl3pPr marL="914400" indent="0">
+              <a:buNone/>
+              <a:defRPr sz="1200"/>
             </a:lvl3pPr>
-            <a:lvl4pPr marL="4541230" indent="0">
-              <a:buNone/>
-              <a:defRPr sz="3311"/>
+            <a:lvl4pPr marL="1371600" indent="0">
+              <a:buNone/>
+              <a:defRPr sz="1000"/>
             </a:lvl4pPr>
-            <a:lvl5pPr marL="6054974" indent="0">
-              <a:buNone/>
-              <a:defRPr sz="3311"/>
+            <a:lvl5pPr marL="1828800" indent="0">
+              <a:buNone/>
+              <a:defRPr sz="1000"/>
             </a:lvl5pPr>
-            <a:lvl6pPr marL="7568717" indent="0">
-              <a:buNone/>
-              <a:defRPr sz="3311"/>
+            <a:lvl6pPr marL="2286000" indent="0">
+              <a:buNone/>
+              <a:defRPr sz="1000"/>
             </a:lvl6pPr>
-            <a:lvl7pPr marL="9082461" indent="0">
-              <a:buNone/>
-              <a:defRPr sz="3311"/>
+            <a:lvl7pPr marL="2743200" indent="0">
+              <a:buNone/>
+              <a:defRPr sz="1000"/>
             </a:lvl7pPr>
-            <a:lvl8pPr marL="10596204" indent="0">
-              <a:buNone/>
-              <a:defRPr sz="3311"/>
+            <a:lvl8pPr marL="3200400" indent="0">
+              <a:buNone/>
+              <a:defRPr sz="1000"/>
             </a:lvl8pPr>
-            <a:lvl9pPr marL="12109948" indent="0">
-              <a:buNone/>
-              <a:defRPr sz="3311"/>
+            <a:lvl9pPr marL="3657600" indent="0">
+              <a:buNone/>
+              <a:defRPr sz="1000"/>
             </a:lvl9pPr>
           </a:lstStyle>
           <a:p>
@@ -2549,7 +2549,7 @@
           <a:p>
             <a:fld id="{0B3969E3-A65B-4F43-9099-EDE3BF01F7BC}" type="datetimeFigureOut">
               <a:rPr lang="en-US" smtClean="0"/>
-              <a:t>1/17/23</a:t>
+              <a:t>1/30/23</a:t>
             </a:fld>
             <a:endParaRPr lang="en-US"/>
           </a:p>
@@ -2600,7 +2600,7 @@
     </p:spTree>
     <p:extLst>
       <p:ext uri="{BB962C8B-B14F-4D97-AF65-F5344CB8AC3E}">
-        <p14:creationId xmlns:p14="http://schemas.microsoft.com/office/powerpoint/2010/main" val="3790723631"/>
+        <p14:creationId xmlns:p14="http://schemas.microsoft.com/office/powerpoint/2010/main" val="4041996207"/>
       </p:ext>
     </p:extLst>
   </p:cSld>
@@ -2639,15 +2639,15 @@
         </p:nvSpPr>
         <p:spPr>
           <a:xfrm>
-            <a:off x="2085364" y="2853584"/>
-            <a:ext cx="9764544" cy="9987545"/>
+            <a:off x="682328" y="457200"/>
+            <a:ext cx="3194943" cy="1600200"/>
           </a:xfrm>
         </p:spPr>
         <p:txBody>
           <a:bodyPr anchor="b"/>
           <a:lstStyle>
             <a:lvl1pPr>
-              <a:defRPr sz="10595"/>
+              <a:defRPr sz="3200"/>
             </a:lvl1pPr>
           </a:lstStyle>
           <a:p>
@@ -2671,8 +2671,8 @@
         </p:nvSpPr>
         <p:spPr>
           <a:xfrm>
-            <a:off x="12870909" y="6162959"/>
-            <a:ext cx="15326827" cy="30418415"/>
+            <a:off x="4211340" y="987427"/>
+            <a:ext cx="5014913" cy="4873625"/>
           </a:xfrm>
         </p:spPr>
         <p:txBody>
@@ -2680,39 +2680,39 @@
           <a:lstStyle>
             <a:lvl1pPr marL="0" indent="0">
               <a:buNone/>
-              <a:defRPr sz="10595"/>
+              <a:defRPr sz="3200"/>
             </a:lvl1pPr>
-            <a:lvl2pPr marL="1513743" indent="0">
-              <a:buNone/>
-              <a:defRPr sz="9271"/>
+            <a:lvl2pPr marL="457200" indent="0">
+              <a:buNone/>
+              <a:defRPr sz="2800"/>
             </a:lvl2pPr>
-            <a:lvl3pPr marL="3027487" indent="0">
-              <a:buNone/>
-              <a:defRPr sz="7946"/>
+            <a:lvl3pPr marL="914400" indent="0">
+              <a:buNone/>
+              <a:defRPr sz="2400"/>
             </a:lvl3pPr>
-            <a:lvl4pPr marL="4541230" indent="0">
-              <a:buNone/>
-              <a:defRPr sz="6622"/>
+            <a:lvl4pPr marL="1371600" indent="0">
+              <a:buNone/>
+              <a:defRPr sz="2000"/>
             </a:lvl4pPr>
-            <a:lvl5pPr marL="6054974" indent="0">
-              <a:buNone/>
-              <a:defRPr sz="6622"/>
+            <a:lvl5pPr marL="1828800" indent="0">
+              <a:buNone/>
+              <a:defRPr sz="2000"/>
             </a:lvl5pPr>
-            <a:lvl6pPr marL="7568717" indent="0">
-              <a:buNone/>
-              <a:defRPr sz="6622"/>
+            <a:lvl6pPr marL="2286000" indent="0">
+              <a:buNone/>
+              <a:defRPr sz="2000"/>
             </a:lvl6pPr>
-            <a:lvl7pPr marL="9082461" indent="0">
-              <a:buNone/>
-              <a:defRPr sz="6622"/>
+            <a:lvl7pPr marL="2743200" indent="0">
+              <a:buNone/>
+              <a:defRPr sz="2000"/>
             </a:lvl7pPr>
-            <a:lvl8pPr marL="10596204" indent="0">
-              <a:buNone/>
-              <a:defRPr sz="6622"/>
+            <a:lvl8pPr marL="3200400" indent="0">
+              <a:buNone/>
+              <a:defRPr sz="2000"/>
             </a:lvl8pPr>
-            <a:lvl9pPr marL="12109948" indent="0">
-              <a:buNone/>
-              <a:defRPr sz="6622"/>
+            <a:lvl9pPr marL="3657600" indent="0">
+              <a:buNone/>
+              <a:defRPr sz="2000"/>
             </a:lvl9pPr>
           </a:lstStyle>
           <a:p>
@@ -2736,8 +2736,8 @@
         </p:nvSpPr>
         <p:spPr>
           <a:xfrm>
-            <a:off x="2085364" y="12841129"/>
-            <a:ext cx="9764544" cy="23789780"/>
+            <a:off x="682328" y="2057400"/>
+            <a:ext cx="3194943" cy="3811588"/>
           </a:xfrm>
         </p:spPr>
         <p:txBody>
@@ -2745,39 +2745,39 @@
           <a:lstStyle>
             <a:lvl1pPr marL="0" indent="0">
               <a:buNone/>
-              <a:defRPr sz="5297"/>
+              <a:defRPr sz="1600"/>
             </a:lvl1pPr>
-            <a:lvl2pPr marL="1513743" indent="0">
-              <a:buNone/>
-              <a:defRPr sz="4635"/>
+            <a:lvl2pPr marL="457200" indent="0">
+              <a:buNone/>
+              <a:defRPr sz="1400"/>
             </a:lvl2pPr>
-            <a:lvl3pPr marL="3027487" indent="0">
-              <a:buNone/>
-              <a:defRPr sz="3973"/>
+            <a:lvl3pPr marL="914400" indent="0">
+              <a:buNone/>
+              <a:defRPr sz="1200"/>
             </a:lvl3pPr>
-            <a:lvl4pPr marL="4541230" indent="0">
-              <a:buNone/>
-              <a:defRPr sz="3311"/>
+            <a:lvl4pPr marL="1371600" indent="0">
+              <a:buNone/>
+              <a:defRPr sz="1000"/>
             </a:lvl4pPr>
-            <a:lvl5pPr marL="6054974" indent="0">
-              <a:buNone/>
-              <a:defRPr sz="3311"/>
+            <a:lvl5pPr marL="1828800" indent="0">
+              <a:buNone/>
+              <a:defRPr sz="1000"/>
             </a:lvl5pPr>
-            <a:lvl6pPr marL="7568717" indent="0">
-              <a:buNone/>
-              <a:defRPr sz="3311"/>
+            <a:lvl6pPr marL="2286000" indent="0">
+              <a:buNone/>
+              <a:defRPr sz="1000"/>
             </a:lvl6pPr>
-            <a:lvl7pPr marL="9082461" indent="0">
-              <a:buNone/>
-              <a:defRPr sz="3311"/>
+            <a:lvl7pPr marL="2743200" indent="0">
+              <a:buNone/>
+              <a:defRPr sz="1000"/>
             </a:lvl7pPr>
-            <a:lvl8pPr marL="10596204" indent="0">
-              <a:buNone/>
-              <a:defRPr sz="3311"/>
+            <a:lvl8pPr marL="3200400" indent="0">
+              <a:buNone/>
+              <a:defRPr sz="1000"/>
             </a:lvl8pPr>
-            <a:lvl9pPr marL="12109948" indent="0">
-              <a:buNone/>
-              <a:defRPr sz="3311"/>
+            <a:lvl9pPr marL="3657600" indent="0">
+              <a:buNone/>
+              <a:defRPr sz="1000"/>
             </a:lvl9pPr>
           </a:lstStyle>
           <a:p>
@@ -2806,7 +2806,7 @@
           <a:p>
             <a:fld id="{0B3969E3-A65B-4F43-9099-EDE3BF01F7BC}" type="datetimeFigureOut">
               <a:rPr lang="en-US" smtClean="0"/>
-              <a:t>1/17/23</a:t>
+              <a:t>1/30/23</a:t>
             </a:fld>
             <a:endParaRPr lang="en-US"/>
           </a:p>
@@ -2857,7 +2857,7 @@
     </p:spTree>
     <p:extLst>
       <p:ext uri="{BB962C8B-B14F-4D97-AF65-F5344CB8AC3E}">
-        <p14:creationId xmlns:p14="http://schemas.microsoft.com/office/powerpoint/2010/main" val="2752483739"/>
+        <p14:creationId xmlns:p14="http://schemas.microsoft.com/office/powerpoint/2010/main" val="2309649744"/>
       </p:ext>
     </p:extLst>
   </p:cSld>
@@ -2901,8 +2901,8 @@
         </p:nvSpPr>
         <p:spPr>
           <a:xfrm>
-            <a:off x="2081421" y="2278913"/>
-            <a:ext cx="26112371" cy="8273416"/>
+            <a:off x="681038" y="365127"/>
+            <a:ext cx="8543925" cy="1325563"/>
           </a:xfrm>
           <a:prstGeom prst="rect">
             <a:avLst/>
@@ -2934,8 +2934,8 @@
         </p:nvSpPr>
         <p:spPr>
           <a:xfrm>
-            <a:off x="2081421" y="11394520"/>
-            <a:ext cx="26112371" cy="27158594"/>
+            <a:off x="681038" y="1825625"/>
+            <a:ext cx="8543925" cy="4351338"/>
           </a:xfrm>
           <a:prstGeom prst="rect">
             <a:avLst/>
@@ -2996,8 +2996,8 @@
         </p:nvSpPr>
         <p:spPr>
           <a:xfrm>
-            <a:off x="2081421" y="39672756"/>
-            <a:ext cx="6811923" cy="2278904"/>
+            <a:off x="681038" y="6356352"/>
+            <a:ext cx="2228850" cy="365125"/>
           </a:xfrm>
           <a:prstGeom prst="rect">
             <a:avLst/>
@@ -3007,7 +3007,7 @@
           <a:bodyPr vert="horz" lIns="91440" tIns="45720" rIns="91440" bIns="45720" rtlCol="0" anchor="ctr"/>
           <a:lstStyle>
             <a:lvl1pPr algn="l">
-              <a:defRPr sz="3973">
+              <a:defRPr sz="1200">
                 <a:solidFill>
                   <a:schemeClr val="tx1">
                     <a:tint val="75000"/>
@@ -3019,7 +3019,7 @@
           <a:p>
             <a:fld id="{0B3969E3-A65B-4F43-9099-EDE3BF01F7BC}" type="datetimeFigureOut">
               <a:rPr lang="en-US" smtClean="0"/>
-              <a:t>1/17/23</a:t>
+              <a:t>1/30/23</a:t>
             </a:fld>
             <a:endParaRPr lang="en-US"/>
           </a:p>
@@ -3037,8 +3037,8 @@
         </p:nvSpPr>
         <p:spPr>
           <a:xfrm>
-            <a:off x="10028665" y="39672756"/>
-            <a:ext cx="10217884" cy="2278904"/>
+            <a:off x="3281363" y="6356352"/>
+            <a:ext cx="3343275" cy="365125"/>
           </a:xfrm>
           <a:prstGeom prst="rect">
             <a:avLst/>
@@ -3048,7 +3048,7 @@
           <a:bodyPr vert="horz" lIns="91440" tIns="45720" rIns="91440" bIns="45720" rtlCol="0" anchor="ctr"/>
           <a:lstStyle>
             <a:lvl1pPr algn="ctr">
-              <a:defRPr sz="3973">
+              <a:defRPr sz="1200">
                 <a:solidFill>
                   <a:schemeClr val="tx1">
                     <a:tint val="75000"/>
@@ -3074,8 +3074,8 @@
         </p:nvSpPr>
         <p:spPr>
           <a:xfrm>
-            <a:off x="21381869" y="39672756"/>
-            <a:ext cx="6811923" cy="2278904"/>
+            <a:off x="6996113" y="6356352"/>
+            <a:ext cx="2228850" cy="365125"/>
           </a:xfrm>
           <a:prstGeom prst="rect">
             <a:avLst/>
@@ -3085,7 +3085,7 @@
           <a:bodyPr vert="horz" lIns="91440" tIns="45720" rIns="91440" bIns="45720" rtlCol="0" anchor="ctr"/>
           <a:lstStyle>
             <a:lvl1pPr algn="r">
-              <a:defRPr sz="3973">
+              <a:defRPr sz="1200">
                 <a:solidFill>
                   <a:schemeClr val="tx1">
                     <a:tint val="75000"/>
@@ -3106,27 +3106,27 @@
     </p:spTree>
     <p:extLst>
       <p:ext uri="{BB962C8B-B14F-4D97-AF65-F5344CB8AC3E}">
-        <p14:creationId xmlns:p14="http://schemas.microsoft.com/office/powerpoint/2010/main" val="3307880045"/>
+        <p14:creationId xmlns:p14="http://schemas.microsoft.com/office/powerpoint/2010/main" val="2739558164"/>
       </p:ext>
     </p:extLst>
   </p:cSld>
   <p:clrMap bg1="lt1" tx1="dk1" bg2="lt2" tx2="dk2" accent1="accent1" accent2="accent2" accent3="accent3" accent4="accent4" accent5="accent5" accent6="accent6" hlink="hlink" folHlink="folHlink"/>
   <p:sldLayoutIdLst>
-    <p:sldLayoutId id="2147483697" r:id="rId1"/>
-    <p:sldLayoutId id="2147483698" r:id="rId2"/>
-    <p:sldLayoutId id="2147483699" r:id="rId3"/>
-    <p:sldLayoutId id="2147483700" r:id="rId4"/>
-    <p:sldLayoutId id="2147483701" r:id="rId5"/>
-    <p:sldLayoutId id="2147483702" r:id="rId6"/>
-    <p:sldLayoutId id="2147483703" r:id="rId7"/>
-    <p:sldLayoutId id="2147483704" r:id="rId8"/>
-    <p:sldLayoutId id="2147483705" r:id="rId9"/>
-    <p:sldLayoutId id="2147483706" r:id="rId10"/>
-    <p:sldLayoutId id="2147483707" r:id="rId11"/>
+    <p:sldLayoutId id="2147483721" r:id="rId1"/>
+    <p:sldLayoutId id="2147483722" r:id="rId2"/>
+    <p:sldLayoutId id="2147483723" r:id="rId3"/>
+    <p:sldLayoutId id="2147483724" r:id="rId4"/>
+    <p:sldLayoutId id="2147483725" r:id="rId5"/>
+    <p:sldLayoutId id="2147483726" r:id="rId6"/>
+    <p:sldLayoutId id="2147483727" r:id="rId7"/>
+    <p:sldLayoutId id="2147483728" r:id="rId8"/>
+    <p:sldLayoutId id="2147483729" r:id="rId9"/>
+    <p:sldLayoutId id="2147483730" r:id="rId10"/>
+    <p:sldLayoutId id="2147483731" r:id="rId11"/>
   </p:sldLayoutIdLst>
   <p:txStyles>
     <p:titleStyle>
-      <a:lvl1pPr algn="l" defTabSz="3027487" rtl="0" eaLnBrk="1" latinLnBrk="0" hangingPunct="1">
+      <a:lvl1pPr algn="l" defTabSz="914400" rtl="0" eaLnBrk="1" latinLnBrk="0" hangingPunct="1">
         <a:lnSpc>
           <a:spcPct val="90000"/>
         </a:lnSpc>
@@ -3134,7 +3134,7 @@
           <a:spcPct val="0"/>
         </a:spcBef>
         <a:buNone/>
-        <a:defRPr sz="14568" kern="1200">
+        <a:defRPr sz="4400" kern="1200">
           <a:solidFill>
             <a:schemeClr val="tx1"/>
           </a:solidFill>
@@ -3145,16 +3145,16 @@
       </a:lvl1pPr>
     </p:titleStyle>
     <p:bodyStyle>
-      <a:lvl1pPr marL="756872" indent="-756872" algn="l" defTabSz="3027487" rtl="0" eaLnBrk="1" latinLnBrk="0" hangingPunct="1">
+      <a:lvl1pPr marL="228600" indent="-228600" algn="l" defTabSz="914400" rtl="0" eaLnBrk="1" latinLnBrk="0" hangingPunct="1">
         <a:lnSpc>
           <a:spcPct val="90000"/>
         </a:lnSpc>
         <a:spcBef>
-          <a:spcPts val="3311"/>
+          <a:spcPts val="1000"/>
         </a:spcBef>
         <a:buFont typeface="Arial" panose="020B0604020202020204" pitchFamily="34" charset="0"/>
         <a:buChar char="•"/>
-        <a:defRPr sz="9271" kern="1200">
+        <a:defRPr sz="2800" kern="1200">
           <a:solidFill>
             <a:schemeClr val="tx1"/>
           </a:solidFill>
@@ -3163,16 +3163,16 @@
           <a:cs typeface="+mn-cs"/>
         </a:defRPr>
       </a:lvl1pPr>
-      <a:lvl2pPr marL="2270615" indent="-756872" algn="l" defTabSz="3027487" rtl="0" eaLnBrk="1" latinLnBrk="0" hangingPunct="1">
+      <a:lvl2pPr marL="685800" indent="-228600" algn="l" defTabSz="914400" rtl="0" eaLnBrk="1" latinLnBrk="0" hangingPunct="1">
         <a:lnSpc>
           <a:spcPct val="90000"/>
         </a:lnSpc>
         <a:spcBef>
-          <a:spcPts val="1655"/>
+          <a:spcPts val="500"/>
         </a:spcBef>
         <a:buFont typeface="Arial" panose="020B0604020202020204" pitchFamily="34" charset="0"/>
         <a:buChar char="•"/>
-        <a:defRPr sz="7946" kern="1200">
+        <a:defRPr sz="2400" kern="1200">
           <a:solidFill>
             <a:schemeClr val="tx1"/>
           </a:solidFill>
@@ -3181,16 +3181,16 @@
           <a:cs typeface="+mn-cs"/>
         </a:defRPr>
       </a:lvl2pPr>
-      <a:lvl3pPr marL="3784359" indent="-756872" algn="l" defTabSz="3027487" rtl="0" eaLnBrk="1" latinLnBrk="0" hangingPunct="1">
+      <a:lvl3pPr marL="1143000" indent="-228600" algn="l" defTabSz="914400" rtl="0" eaLnBrk="1" latinLnBrk="0" hangingPunct="1">
         <a:lnSpc>
           <a:spcPct val="90000"/>
         </a:lnSpc>
         <a:spcBef>
-          <a:spcPts val="1655"/>
+          <a:spcPts val="500"/>
         </a:spcBef>
         <a:buFont typeface="Arial" panose="020B0604020202020204" pitchFamily="34" charset="0"/>
         <a:buChar char="•"/>
-        <a:defRPr sz="6622" kern="1200">
+        <a:defRPr sz="2000" kern="1200">
           <a:solidFill>
             <a:schemeClr val="tx1"/>
           </a:solidFill>
@@ -3199,16 +3199,16 @@
           <a:cs typeface="+mn-cs"/>
         </a:defRPr>
       </a:lvl3pPr>
-      <a:lvl4pPr marL="5298102" indent="-756872" algn="l" defTabSz="3027487" rtl="0" eaLnBrk="1" latinLnBrk="0" hangingPunct="1">
+      <a:lvl4pPr marL="1600200" indent="-228600" algn="l" defTabSz="914400" rtl="0" eaLnBrk="1" latinLnBrk="0" hangingPunct="1">
         <a:lnSpc>
           <a:spcPct val="90000"/>
         </a:lnSpc>
         <a:spcBef>
-          <a:spcPts val="1655"/>
+          <a:spcPts val="500"/>
         </a:spcBef>
         <a:buFont typeface="Arial" panose="020B0604020202020204" pitchFamily="34" charset="0"/>
         <a:buChar char="•"/>
-        <a:defRPr sz="5960" kern="1200">
+        <a:defRPr sz="1800" kern="1200">
           <a:solidFill>
             <a:schemeClr val="tx1"/>
           </a:solidFill>
@@ -3217,16 +3217,16 @@
           <a:cs typeface="+mn-cs"/>
         </a:defRPr>
       </a:lvl4pPr>
-      <a:lvl5pPr marL="6811846" indent="-756872" algn="l" defTabSz="3027487" rtl="0" eaLnBrk="1" latinLnBrk="0" hangingPunct="1">
+      <a:lvl5pPr marL="2057400" indent="-228600" algn="l" defTabSz="914400" rtl="0" eaLnBrk="1" latinLnBrk="0" hangingPunct="1">
         <a:lnSpc>
           <a:spcPct val="90000"/>
         </a:lnSpc>
         <a:spcBef>
-          <a:spcPts val="1655"/>
+          <a:spcPts val="500"/>
         </a:spcBef>
         <a:buFont typeface="Arial" panose="020B0604020202020204" pitchFamily="34" charset="0"/>
         <a:buChar char="•"/>
-        <a:defRPr sz="5960" kern="1200">
+        <a:defRPr sz="1800" kern="1200">
           <a:solidFill>
             <a:schemeClr val="tx1"/>
           </a:solidFill>
@@ -3235,16 +3235,16 @@
           <a:cs typeface="+mn-cs"/>
         </a:defRPr>
       </a:lvl5pPr>
-      <a:lvl6pPr marL="8325589" indent="-756872" algn="l" defTabSz="3027487" rtl="0" eaLnBrk="1" latinLnBrk="0" hangingPunct="1">
+      <a:lvl6pPr marL="2514600" indent="-228600" algn="l" defTabSz="914400" rtl="0" eaLnBrk="1" latinLnBrk="0" hangingPunct="1">
         <a:lnSpc>
           <a:spcPct val="90000"/>
         </a:lnSpc>
         <a:spcBef>
-          <a:spcPts val="1655"/>
+          <a:spcPts val="500"/>
         </a:spcBef>
         <a:buFont typeface="Arial" panose="020B0604020202020204" pitchFamily="34" charset="0"/>
         <a:buChar char="•"/>
-        <a:defRPr sz="5960" kern="1200">
+        <a:defRPr sz="1800" kern="1200">
           <a:solidFill>
             <a:schemeClr val="tx1"/>
           </a:solidFill>
@@ -3253,16 +3253,16 @@
           <a:cs typeface="+mn-cs"/>
         </a:defRPr>
       </a:lvl6pPr>
-      <a:lvl7pPr marL="9839333" indent="-756872" algn="l" defTabSz="3027487" rtl="0" eaLnBrk="1" latinLnBrk="0" hangingPunct="1">
+      <a:lvl7pPr marL="2971800" indent="-228600" algn="l" defTabSz="914400" rtl="0" eaLnBrk="1" latinLnBrk="0" hangingPunct="1">
         <a:lnSpc>
           <a:spcPct val="90000"/>
         </a:lnSpc>
         <a:spcBef>
-          <a:spcPts val="1655"/>
+          <a:spcPts val="500"/>
         </a:spcBef>
         <a:buFont typeface="Arial" panose="020B0604020202020204" pitchFamily="34" charset="0"/>
         <a:buChar char="•"/>
-        <a:defRPr sz="5960" kern="1200">
+        <a:defRPr sz="1800" kern="1200">
           <a:solidFill>
             <a:schemeClr val="tx1"/>
           </a:solidFill>
@@ -3271,16 +3271,16 @@
           <a:cs typeface="+mn-cs"/>
         </a:defRPr>
       </a:lvl7pPr>
-      <a:lvl8pPr marL="11353076" indent="-756872" algn="l" defTabSz="3027487" rtl="0" eaLnBrk="1" latinLnBrk="0" hangingPunct="1">
+      <a:lvl8pPr marL="3429000" indent="-228600" algn="l" defTabSz="914400" rtl="0" eaLnBrk="1" latinLnBrk="0" hangingPunct="1">
         <a:lnSpc>
           <a:spcPct val="90000"/>
         </a:lnSpc>
         <a:spcBef>
-          <a:spcPts val="1655"/>
+          <a:spcPts val="500"/>
         </a:spcBef>
         <a:buFont typeface="Arial" panose="020B0604020202020204" pitchFamily="34" charset="0"/>
         <a:buChar char="•"/>
-        <a:defRPr sz="5960" kern="1200">
+        <a:defRPr sz="1800" kern="1200">
           <a:solidFill>
             <a:schemeClr val="tx1"/>
           </a:solidFill>
@@ -3289,16 +3289,16 @@
           <a:cs typeface="+mn-cs"/>
         </a:defRPr>
       </a:lvl8pPr>
-      <a:lvl9pPr marL="12866820" indent="-756872" algn="l" defTabSz="3027487" rtl="0" eaLnBrk="1" latinLnBrk="0" hangingPunct="1">
+      <a:lvl9pPr marL="3886200" indent="-228600" algn="l" defTabSz="914400" rtl="0" eaLnBrk="1" latinLnBrk="0" hangingPunct="1">
         <a:lnSpc>
           <a:spcPct val="90000"/>
         </a:lnSpc>
         <a:spcBef>
-          <a:spcPts val="1655"/>
+          <a:spcPts val="500"/>
         </a:spcBef>
         <a:buFont typeface="Arial" panose="020B0604020202020204" pitchFamily="34" charset="0"/>
         <a:buChar char="•"/>
-        <a:defRPr sz="5960" kern="1200">
+        <a:defRPr sz="1800" kern="1200">
           <a:solidFill>
             <a:schemeClr val="tx1"/>
           </a:solidFill>
@@ -3312,8 +3312,8 @@
       <a:defPPr>
         <a:defRPr lang="en-US"/>
       </a:defPPr>
-      <a:lvl1pPr marL="0" algn="l" defTabSz="3027487" rtl="0" eaLnBrk="1" latinLnBrk="0" hangingPunct="1">
-        <a:defRPr sz="5960" kern="1200">
+      <a:lvl1pPr marL="0" algn="l" defTabSz="914400" rtl="0" eaLnBrk="1" latinLnBrk="0" hangingPunct="1">
+        <a:defRPr sz="1800" kern="1200">
           <a:solidFill>
             <a:schemeClr val="tx1"/>
           </a:solidFill>
@@ -3322,8 +3322,8 @@
           <a:cs typeface="+mn-cs"/>
         </a:defRPr>
       </a:lvl1pPr>
-      <a:lvl2pPr marL="1513743" algn="l" defTabSz="3027487" rtl="0" eaLnBrk="1" latinLnBrk="0" hangingPunct="1">
-        <a:defRPr sz="5960" kern="1200">
+      <a:lvl2pPr marL="457200" algn="l" defTabSz="914400" rtl="0" eaLnBrk="1" latinLnBrk="0" hangingPunct="1">
+        <a:defRPr sz="1800" kern="1200">
           <a:solidFill>
             <a:schemeClr val="tx1"/>
           </a:solidFill>
@@ -3332,8 +3332,8 @@
           <a:cs typeface="+mn-cs"/>
         </a:defRPr>
       </a:lvl2pPr>
-      <a:lvl3pPr marL="3027487" algn="l" defTabSz="3027487" rtl="0" eaLnBrk="1" latinLnBrk="0" hangingPunct="1">
-        <a:defRPr sz="5960" kern="1200">
+      <a:lvl3pPr marL="914400" algn="l" defTabSz="914400" rtl="0" eaLnBrk="1" latinLnBrk="0" hangingPunct="1">
+        <a:defRPr sz="1800" kern="1200">
           <a:solidFill>
             <a:schemeClr val="tx1"/>
           </a:solidFill>
@@ -3342,8 +3342,8 @@
           <a:cs typeface="+mn-cs"/>
         </a:defRPr>
       </a:lvl3pPr>
-      <a:lvl4pPr marL="4541230" algn="l" defTabSz="3027487" rtl="0" eaLnBrk="1" latinLnBrk="0" hangingPunct="1">
-        <a:defRPr sz="5960" kern="1200">
+      <a:lvl4pPr marL="1371600" algn="l" defTabSz="914400" rtl="0" eaLnBrk="1" latinLnBrk="0" hangingPunct="1">
+        <a:defRPr sz="1800" kern="1200">
           <a:solidFill>
             <a:schemeClr val="tx1"/>
           </a:solidFill>
@@ -3352,8 +3352,8 @@
           <a:cs typeface="+mn-cs"/>
         </a:defRPr>
       </a:lvl4pPr>
-      <a:lvl5pPr marL="6054974" algn="l" defTabSz="3027487" rtl="0" eaLnBrk="1" latinLnBrk="0" hangingPunct="1">
-        <a:defRPr sz="5960" kern="1200">
+      <a:lvl5pPr marL="1828800" algn="l" defTabSz="914400" rtl="0" eaLnBrk="1" latinLnBrk="0" hangingPunct="1">
+        <a:defRPr sz="1800" kern="1200">
           <a:solidFill>
             <a:schemeClr val="tx1"/>
           </a:solidFill>
@@ -3362,8 +3362,8 @@
           <a:cs typeface="+mn-cs"/>
         </a:defRPr>
       </a:lvl5pPr>
-      <a:lvl6pPr marL="7568717" algn="l" defTabSz="3027487" rtl="0" eaLnBrk="1" latinLnBrk="0" hangingPunct="1">
-        <a:defRPr sz="5960" kern="1200">
+      <a:lvl6pPr marL="2286000" algn="l" defTabSz="914400" rtl="0" eaLnBrk="1" latinLnBrk="0" hangingPunct="1">
+        <a:defRPr sz="1800" kern="1200">
           <a:solidFill>
             <a:schemeClr val="tx1"/>
           </a:solidFill>
@@ -3372,8 +3372,8 @@
           <a:cs typeface="+mn-cs"/>
         </a:defRPr>
       </a:lvl6pPr>
-      <a:lvl7pPr marL="9082461" algn="l" defTabSz="3027487" rtl="0" eaLnBrk="1" latinLnBrk="0" hangingPunct="1">
-        <a:defRPr sz="5960" kern="1200">
+      <a:lvl7pPr marL="2743200" algn="l" defTabSz="914400" rtl="0" eaLnBrk="1" latinLnBrk="0" hangingPunct="1">
+        <a:defRPr sz="1800" kern="1200">
           <a:solidFill>
             <a:schemeClr val="tx1"/>
           </a:solidFill>
@@ -3382,8 +3382,8 @@
           <a:cs typeface="+mn-cs"/>
         </a:defRPr>
       </a:lvl7pPr>
-      <a:lvl8pPr marL="10596204" algn="l" defTabSz="3027487" rtl="0" eaLnBrk="1" latinLnBrk="0" hangingPunct="1">
-        <a:defRPr sz="5960" kern="1200">
+      <a:lvl8pPr marL="3200400" algn="l" defTabSz="914400" rtl="0" eaLnBrk="1" latinLnBrk="0" hangingPunct="1">
+        <a:defRPr sz="1800" kern="1200">
           <a:solidFill>
             <a:schemeClr val="tx1"/>
           </a:solidFill>
@@ -3392,8 +3392,8 @@
           <a:cs typeface="+mn-cs"/>
         </a:defRPr>
       </a:lvl8pPr>
-      <a:lvl9pPr marL="12109948" algn="l" defTabSz="3027487" rtl="0" eaLnBrk="1" latinLnBrk="0" hangingPunct="1">
-        <a:defRPr sz="5960" kern="1200">
+      <a:lvl9pPr marL="3657600" algn="l" defTabSz="914400" rtl="0" eaLnBrk="1" latinLnBrk="0" hangingPunct="1">
+        <a:defRPr sz="1800" kern="1200">
           <a:solidFill>
             <a:schemeClr val="tx1"/>
           </a:solidFill>
@@ -3446,8 +3446,8 @@
         </p:blipFill>
         <p:spPr>
           <a:xfrm>
-            <a:off x="1550705" y="4813017"/>
-            <a:ext cx="12534616" cy="4460942"/>
+            <a:off x="303594" y="1076362"/>
+            <a:ext cx="2002190" cy="712559"/>
           </a:xfrm>
           <a:prstGeom prst="rect">
             <a:avLst/>
@@ -3470,8 +3470,8 @@
         </p:nvCxnSpPr>
         <p:spPr>
           <a:xfrm>
-            <a:off x="15478126" y="5757878"/>
-            <a:ext cx="4078951" cy="0"/>
+            <a:off x="2537929" y="1420411"/>
+            <a:ext cx="639673" cy="0"/>
           </a:xfrm>
           <a:prstGeom prst="straightConnector1">
             <a:avLst/>
@@ -3516,8 +3516,8 @@
         </p:nvCxnSpPr>
         <p:spPr>
           <a:xfrm>
-            <a:off x="15503306" y="5782561"/>
-            <a:ext cx="4053771" cy="2268000"/>
+            <a:off x="2550843" y="1433247"/>
+            <a:ext cx="635724" cy="355674"/>
           </a:xfrm>
           <a:prstGeom prst="straightConnector1">
             <a:avLst/>
@@ -3548,123 +3548,6 @@
       </p:cxnSp>
       <p:sp>
         <p:nvSpPr>
-          <p:cNvPr id="17" name="TextBox 16">
-            <a:extLst>
-              <a:ext uri="{FF2B5EF4-FFF2-40B4-BE49-F238E27FC236}">
-                <a16:creationId xmlns:a16="http://schemas.microsoft.com/office/drawing/2014/main" id="{8D5A9852-30D4-8C01-6C85-51023C3AC74D}"/>
-              </a:ext>
-            </a:extLst>
-          </p:cNvPr>
-          <p:cNvSpPr txBox="1"/>
-          <p:nvPr/>
-        </p:nvSpPr>
-        <p:spPr>
-          <a:xfrm>
-            <a:off x="20029853" y="3023271"/>
-            <a:ext cx="5674209" cy="1015663"/>
-          </a:xfrm>
-          <a:prstGeom prst="rect">
-            <a:avLst/>
-          </a:prstGeom>
-          <a:noFill/>
-        </p:spPr>
-        <p:txBody>
-          <a:bodyPr wrap="square" rtlCol="0">
-            <a:spAutoFit/>
-          </a:bodyPr>
-          <a:lstStyle/>
-          <a:p>
-            <a:r>
-              <a:rPr lang="en-US" sz="6000" dirty="0">
-                <a:latin typeface="HelveticaNeueLT Std Cn" panose="020B0506030502030204" pitchFamily="34" charset="77"/>
-                <a:ea typeface="Helvetica Neue" panose="02000503000000020004" pitchFamily="2" charset="0"/>
-                <a:cs typeface="Helvetica Neue" panose="02000503000000020004" pitchFamily="2" charset="0"/>
-              </a:rPr>
-              <a:t>A. Tempo (IOIs)</a:t>
-            </a:r>
-          </a:p>
-        </p:txBody>
-      </p:sp>
-      <p:sp>
-        <p:nvSpPr>
-          <p:cNvPr id="18" name="TextBox 17">
-            <a:extLst>
-              <a:ext uri="{FF2B5EF4-FFF2-40B4-BE49-F238E27FC236}">
-                <a16:creationId xmlns:a16="http://schemas.microsoft.com/office/drawing/2014/main" id="{2D953C7F-4753-2790-C427-42821505D065}"/>
-              </a:ext>
-            </a:extLst>
-          </p:cNvPr>
-          <p:cNvSpPr txBox="1"/>
-          <p:nvPr/>
-        </p:nvSpPr>
-        <p:spPr>
-          <a:xfrm>
-            <a:off x="20029853" y="5342783"/>
-            <a:ext cx="9307153" cy="1015663"/>
-          </a:xfrm>
-          <a:prstGeom prst="rect">
-            <a:avLst/>
-          </a:prstGeom>
-          <a:noFill/>
-        </p:spPr>
-        <p:txBody>
-          <a:bodyPr wrap="square" rtlCol="0">
-            <a:spAutoFit/>
-          </a:bodyPr>
-          <a:lstStyle/>
-          <a:p>
-            <a:r>
-              <a:rPr lang="en-US" sz="6000" dirty="0">
-                <a:latin typeface="HelveticaNeueLT Std Cn" panose="020B0506030502030204" pitchFamily="34" charset="77"/>
-                <a:ea typeface="Helvetica Neue" panose="02000503000000020004" pitchFamily="2" charset="0"/>
-                <a:cs typeface="Helvetica Neue" panose="02000503000000020004" pitchFamily="2" charset="0"/>
-              </a:rPr>
-              <a:t>B. Articulation (sound duration)</a:t>
-            </a:r>
-          </a:p>
-        </p:txBody>
-      </p:sp>
-      <p:sp>
-        <p:nvSpPr>
-          <p:cNvPr id="19" name="TextBox 18">
-            <a:extLst>
-              <a:ext uri="{FF2B5EF4-FFF2-40B4-BE49-F238E27FC236}">
-                <a16:creationId xmlns:a16="http://schemas.microsoft.com/office/drawing/2014/main" id="{1CE18468-B01D-1BC2-CC26-1A9ADA993B3D}"/>
-              </a:ext>
-            </a:extLst>
-          </p:cNvPr>
-          <p:cNvSpPr txBox="1"/>
-          <p:nvPr/>
-        </p:nvSpPr>
-        <p:spPr>
-          <a:xfrm>
-            <a:off x="20029853" y="7612223"/>
-            <a:ext cx="9398259" cy="1009701"/>
-          </a:xfrm>
-          <a:prstGeom prst="rect">
-            <a:avLst/>
-          </a:prstGeom>
-          <a:noFill/>
-        </p:spPr>
-        <p:txBody>
-          <a:bodyPr wrap="square" rtlCol="0">
-            <a:spAutoFit/>
-          </a:bodyPr>
-          <a:lstStyle/>
-          <a:p>
-            <a:r>
-              <a:rPr lang="en-US" sz="6000" dirty="0">
-                <a:latin typeface="HelveticaNeueLT Std Cn" panose="020B0506030502030204" pitchFamily="34" charset="77"/>
-                <a:ea typeface="Helvetica Neue" panose="02000503000000020004" pitchFamily="2" charset="0"/>
-                <a:cs typeface="Helvetica Neue" panose="02000503000000020004" pitchFamily="2" charset="0"/>
-              </a:rPr>
-              <a:t>C. Dynamics (velocity profiles)</a:t>
-            </a:r>
-          </a:p>
-        </p:txBody>
-      </p:sp>
-      <p:sp>
-        <p:nvSpPr>
           <p:cNvPr id="20" name="TextBox 19">
             <a:extLst>
               <a:ext uri="{FF2B5EF4-FFF2-40B4-BE49-F238E27FC236}">
@@ -3677,8 +3560,8 @@
         </p:nvSpPr>
         <p:spPr>
           <a:xfrm>
-            <a:off x="1550695" y="2337086"/>
-            <a:ext cx="13830814" cy="1938992"/>
+            <a:off x="207825" y="214012"/>
+            <a:ext cx="2651915" cy="584775"/>
           </a:xfrm>
           <a:prstGeom prst="rect">
             <a:avLst/>
@@ -3692,12 +3575,22 @@
           <a:lstStyle/>
           <a:p>
             <a:r>
-              <a:rPr lang="en-US" sz="6000" b="1" dirty="0">
+              <a:rPr lang="en-US" sz="1600" b="1" dirty="0">
                 <a:latin typeface="Helvetica Neue Condensed" panose="02000503000000020004" pitchFamily="2" charset="0"/>
                 <a:ea typeface="Helvetica Neue Condensed" panose="02000503000000020004" pitchFamily="2" charset="0"/>
                 <a:cs typeface="Helvetica Neue Condensed" panose="02000503000000020004" pitchFamily="2" charset="0"/>
               </a:rPr>
-              <a:t>(I) Extract performances features from dataset</a:t>
+              <a:t>(I) Extract performances     </a:t>
+            </a:r>
+          </a:p>
+          <a:p>
+            <a:r>
+              <a:rPr lang="en-US" sz="1600" b="1" dirty="0">
+                <a:latin typeface="Helvetica Neue Condensed" panose="02000503000000020004" pitchFamily="2" charset="0"/>
+                <a:ea typeface="Helvetica Neue Condensed" panose="02000503000000020004" pitchFamily="2" charset="0"/>
+                <a:cs typeface="Helvetica Neue Condensed" panose="02000503000000020004" pitchFamily="2" charset="0"/>
+              </a:rPr>
+              <a:t>features from dataset</a:t>
             </a:r>
           </a:p>
         </p:txBody>
@@ -3716,8 +3609,8 @@
         </p:nvSpPr>
         <p:spPr>
           <a:xfrm>
-            <a:off x="1550705" y="9140949"/>
-            <a:ext cx="12534616" cy="1388970"/>
+            <a:off x="303594" y="1788921"/>
+            <a:ext cx="1997040" cy="643786"/>
           </a:xfrm>
           <a:prstGeom prst="rect">
             <a:avLst/>
@@ -3731,15 +3624,23 @@
           <a:lstStyle/>
           <a:p>
             <a:r>
-              <a:rPr lang="en-US" sz="4213" dirty="0">
+              <a:rPr lang="en-US" sz="1200" dirty="0">
                 <a:latin typeface="HelveticaNeueLT Std Cn" panose="020B0506030502030204" pitchFamily="34" charset="77"/>
               </a:rPr>
-              <a:t>Performances without expressive notations</a:t>
-            </a:r>
-          </a:p>
-          <a:p>
-            <a:r>
-              <a:rPr lang="en-US" sz="4213" b="1" dirty="0">
+              <a:t>Performances </a:t>
+            </a:r>
+          </a:p>
+          <a:p>
+            <a:r>
+              <a:rPr lang="en-US" sz="1200" dirty="0">
+                <a:latin typeface="HelveticaNeueLT Std Cn" panose="020B0506030502030204" pitchFamily="34" charset="77"/>
+              </a:rPr>
+              <a:t>without expressive notations</a:t>
+            </a:r>
+          </a:p>
+          <a:p>
+            <a:r>
+              <a:rPr lang="en-US" sz="1200" b="1" dirty="0">
                 <a:latin typeface="Helvetica Neue Condensed" panose="02000503000000020004" pitchFamily="2" charset="0"/>
                 <a:ea typeface="Helvetica Neue Condensed" panose="02000503000000020004" pitchFamily="2" charset="0"/>
                 <a:cs typeface="Helvetica Neue Condensed" panose="02000503000000020004" pitchFamily="2" charset="0"/>
@@ -3771,8 +3672,8 @@
         </p:blipFill>
         <p:spPr>
           <a:xfrm>
-            <a:off x="1550705" y="11178832"/>
-            <a:ext cx="12745128" cy="4543719"/>
+            <a:off x="301906" y="2403737"/>
+            <a:ext cx="1998728" cy="712559"/>
           </a:xfrm>
           <a:prstGeom prst="rect">
             <a:avLst/>
@@ -3801,8 +3702,8 @@
         </p:blipFill>
         <p:spPr>
           <a:xfrm>
-            <a:off x="1550695" y="17621445"/>
-            <a:ext cx="12767188" cy="4543717"/>
+            <a:off x="301906" y="3808125"/>
+            <a:ext cx="2002187" cy="712559"/>
           </a:xfrm>
           <a:prstGeom prst="rect">
             <a:avLst/>
@@ -3823,8 +3724,8 @@
         </p:nvSpPr>
         <p:spPr>
           <a:xfrm>
-            <a:off x="1550705" y="15722551"/>
-            <a:ext cx="12745128" cy="1388970"/>
+            <a:off x="301906" y="3139045"/>
+            <a:ext cx="1998728" cy="646331"/>
           </a:xfrm>
           <a:prstGeom prst="rect">
             <a:avLst/>
@@ -3838,15 +3739,23 @@
           <a:lstStyle/>
           <a:p>
             <a:r>
-              <a:rPr lang="en-US" sz="4213" dirty="0">
+              <a:rPr lang="en-US" sz="1200" dirty="0">
                 <a:latin typeface="HelveticaNeueLT Std Cn" panose="020B0506030502030204" pitchFamily="34" charset="77"/>
               </a:rPr>
-              <a:t>Performances with notated articulation</a:t>
-            </a:r>
-          </a:p>
-          <a:p>
-            <a:r>
-              <a:rPr lang="en-US" sz="4213" b="1" dirty="0">
+              <a:t>Performances </a:t>
+            </a:r>
+          </a:p>
+          <a:p>
+            <a:r>
+              <a:rPr lang="en-US" sz="1200" dirty="0">
+                <a:latin typeface="HelveticaNeueLT Std Cn" panose="020B0506030502030204" pitchFamily="34" charset="77"/>
+              </a:rPr>
+              <a:t>with notated articulation</a:t>
+            </a:r>
+          </a:p>
+          <a:p>
+            <a:r>
+              <a:rPr lang="en-US" sz="1200" b="1" dirty="0">
                 <a:latin typeface="Helvetica Neue Condensed" panose="02000503000000020004" pitchFamily="2" charset="0"/>
                 <a:ea typeface="Helvetica Neue Condensed" panose="02000503000000020004" pitchFamily="2" charset="0"/>
                 <a:cs typeface="Helvetica Neue Condensed" panose="02000503000000020004" pitchFamily="2" charset="0"/>
@@ -3870,8 +3779,8 @@
         </p:nvSpPr>
         <p:spPr>
           <a:xfrm>
-            <a:off x="1550695" y="22165758"/>
-            <a:ext cx="12767188" cy="1388970"/>
+            <a:off x="298447" y="4598135"/>
+            <a:ext cx="2002187" cy="646331"/>
           </a:xfrm>
           <a:prstGeom prst="rect">
             <a:avLst/>
@@ -3885,15 +3794,23 @@
           <a:lstStyle/>
           <a:p>
             <a:r>
-              <a:rPr lang="en-US" sz="4213" dirty="0">
+              <a:rPr lang="en-US" sz="1200" dirty="0">
                 <a:latin typeface="HelveticaNeueLT Std Cn" panose="020B0506030502030204" pitchFamily="34" charset="77"/>
               </a:rPr>
-              <a:t>Performances with notated dynamics</a:t>
-            </a:r>
-          </a:p>
-          <a:p>
-            <a:r>
-              <a:rPr lang="en-US" sz="4213" b="1" dirty="0">
+              <a:t>Performances </a:t>
+            </a:r>
+          </a:p>
+          <a:p>
+            <a:r>
+              <a:rPr lang="en-US" sz="1200" dirty="0">
+                <a:latin typeface="HelveticaNeueLT Std Cn" panose="020B0506030502030204" pitchFamily="34" charset="77"/>
+              </a:rPr>
+              <a:t>with notated dynamics</a:t>
+            </a:r>
+          </a:p>
+          <a:p>
+            <a:r>
+              <a:rPr lang="en-US" sz="1200" b="1" dirty="0">
                 <a:latin typeface="Helvetica Neue Condensed" panose="02000503000000020004" pitchFamily="2" charset="0"/>
                 <a:ea typeface="Helvetica Neue Condensed" panose="02000503000000020004" pitchFamily="2" charset="0"/>
                 <a:cs typeface="Helvetica Neue Condensed" panose="02000503000000020004" pitchFamily="2" charset="0"/>
@@ -3903,6 +3820,164 @@
           </a:p>
         </p:txBody>
       </p:sp>
+      <p:grpSp>
+        <p:nvGrpSpPr>
+          <p:cNvPr id="5" name="Group 4">
+            <a:extLst>
+              <a:ext uri="{FF2B5EF4-FFF2-40B4-BE49-F238E27FC236}">
+                <a16:creationId xmlns:a16="http://schemas.microsoft.com/office/drawing/2014/main" id="{AEDF962B-1CBB-AD2C-925F-33D185FF9224}"/>
+              </a:ext>
+            </a:extLst>
+          </p:cNvPr>
+          <p:cNvGrpSpPr/>
+          <p:nvPr/>
+        </p:nvGrpSpPr>
+        <p:grpSpPr>
+          <a:xfrm>
+            <a:off x="3409747" y="306539"/>
+            <a:ext cx="1473862" cy="1123739"/>
+            <a:chOff x="3409747" y="261714"/>
+            <a:chExt cx="1473862" cy="1123739"/>
+          </a:xfrm>
+        </p:grpSpPr>
+        <p:sp>
+          <p:nvSpPr>
+            <p:cNvPr id="17" name="TextBox 16">
+              <a:extLst>
+                <a:ext uri="{FF2B5EF4-FFF2-40B4-BE49-F238E27FC236}">
+                  <a16:creationId xmlns:a16="http://schemas.microsoft.com/office/drawing/2014/main" id="{8D5A9852-30D4-8C01-6C85-51023C3AC74D}"/>
+                </a:ext>
+              </a:extLst>
+            </p:cNvPr>
+            <p:cNvSpPr txBox="1"/>
+            <p:nvPr/>
+          </p:nvSpPr>
+          <p:spPr>
+            <a:xfrm>
+              <a:off x="3409747" y="261714"/>
+              <a:ext cx="1473862" cy="276999"/>
+            </a:xfrm>
+            <a:prstGeom prst="rect">
+              <a:avLst/>
+            </a:prstGeom>
+            <a:noFill/>
+          </p:spPr>
+          <p:txBody>
+            <a:bodyPr wrap="square" rtlCol="0">
+              <a:spAutoFit/>
+            </a:bodyPr>
+            <a:lstStyle/>
+            <a:p>
+              <a:r>
+                <a:rPr lang="en-US" sz="1200" dirty="0">
+                  <a:latin typeface="HelveticaNeueLT Std Cn" panose="020B0506030502030204" pitchFamily="34" charset="77"/>
+                  <a:ea typeface="Helvetica Neue" panose="02000503000000020004" pitchFamily="2" charset="0"/>
+                  <a:cs typeface="Helvetica Neue" panose="02000503000000020004" pitchFamily="2" charset="0"/>
+                </a:rPr>
+                <a:t>A. Tempo (IOIs)</a:t>
+              </a:r>
+            </a:p>
+          </p:txBody>
+        </p:sp>
+        <p:sp>
+          <p:nvSpPr>
+            <p:cNvPr id="18" name="TextBox 17">
+              <a:extLst>
+                <a:ext uri="{FF2B5EF4-FFF2-40B4-BE49-F238E27FC236}">
+                  <a16:creationId xmlns:a16="http://schemas.microsoft.com/office/drawing/2014/main" id="{2D953C7F-4753-2790-C427-42821505D065}"/>
+                </a:ext>
+              </a:extLst>
+            </p:cNvPr>
+            <p:cNvSpPr txBox="1"/>
+            <p:nvPr/>
+          </p:nvSpPr>
+          <p:spPr>
+            <a:xfrm>
+              <a:off x="3409749" y="530328"/>
+              <a:ext cx="1473860" cy="461665"/>
+            </a:xfrm>
+            <a:prstGeom prst="rect">
+              <a:avLst/>
+            </a:prstGeom>
+            <a:noFill/>
+          </p:spPr>
+          <p:txBody>
+            <a:bodyPr wrap="square" rtlCol="0">
+              <a:spAutoFit/>
+            </a:bodyPr>
+            <a:lstStyle/>
+            <a:p>
+              <a:r>
+                <a:rPr lang="en-US" sz="1200" dirty="0">
+                  <a:latin typeface="HelveticaNeueLT Std Cn" panose="020B0506030502030204" pitchFamily="34" charset="77"/>
+                  <a:ea typeface="Helvetica Neue" panose="02000503000000020004" pitchFamily="2" charset="0"/>
+                  <a:cs typeface="Helvetica Neue" panose="02000503000000020004" pitchFamily="2" charset="0"/>
+                </a:rPr>
+                <a:t>B. Articulation</a:t>
+              </a:r>
+            </a:p>
+            <a:p>
+              <a:r>
+                <a:rPr lang="en-US" sz="1200" dirty="0">
+                  <a:latin typeface="HelveticaNeueLT Std Cn" panose="020B0506030502030204" pitchFamily="34" charset="77"/>
+                  <a:ea typeface="Helvetica Neue" panose="02000503000000020004" pitchFamily="2" charset="0"/>
+                  <a:cs typeface="Helvetica Neue" panose="02000503000000020004" pitchFamily="2" charset="0"/>
+                </a:rPr>
+                <a:t>(sound duration)</a:t>
+              </a:r>
+            </a:p>
+          </p:txBody>
+        </p:sp>
+        <p:sp>
+          <p:nvSpPr>
+            <p:cNvPr id="19" name="TextBox 18">
+              <a:extLst>
+                <a:ext uri="{FF2B5EF4-FFF2-40B4-BE49-F238E27FC236}">
+                  <a16:creationId xmlns:a16="http://schemas.microsoft.com/office/drawing/2014/main" id="{1CE18468-B01D-1BC2-CC26-1A9ADA993B3D}"/>
+                </a:ext>
+              </a:extLst>
+            </p:cNvPr>
+            <p:cNvSpPr txBox="1"/>
+            <p:nvPr/>
+          </p:nvSpPr>
+          <p:spPr>
+            <a:xfrm>
+              <a:off x="3409747" y="923788"/>
+              <a:ext cx="1473862" cy="461665"/>
+            </a:xfrm>
+            <a:prstGeom prst="rect">
+              <a:avLst/>
+            </a:prstGeom>
+            <a:noFill/>
+          </p:spPr>
+          <p:txBody>
+            <a:bodyPr wrap="square" rtlCol="0">
+              <a:spAutoFit/>
+            </a:bodyPr>
+            <a:lstStyle/>
+            <a:p>
+              <a:r>
+                <a:rPr lang="en-US" sz="1200" dirty="0">
+                  <a:latin typeface="HelveticaNeueLT Std Cn" panose="020B0506030502030204" pitchFamily="34" charset="77"/>
+                  <a:ea typeface="Helvetica Neue" panose="02000503000000020004" pitchFamily="2" charset="0"/>
+                  <a:cs typeface="Helvetica Neue" panose="02000503000000020004" pitchFamily="2" charset="0"/>
+                </a:rPr>
+                <a:t>C. Dynamics</a:t>
+              </a:r>
+            </a:p>
+            <a:p>
+              <a:r>
+                <a:rPr lang="en-US" sz="1200" dirty="0">
+                  <a:latin typeface="HelveticaNeueLT Std Cn" panose="020B0506030502030204" pitchFamily="34" charset="77"/>
+                  <a:ea typeface="Helvetica Neue" panose="02000503000000020004" pitchFamily="2" charset="0"/>
+                  <a:cs typeface="Helvetica Neue" panose="02000503000000020004" pitchFamily="2" charset="0"/>
+                </a:rPr>
+                <a:t>(velocity profiles)</a:t>
+              </a:r>
+            </a:p>
+          </p:txBody>
+        </p:sp>
+      </p:grpSp>
       <p:sp>
         <p:nvSpPr>
           <p:cNvPr id="30" name="TextBox 29">
@@ -3917,8 +3992,8 @@
         </p:nvSpPr>
         <p:spPr>
           <a:xfrm>
-            <a:off x="20029853" y="12996628"/>
-            <a:ext cx="9398259" cy="1009700"/>
+            <a:off x="3408737" y="2581657"/>
+            <a:ext cx="1473860" cy="461665"/>
           </a:xfrm>
           <a:prstGeom prst="rect">
             <a:avLst/>
@@ -3932,12 +4007,22 @@
           <a:lstStyle/>
           <a:p>
             <a:r>
-              <a:rPr lang="en-US" sz="6000" dirty="0">
+              <a:rPr lang="en-US" sz="1200" dirty="0">
                 <a:latin typeface="HelveticaNeueLT Std Cn" panose="020B0506030502030204" pitchFamily="34" charset="77"/>
                 <a:ea typeface="Helvetica Neue" panose="02000503000000020004" pitchFamily="2" charset="0"/>
                 <a:cs typeface="Helvetica Neue" panose="02000503000000020004" pitchFamily="2" charset="0"/>
               </a:rPr>
-              <a:t>D. Articulation (sound duration)</a:t>
+              <a:t>D. Articulation</a:t>
+            </a:r>
+          </a:p>
+          <a:p>
+            <a:r>
+              <a:rPr lang="en-US" sz="1200" dirty="0">
+                <a:latin typeface="HelveticaNeueLT Std Cn" panose="020B0506030502030204" pitchFamily="34" charset="77"/>
+                <a:ea typeface="Helvetica Neue" panose="02000503000000020004" pitchFamily="2" charset="0"/>
+                <a:cs typeface="Helvetica Neue" panose="02000503000000020004" pitchFamily="2" charset="0"/>
+              </a:rPr>
+              <a:t>(sound duration)</a:t>
             </a:r>
           </a:p>
         </p:txBody>
@@ -3956,8 +4041,8 @@
         </p:nvSpPr>
         <p:spPr>
           <a:xfrm>
-            <a:off x="20029853" y="19373926"/>
-            <a:ext cx="9307153" cy="1015662"/>
+            <a:off x="3400236" y="4006824"/>
+            <a:ext cx="1473860" cy="461665"/>
           </a:xfrm>
           <a:prstGeom prst="rect">
             <a:avLst/>
@@ -3971,12 +4056,22 @@
           <a:lstStyle/>
           <a:p>
             <a:r>
-              <a:rPr lang="en-US" sz="6000" dirty="0">
+              <a:rPr lang="en-US" sz="1200" dirty="0">
                 <a:latin typeface="HelveticaNeueLT Std Cn" panose="020B0506030502030204" pitchFamily="34" charset="77"/>
                 <a:ea typeface="Helvetica Neue" panose="02000503000000020004" pitchFamily="2" charset="0"/>
                 <a:cs typeface="Helvetica Neue" panose="02000503000000020004" pitchFamily="2" charset="0"/>
               </a:rPr>
-              <a:t>E. Dynamics (velocity profiles)</a:t>
+              <a:t>E. Dynamics</a:t>
+            </a:r>
+          </a:p>
+          <a:p>
+            <a:r>
+              <a:rPr lang="en-US" sz="1200" dirty="0">
+                <a:latin typeface="HelveticaNeueLT Std Cn" panose="020B0506030502030204" pitchFamily="34" charset="77"/>
+                <a:ea typeface="Helvetica Neue" panose="02000503000000020004" pitchFamily="2" charset="0"/>
+                <a:cs typeface="Helvetica Neue" panose="02000503000000020004" pitchFamily="2" charset="0"/>
+              </a:rPr>
+              <a:t>(velocity profiles)</a:t>
             </a:r>
           </a:p>
         </p:txBody>
@@ -3995,8 +4090,8 @@
         </p:nvSpPr>
         <p:spPr>
           <a:xfrm>
-            <a:off x="1550694" y="27250375"/>
-            <a:ext cx="13891713" cy="10248960"/>
+            <a:off x="5244353" y="1036818"/>
+            <a:ext cx="2178539" cy="2123658"/>
           </a:xfrm>
           <a:prstGeom prst="rect">
             <a:avLst/>
@@ -4013,7 +4108,7 @@
           <a:lstStyle/>
           <a:p>
             <a:r>
-              <a:rPr lang="en-US" sz="6000" dirty="0">
+              <a:rPr lang="en-US" sz="1200" dirty="0">
                 <a:latin typeface="HelveticaNeueLT Std Cn" panose="020B0506030502030204" pitchFamily="34" charset="77"/>
                 <a:ea typeface="Helvetica Neue" panose="02000503000000020004" pitchFamily="2" charset="0"/>
                 <a:cs typeface="Helvetica Neue" panose="02000503000000020004" pitchFamily="2" charset="0"/>
@@ -4023,7 +4118,7 @@
           </a:p>
           <a:p>
             <a:r>
-              <a:rPr lang="en-US" sz="6000" dirty="0">
+              <a:rPr lang="en-US" sz="1200" dirty="0">
                 <a:latin typeface="HelveticaNeueLT Std Cn" panose="020B0506030502030204" pitchFamily="34" charset="77"/>
                 <a:ea typeface="Helvetica Neue" panose="02000503000000020004" pitchFamily="2" charset="0"/>
                 <a:cs typeface="Helvetica Neue" panose="02000503000000020004" pitchFamily="2" charset="0"/>
@@ -4032,7 +4127,7 @@
             </a:r>
           </a:p>
           <a:p>
-            <a:endParaRPr lang="en-US" sz="6000" dirty="0">
+            <a:endParaRPr lang="en-US" sz="1200" dirty="0">
               <a:latin typeface="HelveticaNeueLT Std Cn" panose="020B0506030502030204" pitchFamily="34" charset="77"/>
               <a:ea typeface="Helvetica Neue" panose="02000503000000020004" pitchFamily="2" charset="0"/>
               <a:cs typeface="Helvetica Neue" panose="02000503000000020004" pitchFamily="2" charset="0"/>
@@ -4040,7 +4135,7 @@
           </a:p>
           <a:p>
             <a:r>
-              <a:rPr lang="en-US" sz="6000" dirty="0">
+              <a:rPr lang="en-US" sz="1200" dirty="0">
                 <a:latin typeface="HelveticaNeueLT Std Cn" panose="020B0506030502030204" pitchFamily="34" charset="77"/>
                 <a:ea typeface="Helvetica Neue" panose="02000503000000020004" pitchFamily="2" charset="0"/>
                 <a:cs typeface="Helvetica Neue" panose="02000503000000020004" pitchFamily="2" charset="0"/>
@@ -4050,7 +4145,7 @@
           </a:p>
           <a:p>
             <a:r>
-              <a:rPr lang="en-US" sz="6000" dirty="0">
+              <a:rPr lang="en-US" sz="1200" dirty="0">
                 <a:latin typeface="HelveticaNeueLT Std Cn" panose="020B0506030502030204" pitchFamily="34" charset="77"/>
                 <a:ea typeface="Helvetica Neue" panose="02000503000000020004" pitchFamily="2" charset="0"/>
                 <a:cs typeface="Helvetica Neue" panose="02000503000000020004" pitchFamily="2" charset="0"/>
@@ -4058,7 +4153,7 @@
               <a:t> - Combine A, </a:t>
             </a:r>
             <a:r>
-              <a:rPr lang="en-US" sz="6000" dirty="0">
+              <a:rPr lang="en-US" sz="1200" dirty="0">
                 <a:solidFill>
                   <a:srgbClr val="FF0000"/>
                 </a:solidFill>
@@ -4069,7 +4164,7 @@
               <a:t>D</a:t>
             </a:r>
             <a:r>
-              <a:rPr lang="en-US" sz="6000" dirty="0">
+              <a:rPr lang="en-US" sz="1200" dirty="0">
                 <a:latin typeface="HelveticaNeueLT Std Cn" panose="020B0506030502030204" pitchFamily="34" charset="77"/>
                 <a:ea typeface="Helvetica Neue" panose="02000503000000020004" pitchFamily="2" charset="0"/>
                 <a:cs typeface="Helvetica Neue" panose="02000503000000020004" pitchFamily="2" charset="0"/>
@@ -4078,7 +4173,7 @@
             </a:r>
           </a:p>
           <a:p>
-            <a:endParaRPr lang="en-US" sz="6000" dirty="0">
+            <a:endParaRPr lang="en-US" sz="1200" dirty="0">
               <a:latin typeface="HelveticaNeueLT Std Cn" panose="020B0506030502030204" pitchFamily="34" charset="77"/>
               <a:ea typeface="Helvetica Neue" panose="02000503000000020004" pitchFamily="2" charset="0"/>
               <a:cs typeface="Helvetica Neue" panose="02000503000000020004" pitchFamily="2" charset="0"/>
@@ -4086,7 +4181,7 @@
           </a:p>
           <a:p>
             <a:r>
-              <a:rPr lang="en-US" sz="6000" dirty="0" err="1">
+              <a:rPr lang="en-US" sz="1200" dirty="0" err="1">
                 <a:latin typeface="HelveticaNeueLT Std Cn" panose="020B0506030502030204" pitchFamily="34" charset="77"/>
                 <a:ea typeface="Helvetica Neue" panose="02000503000000020004" pitchFamily="2" charset="0"/>
                 <a:cs typeface="Helvetica Neue" panose="02000503000000020004" pitchFamily="2" charset="0"/>
@@ -4094,7 +4189,7 @@
               <a:t>Dyn</a:t>
             </a:r>
             <a:r>
-              <a:rPr lang="en-US" sz="6000" dirty="0">
+              <a:rPr lang="en-US" sz="1200" dirty="0">
                 <a:latin typeface="HelveticaNeueLT Std Cn" panose="020B0506030502030204" pitchFamily="34" charset="77"/>
                 <a:ea typeface="Helvetica Neue" panose="02000503000000020004" pitchFamily="2" charset="0"/>
                 <a:cs typeface="Helvetica Neue" panose="02000503000000020004" pitchFamily="2" charset="0"/>
@@ -4104,7 +4199,7 @@
           </a:p>
           <a:p>
             <a:r>
-              <a:rPr lang="en-US" sz="6000" dirty="0">
+              <a:rPr lang="en-US" sz="1200" dirty="0">
                 <a:latin typeface="HelveticaNeueLT Std Cn" panose="020B0506030502030204" pitchFamily="34" charset="77"/>
                 <a:ea typeface="Helvetica Neue" panose="02000503000000020004" pitchFamily="2" charset="0"/>
                 <a:cs typeface="Helvetica Neue" panose="02000503000000020004" pitchFamily="2" charset="0"/>
@@ -4112,7 +4207,7 @@
               <a:t> - Combine A, B, </a:t>
             </a:r>
             <a:r>
-              <a:rPr lang="en-US" sz="6000" dirty="0">
+              <a:rPr lang="en-US" sz="1200" dirty="0">
                 <a:solidFill>
                   <a:srgbClr val="FF0000"/>
                 </a:solidFill>
@@ -4124,7 +4219,7 @@
             </a:r>
           </a:p>
           <a:p>
-            <a:endParaRPr lang="en-US" sz="6000" dirty="0">
+            <a:endParaRPr lang="en-US" sz="1200" dirty="0">
               <a:solidFill>
                 <a:srgbClr val="FF0000"/>
               </a:solidFill>
@@ -4135,7 +4230,7 @@
           </a:p>
           <a:p>
             <a:r>
-              <a:rPr lang="en-US" sz="6000" dirty="0">
+              <a:rPr lang="en-US" sz="1200" dirty="0">
                 <a:latin typeface="HelveticaNeueLT Std Cn" panose="020B0506030502030204" pitchFamily="34" charset="77"/>
                 <a:ea typeface="Helvetica Neue" panose="02000503000000020004" pitchFamily="2" charset="0"/>
                 <a:cs typeface="Helvetica Neue" panose="02000503000000020004" pitchFamily="2" charset="0"/>
@@ -4145,7 +4240,7 @@
           </a:p>
           <a:p>
             <a:r>
-              <a:rPr lang="en-US" sz="6000" dirty="0">
+              <a:rPr lang="en-US" sz="1200" dirty="0">
                 <a:latin typeface="HelveticaNeueLT Std Cn" panose="020B0506030502030204" pitchFamily="34" charset="77"/>
                 <a:ea typeface="Helvetica Neue" panose="02000503000000020004" pitchFamily="2" charset="0"/>
                 <a:cs typeface="Helvetica Neue" panose="02000503000000020004" pitchFamily="2" charset="0"/>
@@ -4153,7 +4248,7 @@
               <a:t> - Combine A, </a:t>
             </a:r>
             <a:r>
-              <a:rPr lang="en-US" sz="6000" dirty="0">
+              <a:rPr lang="en-US" sz="1200" dirty="0">
                 <a:solidFill>
                   <a:srgbClr val="FF0000"/>
                 </a:solidFill>
@@ -4164,7 +4259,7 @@
               <a:t>D</a:t>
             </a:r>
             <a:r>
-              <a:rPr lang="en-US" sz="6000" dirty="0">
+              <a:rPr lang="en-US" sz="1200" dirty="0">
                 <a:latin typeface="HelveticaNeueLT Std Cn" panose="020B0506030502030204" pitchFamily="34" charset="77"/>
                 <a:ea typeface="Helvetica Neue" panose="02000503000000020004" pitchFamily="2" charset="0"/>
                 <a:cs typeface="Helvetica Neue" panose="02000503000000020004" pitchFamily="2" charset="0"/>
@@ -4172,7 +4267,7 @@
               <a:t>, </a:t>
             </a:r>
             <a:r>
-              <a:rPr lang="en-US" sz="6000" dirty="0">
+              <a:rPr lang="en-US" sz="1200" dirty="0">
                 <a:solidFill>
                   <a:srgbClr val="FF0000"/>
                 </a:solidFill>
@@ -4199,8 +4294,8 @@
         </p:nvSpPr>
         <p:spPr>
           <a:xfrm>
-            <a:off x="20029853" y="9069508"/>
-            <a:ext cx="9398259" cy="2037289"/>
+            <a:off x="3413696" y="1429827"/>
+            <a:ext cx="1473860" cy="900246"/>
           </a:xfrm>
           <a:prstGeom prst="rect">
             <a:avLst/>
@@ -4214,29 +4309,13 @@
           <a:lstStyle/>
           <a:p>
             <a:r>
-              <a:rPr lang="en-US" sz="4213" dirty="0">
+              <a:rPr lang="en-US" sz="1050" dirty="0">
                 <a:latin typeface="HelveticaNeueLT Std Cn" panose="020B0506030502030204" pitchFamily="34" charset="77"/>
               </a:rPr>
-              <a:t>16 instances for A, B, C were generated</a:t>
-            </a:r>
-          </a:p>
-          <a:p>
-            <a:r>
-              <a:rPr lang="en-US" sz="4213" dirty="0">
-                <a:latin typeface="HelveticaNeueLT Std Cn" panose="020B0506030502030204" pitchFamily="34" charset="77"/>
-              </a:rPr>
-              <a:t>by averaging three of each performance</a:t>
-            </a:r>
-          </a:p>
-          <a:p>
-            <a:r>
-              <a:rPr lang="en-US" sz="4213" dirty="0">
-                <a:latin typeface="HelveticaNeueLT Std Cn" panose="020B0506030502030204" pitchFamily="34" charset="77"/>
-              </a:rPr>
-              <a:t>feature of </a:t>
-            </a:r>
-            <a:r>
-              <a:rPr lang="en-US" sz="4213" b="1" dirty="0">
+              <a:t>16 instances for A, B, C were generated by averaging three of each performance feature of </a:t>
+            </a:r>
+            <a:r>
+              <a:rPr lang="en-US" sz="1050" b="1" dirty="0">
                 <a:latin typeface="Helvetica Neue Condensed" panose="02000503000000020004" pitchFamily="2" charset="0"/>
                 <a:ea typeface="Helvetica Neue Condensed" panose="02000503000000020004" pitchFamily="2" charset="0"/>
                 <a:cs typeface="Helvetica Neue Condensed" panose="02000503000000020004" pitchFamily="2" charset="0"/>
@@ -4260,8 +4339,8 @@
         </p:nvSpPr>
         <p:spPr>
           <a:xfrm>
-            <a:off x="20029853" y="14456893"/>
-            <a:ext cx="9307153" cy="2037289"/>
+            <a:off x="3404506" y="3021052"/>
+            <a:ext cx="1839847" cy="738664"/>
           </a:xfrm>
           <a:prstGeom prst="rect">
             <a:avLst/>
@@ -4275,29 +4354,13 @@
           <a:lstStyle/>
           <a:p>
             <a:r>
-              <a:rPr lang="en-US" sz="4213" dirty="0">
+              <a:rPr lang="en-US" sz="1050" dirty="0">
                 <a:latin typeface="HelveticaNeueLT Std Cn" panose="020B0506030502030204" pitchFamily="34" charset="77"/>
               </a:rPr>
-              <a:t>16 instances for D were generated</a:t>
-            </a:r>
-          </a:p>
-          <a:p>
-            <a:r>
-              <a:rPr lang="en-US" sz="4213" dirty="0">
-                <a:latin typeface="HelveticaNeueLT Std Cn" panose="020B0506030502030204" pitchFamily="34" charset="77"/>
-              </a:rPr>
-              <a:t>by averaging the articulation performance</a:t>
-            </a:r>
-          </a:p>
-          <a:p>
-            <a:r>
-              <a:rPr lang="en-US" sz="4213" dirty="0">
-                <a:latin typeface="HelveticaNeueLT Std Cn" panose="020B0506030502030204" pitchFamily="34" charset="77"/>
-              </a:rPr>
-              <a:t>feature of </a:t>
-            </a:r>
-            <a:r>
-              <a:rPr lang="en-US" sz="4213" b="1" dirty="0">
+              <a:t>16 instances for D were generated by averaging the articulation performance feature of </a:t>
+            </a:r>
+            <a:r>
+              <a:rPr lang="en-US" sz="1050" b="1" dirty="0">
                 <a:latin typeface="Helvetica Neue Condensed" panose="02000503000000020004" pitchFamily="2" charset="0"/>
                 <a:ea typeface="Helvetica Neue Condensed" panose="02000503000000020004" pitchFamily="2" charset="0"/>
                 <a:cs typeface="Helvetica Neue Condensed" panose="02000503000000020004" pitchFamily="2" charset="0"/>
@@ -4321,8 +4384,8 @@
         </p:nvSpPr>
         <p:spPr>
           <a:xfrm>
-            <a:off x="20029853" y="20837172"/>
-            <a:ext cx="9399835" cy="2037289"/>
+            <a:off x="3399987" y="4468491"/>
+            <a:ext cx="1709895" cy="738664"/>
           </a:xfrm>
           <a:prstGeom prst="rect">
             <a:avLst/>
@@ -4336,29 +4399,13 @@
           <a:lstStyle/>
           <a:p>
             <a:r>
-              <a:rPr lang="en-US" sz="4213" dirty="0">
+              <a:rPr lang="en-US" sz="1050" dirty="0">
                 <a:latin typeface="HelveticaNeueLT Std Cn" panose="020B0506030502030204" pitchFamily="34" charset="77"/>
               </a:rPr>
-              <a:t>16 instances for E were generated</a:t>
-            </a:r>
-          </a:p>
-          <a:p>
-            <a:r>
-              <a:rPr lang="en-US" sz="4213" dirty="0">
-                <a:latin typeface="HelveticaNeueLT Std Cn" panose="020B0506030502030204" pitchFamily="34" charset="77"/>
-              </a:rPr>
-              <a:t>by averaging the dynamics performance</a:t>
-            </a:r>
-          </a:p>
-          <a:p>
-            <a:r>
-              <a:rPr lang="en-US" sz="4213" dirty="0">
-                <a:latin typeface="HelveticaNeueLT Std Cn" panose="020B0506030502030204" pitchFamily="34" charset="77"/>
-              </a:rPr>
-              <a:t>feature of </a:t>
-            </a:r>
-            <a:r>
-              <a:rPr lang="en-US" sz="4213" b="1" dirty="0">
+              <a:t>16 instances for E were generated by averaging the dynamics performance feature of </a:t>
+            </a:r>
+            <a:r>
+              <a:rPr lang="en-US" sz="1050" b="1" dirty="0">
                 <a:latin typeface="Helvetica Neue Condensed" panose="02000503000000020004" pitchFamily="2" charset="0"/>
                 <a:ea typeface="Helvetica Neue Condensed" panose="02000503000000020004" pitchFamily="2" charset="0"/>
                 <a:cs typeface="Helvetica Neue Condensed" panose="02000503000000020004" pitchFamily="2" charset="0"/>
@@ -4384,8 +4431,8 @@
         </p:nvCxnSpPr>
         <p:spPr>
           <a:xfrm flipV="1">
-            <a:off x="15503306" y="3506727"/>
-            <a:ext cx="4053771" cy="2268000"/>
+            <a:off x="2550843" y="1058415"/>
+            <a:ext cx="635724" cy="355674"/>
           </a:xfrm>
           <a:prstGeom prst="straightConnector1">
             <a:avLst/>
@@ -4430,8 +4477,8 @@
         </p:nvCxnSpPr>
         <p:spPr>
           <a:xfrm>
-            <a:off x="15442407" y="19881757"/>
-            <a:ext cx="4078951" cy="0"/>
+            <a:off x="2532328" y="4155310"/>
+            <a:ext cx="639673" cy="0"/>
           </a:xfrm>
           <a:prstGeom prst="straightConnector1">
             <a:avLst/>
@@ -4476,8 +4523,8 @@
         </p:nvCxnSpPr>
         <p:spPr>
           <a:xfrm>
-            <a:off x="15478126" y="13504459"/>
-            <a:ext cx="4078951" cy="0"/>
+            <a:off x="2537929" y="2787654"/>
+            <a:ext cx="639673" cy="0"/>
           </a:xfrm>
           <a:prstGeom prst="straightConnector1">
             <a:avLst/>
@@ -4520,8 +4567,8 @@
         </p:nvSpPr>
         <p:spPr>
           <a:xfrm>
-            <a:off x="1550694" y="24197791"/>
-            <a:ext cx="13830814" cy="1015663"/>
+            <a:off x="5244353" y="214012"/>
+            <a:ext cx="2168988" cy="584775"/>
           </a:xfrm>
           <a:prstGeom prst="rect">
             <a:avLst/>
@@ -4535,12 +4582,22 @@
           <a:lstStyle/>
           <a:p>
             <a:r>
-              <a:rPr lang="en-US" sz="6000" b="1" dirty="0">
+              <a:rPr lang="en-US" sz="1600" b="1" dirty="0">
                 <a:latin typeface="Helvetica Neue Condensed" panose="02000503000000020004" pitchFamily="2" charset="0"/>
                 <a:ea typeface="Helvetica Neue Condensed" panose="02000503000000020004" pitchFamily="2" charset="0"/>
                 <a:cs typeface="Helvetica Neue Condensed" panose="02000503000000020004" pitchFamily="2" charset="0"/>
               </a:rPr>
-              <a:t>(II) Combine extracted features</a:t>
+              <a:t>(II) Combine</a:t>
+            </a:r>
+          </a:p>
+          <a:p>
+            <a:r>
+              <a:rPr lang="en-US" sz="1600" b="1" dirty="0">
+                <a:latin typeface="Helvetica Neue Condensed" panose="02000503000000020004" pitchFamily="2" charset="0"/>
+                <a:ea typeface="Helvetica Neue Condensed" panose="02000503000000020004" pitchFamily="2" charset="0"/>
+                <a:cs typeface="Helvetica Neue Condensed" panose="02000503000000020004" pitchFamily="2" charset="0"/>
+              </a:rPr>
+              <a:t>extracted features</a:t>
             </a:r>
           </a:p>
         </p:txBody>
@@ -4559,8 +4616,8 @@
         </p:nvSpPr>
         <p:spPr>
           <a:xfrm>
-            <a:off x="15501775" y="27248286"/>
-            <a:ext cx="13891713" cy="12095619"/>
+            <a:off x="7529187" y="1036818"/>
+            <a:ext cx="2178539" cy="2677656"/>
           </a:xfrm>
           <a:prstGeom prst="rect">
             <a:avLst/>
@@ -4577,7 +4634,7 @@
           <a:lstStyle/>
           <a:p>
             <a:r>
-              <a:rPr lang="en-US" sz="6000" dirty="0">
+              <a:rPr lang="en-US" sz="1200" dirty="0">
                 <a:latin typeface="HelveticaNeueLT Std Cn" panose="020B0506030502030204" pitchFamily="34" charset="77"/>
                 <a:ea typeface="Helvetica Neue" panose="02000503000000020004" pitchFamily="2" charset="0"/>
                 <a:cs typeface="Helvetica Neue" panose="02000503000000020004" pitchFamily="2" charset="0"/>
@@ -4587,7 +4644,7 @@
           </a:p>
           <a:p>
             <a:r>
-              <a:rPr lang="en-US" sz="6000" dirty="0">
+              <a:rPr lang="en-US" sz="1200" dirty="0">
                 <a:latin typeface="HelveticaNeueLT Std Cn" panose="020B0506030502030204" pitchFamily="34" charset="77"/>
                 <a:ea typeface="Helvetica Neue" panose="02000503000000020004" pitchFamily="2" charset="0"/>
                 <a:cs typeface="Helvetica Neue" panose="02000503000000020004" pitchFamily="2" charset="0"/>
@@ -4596,7 +4653,7 @@
             </a:r>
           </a:p>
           <a:p>
-            <a:endParaRPr lang="en-US" sz="6000" dirty="0">
+            <a:endParaRPr lang="en-US" sz="1200" dirty="0">
               <a:latin typeface="HelveticaNeueLT Std Cn" panose="020B0506030502030204" pitchFamily="34" charset="77"/>
               <a:ea typeface="Helvetica Neue" panose="02000503000000020004" pitchFamily="2" charset="0"/>
               <a:cs typeface="Helvetica Neue" panose="02000503000000020004" pitchFamily="2" charset="0"/>
@@ -4604,7 +4661,7 @@
           </a:p>
           <a:p>
             <a:r>
-              <a:rPr lang="en-US" sz="6000" dirty="0">
+              <a:rPr lang="en-US" sz="1200" dirty="0">
                 <a:latin typeface="HelveticaNeueLT Std Cn" panose="020B0506030502030204" pitchFamily="34" charset="77"/>
                 <a:ea typeface="Helvetica Neue" panose="02000503000000020004" pitchFamily="2" charset="0"/>
                 <a:cs typeface="Helvetica Neue" panose="02000503000000020004" pitchFamily="2" charset="0"/>
@@ -4614,7 +4671,7 @@
           </a:p>
           <a:p>
             <a:r>
-              <a:rPr lang="en-US" sz="6000" dirty="0">
+              <a:rPr lang="en-US" sz="1200" dirty="0">
                 <a:latin typeface="HelveticaNeueLT Std Cn" panose="020B0506030502030204" pitchFamily="34" charset="77"/>
                 <a:ea typeface="Helvetica Neue" panose="02000503000000020004" pitchFamily="2" charset="0"/>
                 <a:cs typeface="Helvetica Neue" panose="02000503000000020004" pitchFamily="2" charset="0"/>
@@ -4623,7 +4680,7 @@
             </a:r>
           </a:p>
           <a:p>
-            <a:endParaRPr lang="en-US" sz="6000" dirty="0">
+            <a:endParaRPr lang="en-US" sz="1200" dirty="0">
               <a:latin typeface="HelveticaNeueLT Std Cn" panose="020B0506030502030204" pitchFamily="34" charset="77"/>
               <a:ea typeface="Helvetica Neue" panose="02000503000000020004" pitchFamily="2" charset="0"/>
               <a:cs typeface="Helvetica Neue" panose="02000503000000020004" pitchFamily="2" charset="0"/>
@@ -4631,7 +4688,7 @@
           </a:p>
           <a:p>
             <a:r>
-              <a:rPr lang="en-US" sz="6000" dirty="0" err="1">
+              <a:rPr lang="en-US" sz="1200" dirty="0" err="1">
                 <a:latin typeface="HelveticaNeueLT Std Cn" panose="020B0506030502030204" pitchFamily="34" charset="77"/>
                 <a:ea typeface="Helvetica Neue" panose="02000503000000020004" pitchFamily="2" charset="0"/>
                 <a:cs typeface="Helvetica Neue" panose="02000503000000020004" pitchFamily="2" charset="0"/>
@@ -4639,7 +4696,7 @@
               <a:t>Dyn</a:t>
             </a:r>
             <a:r>
-              <a:rPr lang="en-US" sz="6000" dirty="0">
+              <a:rPr lang="en-US" sz="1200" dirty="0">
                 <a:latin typeface="HelveticaNeueLT Std Cn" panose="020B0506030502030204" pitchFamily="34" charset="77"/>
                 <a:ea typeface="Helvetica Neue" panose="02000503000000020004" pitchFamily="2" charset="0"/>
                 <a:cs typeface="Helvetica Neue" panose="02000503000000020004" pitchFamily="2" charset="0"/>
@@ -4649,7 +4706,7 @@
           </a:p>
           <a:p>
             <a:r>
-              <a:rPr lang="en-US" sz="6000" dirty="0">
+              <a:rPr lang="en-US" sz="1200" dirty="0">
                 <a:latin typeface="HelveticaNeueLT Std Cn" panose="020B0506030502030204" pitchFamily="34" charset="77"/>
                 <a:ea typeface="Helvetica Neue" panose="02000503000000020004" pitchFamily="2" charset="0"/>
                 <a:cs typeface="Helvetica Neue" panose="02000503000000020004" pitchFamily="2" charset="0"/>
@@ -4658,7 +4715,7 @@
             </a:r>
           </a:p>
           <a:p>
-            <a:endParaRPr lang="en-US" sz="6000" dirty="0">
+            <a:endParaRPr lang="en-US" sz="1200" dirty="0">
               <a:solidFill>
                 <a:srgbClr val="FF0000"/>
               </a:solidFill>
@@ -4669,7 +4726,7 @@
           </a:p>
           <a:p>
             <a:r>
-              <a:rPr lang="en-US" sz="6000" dirty="0">
+              <a:rPr lang="en-US" sz="1200" dirty="0">
                 <a:latin typeface="HelveticaNeueLT Std Cn" panose="020B0506030502030204" pitchFamily="34" charset="77"/>
                 <a:ea typeface="Helvetica Neue" panose="02000503000000020004" pitchFamily="2" charset="0"/>
                 <a:cs typeface="Helvetica Neue" panose="02000503000000020004" pitchFamily="2" charset="0"/>
@@ -4679,7 +4736,7 @@
           </a:p>
           <a:p>
             <a:r>
-              <a:rPr lang="en-US" sz="6000" dirty="0">
+              <a:rPr lang="en-US" sz="1200" dirty="0">
                 <a:latin typeface="HelveticaNeueLT Std Cn" panose="020B0506030502030204" pitchFamily="34" charset="77"/>
                 <a:ea typeface="Helvetica Neue" panose="02000503000000020004" pitchFamily="2" charset="0"/>
                 <a:cs typeface="Helvetica Neue" panose="02000503000000020004" pitchFamily="2" charset="0"/>
@@ -4703,8 +4760,8 @@
         </p:nvSpPr>
         <p:spPr>
           <a:xfrm>
-            <a:off x="15506192" y="24176019"/>
-            <a:ext cx="13830814" cy="1938992"/>
+            <a:off x="7529187" y="209535"/>
+            <a:ext cx="2168988" cy="523220"/>
           </a:xfrm>
           <a:prstGeom prst="rect">
             <a:avLst/>
@@ -4718,38 +4775,22 @@
           <a:lstStyle/>
           <a:p>
             <a:r>
-              <a:rPr lang="en-US" sz="6000" b="1" dirty="0">
+              <a:rPr lang="en-US" sz="1600" b="1" dirty="0">
                 <a:latin typeface="Helvetica Neue Condensed" panose="02000503000000020004" pitchFamily="2" charset="0"/>
                 <a:ea typeface="Helvetica Neue Condensed" panose="02000503000000020004" pitchFamily="2" charset="0"/>
                 <a:cs typeface="Helvetica Neue Condensed" panose="02000503000000020004" pitchFamily="2" charset="0"/>
               </a:rPr>
-              <a:t>(III) Selected recordings </a:t>
-            </a:r>
-          </a:p>
-          <a:p>
-            <a:r>
-              <a:rPr lang="en-US" sz="6000" b="1" dirty="0">
-                <a:latin typeface="Helvetica Neue Condensed" panose="02000503000000020004" pitchFamily="2" charset="0"/>
-                <a:ea typeface="Helvetica Neue Condensed" panose="02000503000000020004" pitchFamily="2" charset="0"/>
-                <a:cs typeface="Helvetica Neue Condensed" panose="02000503000000020004" pitchFamily="2" charset="0"/>
-              </a:rPr>
-              <a:t>		</a:t>
-            </a:r>
-            <a:r>
-              <a:rPr lang="en-US" sz="6000" dirty="0">
-                <a:latin typeface="HelveticaNeueLT Std Cn" panose="020B0506030502030204" pitchFamily="34" charset="77"/>
-                <a:ea typeface="Helvetica Neue Condensed" panose="02000503000000020004" pitchFamily="2" charset="0"/>
-                <a:cs typeface="Helvetica Neue Condensed" panose="02000503000000020004" pitchFamily="2" charset="0"/>
-              </a:rPr>
-              <a:t> </a:t>
-            </a:r>
-            <a:r>
-              <a:rPr lang="en-US" sz="6000" dirty="0">
+              <a:t>(III) Selected recordings</a:t>
+            </a:r>
+          </a:p>
+          <a:p>
+            <a:r>
+              <a:rPr lang="en-US" sz="1200" dirty="0">
                 <a:latin typeface="HelveticaNeueLT Std Cn" panose="020B0506030502030204" pitchFamily="34" charset="77"/>
                 <a:ea typeface="HELVETICA NEUE CONDENSED" panose="02000503000000020004" pitchFamily="2" charset="0"/>
                 <a:cs typeface="HELVETICA NEUE CONDENSED" panose="02000503000000020004" pitchFamily="2" charset="0"/>
               </a:rPr>
-              <a:t>(Fig. 7 – Fig. 10 for details)</a:t>
+              <a:t>(Fig. S2 – Fig. S5 for details)</a:t>
             </a:r>
           </a:p>
         </p:txBody>

</xml_diff>

<commit_message>
update supplementary material figure
Signed-off-by: Atsuko Tominaga <Tominaga_Atsuko@phd.ceu.edu>
</commit_message>
<xml_diff>
--- a/paper/image/supplementary.pptx
+++ b/paper/image/supplementary.pptx
@@ -208,7 +208,7 @@
           <a:p>
             <a:fld id="{B82C364D-D81D-0845-9A9B-3DC1F0A57A0F}" type="datetimeFigureOut">
               <a:rPr lang="en-US" smtClean="0"/>
-              <a:t>1/30/23</a:t>
+              <a:t>1/31/23</a:t>
             </a:fld>
             <a:endParaRPr lang="en-US"/>
           </a:p>
@@ -696,7 +696,7 @@
           <a:p>
             <a:fld id="{0B3969E3-A65B-4F43-9099-EDE3BF01F7BC}" type="datetimeFigureOut">
               <a:rPr lang="en-US" smtClean="0"/>
-              <a:t>1/30/23</a:t>
+              <a:t>1/31/23</a:t>
             </a:fld>
             <a:endParaRPr lang="en-US"/>
           </a:p>
@@ -866,7 +866,7 @@
           <a:p>
             <a:fld id="{0B3969E3-A65B-4F43-9099-EDE3BF01F7BC}" type="datetimeFigureOut">
               <a:rPr lang="en-US" smtClean="0"/>
-              <a:t>1/30/23</a:t>
+              <a:t>1/31/23</a:t>
             </a:fld>
             <a:endParaRPr lang="en-US"/>
           </a:p>
@@ -1046,7 +1046,7 @@
           <a:p>
             <a:fld id="{0B3969E3-A65B-4F43-9099-EDE3BF01F7BC}" type="datetimeFigureOut">
               <a:rPr lang="en-US" smtClean="0"/>
-              <a:t>1/30/23</a:t>
+              <a:t>1/31/23</a:t>
             </a:fld>
             <a:endParaRPr lang="en-US"/>
           </a:p>
@@ -1216,7 +1216,7 @@
           <a:p>
             <a:fld id="{0B3969E3-A65B-4F43-9099-EDE3BF01F7BC}" type="datetimeFigureOut">
               <a:rPr lang="en-US" smtClean="0"/>
-              <a:t>1/30/23</a:t>
+              <a:t>1/31/23</a:t>
             </a:fld>
             <a:endParaRPr lang="en-US"/>
           </a:p>
@@ -1460,7 +1460,7 @@
           <a:p>
             <a:fld id="{0B3969E3-A65B-4F43-9099-EDE3BF01F7BC}" type="datetimeFigureOut">
               <a:rPr lang="en-US" smtClean="0"/>
-              <a:t>1/30/23</a:t>
+              <a:t>1/31/23</a:t>
             </a:fld>
             <a:endParaRPr lang="en-US"/>
           </a:p>
@@ -1692,7 +1692,7 @@
           <a:p>
             <a:fld id="{0B3969E3-A65B-4F43-9099-EDE3BF01F7BC}" type="datetimeFigureOut">
               <a:rPr lang="en-US" smtClean="0"/>
-              <a:t>1/30/23</a:t>
+              <a:t>1/31/23</a:t>
             </a:fld>
             <a:endParaRPr lang="en-US"/>
           </a:p>
@@ -2059,7 +2059,7 @@
           <a:p>
             <a:fld id="{0B3969E3-A65B-4F43-9099-EDE3BF01F7BC}" type="datetimeFigureOut">
               <a:rPr lang="en-US" smtClean="0"/>
-              <a:t>1/30/23</a:t>
+              <a:t>1/31/23</a:t>
             </a:fld>
             <a:endParaRPr lang="en-US"/>
           </a:p>
@@ -2177,7 +2177,7 @@
           <a:p>
             <a:fld id="{0B3969E3-A65B-4F43-9099-EDE3BF01F7BC}" type="datetimeFigureOut">
               <a:rPr lang="en-US" smtClean="0"/>
-              <a:t>1/30/23</a:t>
+              <a:t>1/31/23</a:t>
             </a:fld>
             <a:endParaRPr lang="en-US"/>
           </a:p>
@@ -2272,7 +2272,7 @@
           <a:p>
             <a:fld id="{0B3969E3-A65B-4F43-9099-EDE3BF01F7BC}" type="datetimeFigureOut">
               <a:rPr lang="en-US" smtClean="0"/>
-              <a:t>1/30/23</a:t>
+              <a:t>1/31/23</a:t>
             </a:fld>
             <a:endParaRPr lang="en-US"/>
           </a:p>
@@ -2549,7 +2549,7 @@
           <a:p>
             <a:fld id="{0B3969E3-A65B-4F43-9099-EDE3BF01F7BC}" type="datetimeFigureOut">
               <a:rPr lang="en-US" smtClean="0"/>
-              <a:t>1/30/23</a:t>
+              <a:t>1/31/23</a:t>
             </a:fld>
             <a:endParaRPr lang="en-US"/>
           </a:p>
@@ -2806,7 +2806,7 @@
           <a:p>
             <a:fld id="{0B3969E3-A65B-4F43-9099-EDE3BF01F7BC}" type="datetimeFigureOut">
               <a:rPr lang="en-US" smtClean="0"/>
-              <a:t>1/30/23</a:t>
+              <a:t>1/31/23</a:t>
             </a:fld>
             <a:endParaRPr lang="en-US"/>
           </a:p>
@@ -3019,7 +3019,7 @@
           <a:p>
             <a:fld id="{0B3969E3-A65B-4F43-9099-EDE3BF01F7BC}" type="datetimeFigureOut">
               <a:rPr lang="en-US" smtClean="0"/>
-              <a:t>1/30/23</a:t>
+              <a:t>1/31/23</a:t>
             </a:fld>
             <a:endParaRPr lang="en-US"/>
           </a:p>
@@ -3424,128 +3424,6 @@
           <a:chExt cx="0" cy="0"/>
         </a:xfrm>
       </p:grpSpPr>
-      <p:pic>
-        <p:nvPicPr>
-          <p:cNvPr id="13" name="Picture 12" descr="A picture containing antenna&#10;&#10;Description automatically generated">
-            <a:extLst>
-              <a:ext uri="{FF2B5EF4-FFF2-40B4-BE49-F238E27FC236}">
-                <a16:creationId xmlns:a16="http://schemas.microsoft.com/office/drawing/2014/main" id="{90FD4727-8997-8CF2-4D77-D47CA5572DAD}"/>
-              </a:ext>
-            </a:extLst>
-          </p:cNvPr>
-          <p:cNvPicPr>
-            <a:picLocks noChangeAspect="1"/>
-          </p:cNvPicPr>
-          <p:nvPr/>
-        </p:nvPicPr>
-        <p:blipFill>
-          <a:blip r:embed="rId3"/>
-          <a:stretch>
-            <a:fillRect/>
-          </a:stretch>
-        </p:blipFill>
-        <p:spPr>
-          <a:xfrm>
-            <a:off x="303594" y="1076362"/>
-            <a:ext cx="2002190" cy="712559"/>
-          </a:xfrm>
-          <a:prstGeom prst="rect">
-            <a:avLst/>
-          </a:prstGeom>
-        </p:spPr>
-      </p:pic>
-      <p:cxnSp>
-        <p:nvCxnSpPr>
-          <p:cNvPr id="14" name="Straight Arrow Connector 13">
-            <a:extLst>
-              <a:ext uri="{FF2B5EF4-FFF2-40B4-BE49-F238E27FC236}">
-                <a16:creationId xmlns:a16="http://schemas.microsoft.com/office/drawing/2014/main" id="{271DC662-046B-DE20-DFE4-33E17E4A707A}"/>
-              </a:ext>
-            </a:extLst>
-          </p:cNvPr>
-          <p:cNvCxnSpPr>
-            <a:cxnSpLocks/>
-          </p:cNvCxnSpPr>
-          <p:nvPr/>
-        </p:nvCxnSpPr>
-        <p:spPr>
-          <a:xfrm>
-            <a:off x="2537929" y="1420411"/>
-            <a:ext cx="639673" cy="0"/>
-          </a:xfrm>
-          <a:prstGeom prst="straightConnector1">
-            <a:avLst/>
-          </a:prstGeom>
-          <a:ln w="76200">
-            <a:solidFill>
-              <a:schemeClr val="bg1">
-                <a:lumMod val="50000"/>
-              </a:schemeClr>
-            </a:solidFill>
-            <a:tailEnd type="triangle"/>
-          </a:ln>
-        </p:spPr>
-        <p:style>
-          <a:lnRef idx="1">
-            <a:schemeClr val="accent1"/>
-          </a:lnRef>
-          <a:fillRef idx="0">
-            <a:schemeClr val="accent1"/>
-          </a:fillRef>
-          <a:effectRef idx="0">
-            <a:schemeClr val="accent1"/>
-          </a:effectRef>
-          <a:fontRef idx="minor">
-            <a:schemeClr val="tx1"/>
-          </a:fontRef>
-        </p:style>
-      </p:cxnSp>
-      <p:cxnSp>
-        <p:nvCxnSpPr>
-          <p:cNvPr id="15" name="Straight Arrow Connector 14">
-            <a:extLst>
-              <a:ext uri="{FF2B5EF4-FFF2-40B4-BE49-F238E27FC236}">
-                <a16:creationId xmlns:a16="http://schemas.microsoft.com/office/drawing/2014/main" id="{F239648D-000F-A74B-8F3E-63B6F6E12E7A}"/>
-              </a:ext>
-            </a:extLst>
-          </p:cNvPr>
-          <p:cNvCxnSpPr>
-            <a:cxnSpLocks/>
-          </p:cNvCxnSpPr>
-          <p:nvPr/>
-        </p:nvCxnSpPr>
-        <p:spPr>
-          <a:xfrm>
-            <a:off x="2550843" y="1433247"/>
-            <a:ext cx="635724" cy="355674"/>
-          </a:xfrm>
-          <a:prstGeom prst="straightConnector1">
-            <a:avLst/>
-          </a:prstGeom>
-          <a:ln w="76200">
-            <a:solidFill>
-              <a:schemeClr val="bg1">
-                <a:lumMod val="50000"/>
-              </a:schemeClr>
-            </a:solidFill>
-            <a:tailEnd type="triangle"/>
-          </a:ln>
-        </p:spPr>
-        <p:style>
-          <a:lnRef idx="1">
-            <a:schemeClr val="accent1"/>
-          </a:lnRef>
-          <a:fillRef idx="0">
-            <a:schemeClr val="accent1"/>
-          </a:fillRef>
-          <a:effectRef idx="0">
-            <a:schemeClr val="accent1"/>
-          </a:effectRef>
-          <a:fontRef idx="minor">
-            <a:schemeClr val="tx1"/>
-          </a:fontRef>
-        </p:style>
-      </p:cxnSp>
       <p:sp>
         <p:nvSpPr>
           <p:cNvPr id="20" name="TextBox 19">
@@ -3595,237 +3473,12 @@
           </a:p>
         </p:txBody>
       </p:sp>
-      <p:sp>
-        <p:nvSpPr>
-          <p:cNvPr id="21" name="TextBox 20">
+      <p:grpSp>
+        <p:nvGrpSpPr>
+          <p:cNvPr id="16" name="Group 15">
             <a:extLst>
               <a:ext uri="{FF2B5EF4-FFF2-40B4-BE49-F238E27FC236}">
-                <a16:creationId xmlns:a16="http://schemas.microsoft.com/office/drawing/2014/main" id="{86097BA7-1DBE-CF8A-722C-4928E5F8A25F}"/>
-              </a:ext>
-            </a:extLst>
-          </p:cNvPr>
-          <p:cNvSpPr txBox="1"/>
-          <p:nvPr/>
-        </p:nvSpPr>
-        <p:spPr>
-          <a:xfrm>
-            <a:off x="303594" y="1788921"/>
-            <a:ext cx="1997040" cy="643786"/>
-          </a:xfrm>
-          <a:prstGeom prst="rect">
-            <a:avLst/>
-          </a:prstGeom>
-          <a:noFill/>
-        </p:spPr>
-        <p:txBody>
-          <a:bodyPr wrap="square" rtlCol="0">
-            <a:spAutoFit/>
-          </a:bodyPr>
-          <a:lstStyle/>
-          <a:p>
-            <a:r>
-              <a:rPr lang="en-US" sz="1200" dirty="0">
-                <a:latin typeface="HelveticaNeueLT Std Cn" panose="020B0506030502030204" pitchFamily="34" charset="77"/>
-              </a:rPr>
-              <a:t>Performances </a:t>
-            </a:r>
-          </a:p>
-          <a:p>
-            <a:r>
-              <a:rPr lang="en-US" sz="1200" dirty="0">
-                <a:latin typeface="HelveticaNeueLT Std Cn" panose="020B0506030502030204" pitchFamily="34" charset="77"/>
-              </a:rPr>
-              <a:t>without expressive notations</a:t>
-            </a:r>
-          </a:p>
-          <a:p>
-            <a:r>
-              <a:rPr lang="en-US" sz="1200" b="1" dirty="0">
-                <a:latin typeface="Helvetica Neue Condensed" panose="02000503000000020004" pitchFamily="2" charset="0"/>
-                <a:ea typeface="Helvetica Neue Condensed" panose="02000503000000020004" pitchFamily="2" charset="0"/>
-                <a:cs typeface="Helvetica Neue Condensed" panose="02000503000000020004" pitchFamily="2" charset="0"/>
-              </a:rPr>
-              <a:t>baseline performances</a:t>
-            </a:r>
-          </a:p>
-        </p:txBody>
-      </p:sp>
-      <p:pic>
-        <p:nvPicPr>
-          <p:cNvPr id="23" name="Picture 22" descr="A picture containing antenna&#10;&#10;Description automatically generated">
-            <a:extLst>
-              <a:ext uri="{FF2B5EF4-FFF2-40B4-BE49-F238E27FC236}">
-                <a16:creationId xmlns:a16="http://schemas.microsoft.com/office/drawing/2014/main" id="{803B9327-81B3-46DF-1239-C2CD62D86962}"/>
-              </a:ext>
-            </a:extLst>
-          </p:cNvPr>
-          <p:cNvPicPr>
-            <a:picLocks noChangeAspect="1"/>
-          </p:cNvPicPr>
-          <p:nvPr/>
-        </p:nvPicPr>
-        <p:blipFill>
-          <a:blip r:embed="rId4"/>
-          <a:stretch>
-            <a:fillRect/>
-          </a:stretch>
-        </p:blipFill>
-        <p:spPr>
-          <a:xfrm>
-            <a:off x="301906" y="2403737"/>
-            <a:ext cx="1998728" cy="712559"/>
-          </a:xfrm>
-          <a:prstGeom prst="rect">
-            <a:avLst/>
-          </a:prstGeom>
-        </p:spPr>
-      </p:pic>
-      <p:pic>
-        <p:nvPicPr>
-          <p:cNvPr id="25" name="Picture 24" descr="A picture containing object, antenna&#10;&#10;Description automatically generated">
-            <a:extLst>
-              <a:ext uri="{FF2B5EF4-FFF2-40B4-BE49-F238E27FC236}">
-                <a16:creationId xmlns:a16="http://schemas.microsoft.com/office/drawing/2014/main" id="{10CAFC32-F9C7-7229-7036-16DB6685029A}"/>
-              </a:ext>
-            </a:extLst>
-          </p:cNvPr>
-          <p:cNvPicPr>
-            <a:picLocks noChangeAspect="1"/>
-          </p:cNvPicPr>
-          <p:nvPr/>
-        </p:nvPicPr>
-        <p:blipFill>
-          <a:blip r:embed="rId5"/>
-          <a:stretch>
-            <a:fillRect/>
-          </a:stretch>
-        </p:blipFill>
-        <p:spPr>
-          <a:xfrm>
-            <a:off x="301906" y="3808125"/>
-            <a:ext cx="2002187" cy="712559"/>
-          </a:xfrm>
-          <a:prstGeom prst="rect">
-            <a:avLst/>
-          </a:prstGeom>
-        </p:spPr>
-      </p:pic>
-      <p:sp>
-        <p:nvSpPr>
-          <p:cNvPr id="26" name="TextBox 25">
-            <a:extLst>
-              <a:ext uri="{FF2B5EF4-FFF2-40B4-BE49-F238E27FC236}">
-                <a16:creationId xmlns:a16="http://schemas.microsoft.com/office/drawing/2014/main" id="{BF68C1FE-A95F-E94D-E45B-7D79B729051D}"/>
-              </a:ext>
-            </a:extLst>
-          </p:cNvPr>
-          <p:cNvSpPr txBox="1"/>
-          <p:nvPr/>
-        </p:nvSpPr>
-        <p:spPr>
-          <a:xfrm>
-            <a:off x="301906" y="3139045"/>
-            <a:ext cx="1998728" cy="646331"/>
-          </a:xfrm>
-          <a:prstGeom prst="rect">
-            <a:avLst/>
-          </a:prstGeom>
-          <a:noFill/>
-        </p:spPr>
-        <p:txBody>
-          <a:bodyPr wrap="square" rtlCol="0">
-            <a:spAutoFit/>
-          </a:bodyPr>
-          <a:lstStyle/>
-          <a:p>
-            <a:r>
-              <a:rPr lang="en-US" sz="1200" dirty="0">
-                <a:latin typeface="HelveticaNeueLT Std Cn" panose="020B0506030502030204" pitchFamily="34" charset="77"/>
-              </a:rPr>
-              <a:t>Performances </a:t>
-            </a:r>
-          </a:p>
-          <a:p>
-            <a:r>
-              <a:rPr lang="en-US" sz="1200" dirty="0">
-                <a:latin typeface="HelveticaNeueLT Std Cn" panose="020B0506030502030204" pitchFamily="34" charset="77"/>
-              </a:rPr>
-              <a:t>with notated articulation</a:t>
-            </a:r>
-          </a:p>
-          <a:p>
-            <a:r>
-              <a:rPr lang="en-US" sz="1200" b="1" dirty="0">
-                <a:latin typeface="Helvetica Neue Condensed" panose="02000503000000020004" pitchFamily="2" charset="0"/>
-                <a:ea typeface="Helvetica Neue Condensed" panose="02000503000000020004" pitchFamily="2" charset="0"/>
-                <a:cs typeface="Helvetica Neue Condensed" panose="02000503000000020004" pitchFamily="2" charset="0"/>
-              </a:rPr>
-              <a:t>articulation performances</a:t>
-            </a:r>
-          </a:p>
-        </p:txBody>
-      </p:sp>
-      <p:sp>
-        <p:nvSpPr>
-          <p:cNvPr id="27" name="TextBox 26">
-            <a:extLst>
-              <a:ext uri="{FF2B5EF4-FFF2-40B4-BE49-F238E27FC236}">
-                <a16:creationId xmlns:a16="http://schemas.microsoft.com/office/drawing/2014/main" id="{D97E2954-4C04-CAD3-CD25-02FA6BFE5AA9}"/>
-              </a:ext>
-            </a:extLst>
-          </p:cNvPr>
-          <p:cNvSpPr txBox="1"/>
-          <p:nvPr/>
-        </p:nvSpPr>
-        <p:spPr>
-          <a:xfrm>
-            <a:off x="298447" y="4598135"/>
-            <a:ext cx="2002187" cy="646331"/>
-          </a:xfrm>
-          <a:prstGeom prst="rect">
-            <a:avLst/>
-          </a:prstGeom>
-          <a:noFill/>
-        </p:spPr>
-        <p:txBody>
-          <a:bodyPr wrap="square" rtlCol="0">
-            <a:spAutoFit/>
-          </a:bodyPr>
-          <a:lstStyle/>
-          <a:p>
-            <a:r>
-              <a:rPr lang="en-US" sz="1200" dirty="0">
-                <a:latin typeface="HelveticaNeueLT Std Cn" panose="020B0506030502030204" pitchFamily="34" charset="77"/>
-              </a:rPr>
-              <a:t>Performances </a:t>
-            </a:r>
-          </a:p>
-          <a:p>
-            <a:r>
-              <a:rPr lang="en-US" sz="1200" dirty="0">
-                <a:latin typeface="HelveticaNeueLT Std Cn" panose="020B0506030502030204" pitchFamily="34" charset="77"/>
-              </a:rPr>
-              <a:t>with notated dynamics</a:t>
-            </a:r>
-          </a:p>
-          <a:p>
-            <a:r>
-              <a:rPr lang="en-US" sz="1200" b="1" dirty="0">
-                <a:latin typeface="Helvetica Neue Condensed" panose="02000503000000020004" pitchFamily="2" charset="0"/>
-                <a:ea typeface="Helvetica Neue Condensed" panose="02000503000000020004" pitchFamily="2" charset="0"/>
-                <a:cs typeface="Helvetica Neue Condensed" panose="02000503000000020004" pitchFamily="2" charset="0"/>
-              </a:rPr>
-              <a:t>dynamics performances</a:t>
-            </a:r>
-          </a:p>
-        </p:txBody>
-      </p:sp>
-      <p:grpSp>
-        <p:nvGrpSpPr>
-          <p:cNvPr id="5" name="Group 4">
-            <a:extLst>
-              <a:ext uri="{FF2B5EF4-FFF2-40B4-BE49-F238E27FC236}">
-                <a16:creationId xmlns:a16="http://schemas.microsoft.com/office/drawing/2014/main" id="{AEDF962B-1CBB-AD2C-925F-33D185FF9224}"/>
+                <a16:creationId xmlns:a16="http://schemas.microsoft.com/office/drawing/2014/main" id="{E3459BBB-F754-A306-2972-59F231A18131}"/>
               </a:ext>
             </a:extLst>
           </p:cNvPr>
@@ -3834,18 +3487,156 @@
         </p:nvGrpSpPr>
         <p:grpSpPr>
           <a:xfrm>
-            <a:off x="3409747" y="306539"/>
-            <a:ext cx="1473862" cy="1123739"/>
-            <a:chOff x="3409747" y="261714"/>
-            <a:chExt cx="1473862" cy="1123739"/>
+            <a:off x="3395104" y="978078"/>
+            <a:ext cx="3614817" cy="1584953"/>
+            <a:chOff x="3409747" y="308902"/>
+            <a:chExt cx="1477809" cy="1584953"/>
           </a:xfrm>
         </p:grpSpPr>
+        <p:grpSp>
+          <p:nvGrpSpPr>
+            <p:cNvPr id="5" name="Group 4">
+              <a:extLst>
+                <a:ext uri="{FF2B5EF4-FFF2-40B4-BE49-F238E27FC236}">
+                  <a16:creationId xmlns:a16="http://schemas.microsoft.com/office/drawing/2014/main" id="{AEDF962B-1CBB-AD2C-925F-33D185FF9224}"/>
+                </a:ext>
+              </a:extLst>
+            </p:cNvPr>
+            <p:cNvGrpSpPr/>
+            <p:nvPr/>
+          </p:nvGrpSpPr>
+          <p:grpSpPr>
+            <a:xfrm>
+              <a:off x="3409747" y="308902"/>
+              <a:ext cx="1473862" cy="939073"/>
+              <a:chOff x="3409747" y="261714"/>
+              <a:chExt cx="1473862" cy="939073"/>
+            </a:xfrm>
+          </p:grpSpPr>
+          <p:sp>
+            <p:nvSpPr>
+              <p:cNvPr id="17" name="TextBox 16">
+                <a:extLst>
+                  <a:ext uri="{FF2B5EF4-FFF2-40B4-BE49-F238E27FC236}">
+                    <a16:creationId xmlns:a16="http://schemas.microsoft.com/office/drawing/2014/main" id="{8D5A9852-30D4-8C01-6C85-51023C3AC74D}"/>
+                  </a:ext>
+                </a:extLst>
+              </p:cNvPr>
+              <p:cNvSpPr txBox="1"/>
+              <p:nvPr/>
+            </p:nvSpPr>
+            <p:spPr>
+              <a:xfrm>
+                <a:off x="3409747" y="261714"/>
+                <a:ext cx="1473862" cy="276999"/>
+              </a:xfrm>
+              <a:prstGeom prst="rect">
+                <a:avLst/>
+              </a:prstGeom>
+              <a:noFill/>
+            </p:spPr>
+            <p:txBody>
+              <a:bodyPr wrap="square" rtlCol="0">
+                <a:spAutoFit/>
+              </a:bodyPr>
+              <a:lstStyle/>
+              <a:p>
+                <a:r>
+                  <a:rPr lang="en-US" sz="1200" dirty="0">
+                    <a:latin typeface="HelveticaNeueLT Std Cn" panose="020B0506030502030204" pitchFamily="34" charset="77"/>
+                    <a:ea typeface="Helvetica Neue" panose="02000503000000020004" pitchFamily="2" charset="0"/>
+                    <a:cs typeface="Helvetica Neue" panose="02000503000000020004" pitchFamily="2" charset="0"/>
+                  </a:rPr>
+                  <a:t>A. Tempo (IOIs)</a:t>
+                </a:r>
+              </a:p>
+            </p:txBody>
+          </p:sp>
+          <p:sp>
+            <p:nvSpPr>
+              <p:cNvPr id="18" name="TextBox 17">
+                <a:extLst>
+                  <a:ext uri="{FF2B5EF4-FFF2-40B4-BE49-F238E27FC236}">
+                    <a16:creationId xmlns:a16="http://schemas.microsoft.com/office/drawing/2014/main" id="{2D953C7F-4753-2790-C427-42821505D065}"/>
+                  </a:ext>
+                </a:extLst>
+              </p:cNvPr>
+              <p:cNvSpPr txBox="1"/>
+              <p:nvPr/>
+            </p:nvSpPr>
+            <p:spPr>
+              <a:xfrm>
+                <a:off x="3409749" y="584118"/>
+                <a:ext cx="1473860" cy="276999"/>
+              </a:xfrm>
+              <a:prstGeom prst="rect">
+                <a:avLst/>
+              </a:prstGeom>
+              <a:noFill/>
+            </p:spPr>
+            <p:txBody>
+              <a:bodyPr wrap="square" rtlCol="0">
+                <a:spAutoFit/>
+              </a:bodyPr>
+              <a:lstStyle/>
+              <a:p>
+                <a:r>
+                  <a:rPr lang="en-US" sz="1200" dirty="0">
+                    <a:latin typeface="HelveticaNeueLT Std Cn" panose="020B0506030502030204" pitchFamily="34" charset="77"/>
+                    <a:ea typeface="Helvetica Neue" panose="02000503000000020004" pitchFamily="2" charset="0"/>
+                    <a:cs typeface="Helvetica Neue" panose="02000503000000020004" pitchFamily="2" charset="0"/>
+                  </a:rPr>
+                  <a:t>B. Articulation (sound duration)</a:t>
+                </a:r>
+              </a:p>
+            </p:txBody>
+          </p:sp>
+          <p:sp>
+            <p:nvSpPr>
+              <p:cNvPr id="19" name="TextBox 18">
+                <a:extLst>
+                  <a:ext uri="{FF2B5EF4-FFF2-40B4-BE49-F238E27FC236}">
+                    <a16:creationId xmlns:a16="http://schemas.microsoft.com/office/drawing/2014/main" id="{1CE18468-B01D-1BC2-CC26-1A9ADA993B3D}"/>
+                  </a:ext>
+                </a:extLst>
+              </p:cNvPr>
+              <p:cNvSpPr txBox="1"/>
+              <p:nvPr/>
+            </p:nvSpPr>
+            <p:spPr>
+              <a:xfrm>
+                <a:off x="3409747" y="923788"/>
+                <a:ext cx="1473862" cy="276999"/>
+              </a:xfrm>
+              <a:prstGeom prst="rect">
+                <a:avLst/>
+              </a:prstGeom>
+              <a:noFill/>
+            </p:spPr>
+            <p:txBody>
+              <a:bodyPr wrap="square" rtlCol="0">
+                <a:spAutoFit/>
+              </a:bodyPr>
+              <a:lstStyle/>
+              <a:p>
+                <a:r>
+                  <a:rPr lang="en-US" sz="1200" dirty="0">
+                    <a:latin typeface="HelveticaNeueLT Std Cn" panose="020B0506030502030204" pitchFamily="34" charset="77"/>
+                    <a:ea typeface="Helvetica Neue" panose="02000503000000020004" pitchFamily="2" charset="0"/>
+                    <a:cs typeface="Helvetica Neue" panose="02000503000000020004" pitchFamily="2" charset="0"/>
+                  </a:rPr>
+                  <a:t>C. Dynamics (velocity profiles)</a:t>
+                </a:r>
+              </a:p>
+            </p:txBody>
+          </p:sp>
+        </p:grpSp>
         <p:sp>
           <p:nvSpPr>
-            <p:cNvPr id="17" name="TextBox 16">
+            <p:cNvPr id="46" name="TextBox 45">
               <a:extLst>
                 <a:ext uri="{FF2B5EF4-FFF2-40B4-BE49-F238E27FC236}">
-                  <a16:creationId xmlns:a16="http://schemas.microsoft.com/office/drawing/2014/main" id="{8D5A9852-30D4-8C01-6C85-51023C3AC74D}"/>
+                  <a16:creationId xmlns:a16="http://schemas.microsoft.com/office/drawing/2014/main" id="{A12B3245-4E7F-2995-6833-C60B8FBEEA32}"/>
                 </a:ext>
               </a:extLst>
             </p:cNvPr>
@@ -3854,8 +3645,74 @@
           </p:nvSpPr>
           <p:spPr>
             <a:xfrm>
-              <a:off x="3409747" y="261714"/>
-              <a:ext cx="1473862" cy="276999"/>
+              <a:off x="3413696" y="1432190"/>
+              <a:ext cx="1473860" cy="461665"/>
+            </a:xfrm>
+            <a:prstGeom prst="rect">
+              <a:avLst/>
+            </a:prstGeom>
+            <a:noFill/>
+          </p:spPr>
+          <p:txBody>
+            <a:bodyPr wrap="square" rtlCol="0">
+              <a:spAutoFit/>
+            </a:bodyPr>
+            <a:lstStyle/>
+            <a:p>
+              <a:r>
+                <a:rPr lang="en-US" sz="1200" dirty="0">
+                  <a:latin typeface="HelveticaNeueLT Std Cn" panose="020B0506030502030204" pitchFamily="34" charset="77"/>
+                </a:rPr>
+                <a:t>16 instances for A, B, C were generated by averaging three of each performance feature of </a:t>
+              </a:r>
+              <a:r>
+                <a:rPr lang="en-US" sz="1200" b="1" dirty="0">
+                  <a:latin typeface="Helvetica Neue Condensed" panose="02000503000000020004" pitchFamily="2" charset="0"/>
+                  <a:ea typeface="Helvetica Neue Condensed" panose="02000503000000020004" pitchFamily="2" charset="0"/>
+                  <a:cs typeface="Helvetica Neue Condensed" panose="02000503000000020004" pitchFamily="2" charset="0"/>
+                </a:rPr>
+                <a:t>baseline performances</a:t>
+              </a:r>
+            </a:p>
+          </p:txBody>
+        </p:sp>
+      </p:grpSp>
+      <p:grpSp>
+        <p:nvGrpSpPr>
+          <p:cNvPr id="36" name="Group 35">
+            <a:extLst>
+              <a:ext uri="{FF2B5EF4-FFF2-40B4-BE49-F238E27FC236}">
+                <a16:creationId xmlns:a16="http://schemas.microsoft.com/office/drawing/2014/main" id="{A143AF7B-B6A9-E9C7-491D-59BC3669474D}"/>
+              </a:ext>
+            </a:extLst>
+          </p:cNvPr>
+          <p:cNvGrpSpPr/>
+          <p:nvPr/>
+        </p:nvGrpSpPr>
+        <p:grpSpPr>
+          <a:xfrm>
+            <a:off x="3404506" y="3182296"/>
+            <a:ext cx="3595760" cy="1085726"/>
+            <a:chOff x="3404506" y="3092646"/>
+            <a:chExt cx="1839847" cy="1085726"/>
+          </a:xfrm>
+        </p:grpSpPr>
+        <p:sp>
+          <p:nvSpPr>
+            <p:cNvPr id="30" name="TextBox 29">
+              <a:extLst>
+                <a:ext uri="{FF2B5EF4-FFF2-40B4-BE49-F238E27FC236}">
+                  <a16:creationId xmlns:a16="http://schemas.microsoft.com/office/drawing/2014/main" id="{0341CDE9-3827-A566-6110-8695142AD759}"/>
+                </a:ext>
+              </a:extLst>
+            </p:cNvPr>
+            <p:cNvSpPr txBox="1"/>
+            <p:nvPr/>
+          </p:nvSpPr>
+          <p:spPr>
+            <a:xfrm>
+              <a:off x="3408737" y="3092646"/>
+              <a:ext cx="1473860" cy="276999"/>
             </a:xfrm>
             <a:prstGeom prst="rect">
               <a:avLst/>
@@ -3874,17 +3731,17 @@
                   <a:ea typeface="Helvetica Neue" panose="02000503000000020004" pitchFamily="2" charset="0"/>
                   <a:cs typeface="Helvetica Neue" panose="02000503000000020004" pitchFamily="2" charset="0"/>
                 </a:rPr>
-                <a:t>A. Tempo (IOIs)</a:t>
+                <a:t>D. Articulation (sound duration)</a:t>
               </a:r>
             </a:p>
           </p:txBody>
         </p:sp>
         <p:sp>
           <p:nvSpPr>
-            <p:cNvPr id="18" name="TextBox 17">
+            <p:cNvPr id="47" name="TextBox 46">
               <a:extLst>
                 <a:ext uri="{FF2B5EF4-FFF2-40B4-BE49-F238E27FC236}">
-                  <a16:creationId xmlns:a16="http://schemas.microsoft.com/office/drawing/2014/main" id="{2D953C7F-4753-2790-C427-42821505D065}"/>
+                  <a16:creationId xmlns:a16="http://schemas.microsoft.com/office/drawing/2014/main" id="{1EC7812E-6DFD-90D3-AF5D-6D71FBAF4671}"/>
                 </a:ext>
               </a:extLst>
             </p:cNvPr>
@@ -3893,8 +3750,82 @@
           </p:nvSpPr>
           <p:spPr>
             <a:xfrm>
-              <a:off x="3409749" y="530328"/>
-              <a:ext cx="1473860" cy="461665"/>
+              <a:off x="3404506" y="3532041"/>
+              <a:ext cx="1839847" cy="646331"/>
+            </a:xfrm>
+            <a:prstGeom prst="rect">
+              <a:avLst/>
+            </a:prstGeom>
+            <a:noFill/>
+          </p:spPr>
+          <p:txBody>
+            <a:bodyPr wrap="square" rtlCol="0">
+              <a:spAutoFit/>
+            </a:bodyPr>
+            <a:lstStyle/>
+            <a:p>
+              <a:r>
+                <a:rPr lang="en-US" sz="1200" dirty="0">
+                  <a:latin typeface="HelveticaNeueLT Std Cn" panose="020B0506030502030204" pitchFamily="34" charset="77"/>
+                </a:rPr>
+                <a:t>16 instances for D were generated by averaging three of</a:t>
+              </a:r>
+            </a:p>
+            <a:p>
+              <a:r>
+                <a:rPr lang="en-US" sz="1200" dirty="0">
+                  <a:latin typeface="HelveticaNeueLT Std Cn" panose="020B0506030502030204" pitchFamily="34" charset="77"/>
+                </a:rPr>
+                <a:t>the articulation performance feature of </a:t>
+              </a:r>
+              <a:r>
+                <a:rPr lang="en-US" sz="1200" b="1" dirty="0">
+                  <a:latin typeface="Helvetica Neue Condensed" panose="02000503000000020004" pitchFamily="2" charset="0"/>
+                  <a:ea typeface="Helvetica Neue Condensed" panose="02000503000000020004" pitchFamily="2" charset="0"/>
+                  <a:cs typeface="Helvetica Neue Condensed" panose="02000503000000020004" pitchFamily="2" charset="0"/>
+                </a:rPr>
+                <a:t>articulation performances</a:t>
+              </a:r>
+            </a:p>
+          </p:txBody>
+        </p:sp>
+      </p:grpSp>
+      <p:grpSp>
+        <p:nvGrpSpPr>
+          <p:cNvPr id="37" name="Group 36">
+            <a:extLst>
+              <a:ext uri="{FF2B5EF4-FFF2-40B4-BE49-F238E27FC236}">
+                <a16:creationId xmlns:a16="http://schemas.microsoft.com/office/drawing/2014/main" id="{DC618240-EBE4-560C-E705-30A7C87F2028}"/>
+              </a:ext>
+            </a:extLst>
+          </p:cNvPr>
+          <p:cNvGrpSpPr/>
+          <p:nvPr/>
+        </p:nvGrpSpPr>
+        <p:grpSpPr>
+          <a:xfrm>
+            <a:off x="3404506" y="4981123"/>
+            <a:ext cx="3602113" cy="1125928"/>
+            <a:chOff x="3399987" y="5952166"/>
+            <a:chExt cx="1709895" cy="1125928"/>
+          </a:xfrm>
+        </p:grpSpPr>
+        <p:sp>
+          <p:nvSpPr>
+            <p:cNvPr id="32" name="TextBox 31">
+              <a:extLst>
+                <a:ext uri="{FF2B5EF4-FFF2-40B4-BE49-F238E27FC236}">
+                  <a16:creationId xmlns:a16="http://schemas.microsoft.com/office/drawing/2014/main" id="{278168D9-9198-98CC-3B75-97413476FB48}"/>
+                </a:ext>
+              </a:extLst>
+            </p:cNvPr>
+            <p:cNvSpPr txBox="1"/>
+            <p:nvPr/>
+          </p:nvSpPr>
+          <p:spPr>
+            <a:xfrm>
+              <a:off x="3400236" y="5952166"/>
+              <a:ext cx="1473860" cy="276999"/>
             </a:xfrm>
             <a:prstGeom prst="rect">
               <a:avLst/>
@@ -3913,27 +3844,17 @@
                   <a:ea typeface="Helvetica Neue" panose="02000503000000020004" pitchFamily="2" charset="0"/>
                   <a:cs typeface="Helvetica Neue" panose="02000503000000020004" pitchFamily="2" charset="0"/>
                 </a:rPr>
-                <a:t>B. Articulation</a:t>
-              </a:r>
-            </a:p>
-            <a:p>
-              <a:r>
-                <a:rPr lang="en-US" sz="1200" dirty="0">
-                  <a:latin typeface="HelveticaNeueLT Std Cn" panose="020B0506030502030204" pitchFamily="34" charset="77"/>
-                  <a:ea typeface="Helvetica Neue" panose="02000503000000020004" pitchFamily="2" charset="0"/>
-                  <a:cs typeface="Helvetica Neue" panose="02000503000000020004" pitchFamily="2" charset="0"/>
-                </a:rPr>
-                <a:t>(sound duration)</a:t>
+                <a:t>E. Dynamics (velocity profiles)</a:t>
               </a:r>
             </a:p>
           </p:txBody>
         </p:sp>
         <p:sp>
           <p:nvSpPr>
-            <p:cNvPr id="19" name="TextBox 18">
+            <p:cNvPr id="48" name="TextBox 47">
               <a:extLst>
                 <a:ext uri="{FF2B5EF4-FFF2-40B4-BE49-F238E27FC236}">
-                  <a16:creationId xmlns:a16="http://schemas.microsoft.com/office/drawing/2014/main" id="{1CE18468-B01D-1BC2-CC26-1A9ADA993B3D}"/>
+                  <a16:creationId xmlns:a16="http://schemas.microsoft.com/office/drawing/2014/main" id="{CF181584-C2CF-4F4C-CB02-993675972139}"/>
                 </a:ext>
               </a:extLst>
             </p:cNvPr>
@@ -3942,8 +3863,8 @@
           </p:nvSpPr>
           <p:spPr>
             <a:xfrm>
-              <a:off x="3409747" y="923788"/>
-              <a:ext cx="1473862" cy="461665"/>
+              <a:off x="3399987" y="6431763"/>
+              <a:ext cx="1709895" cy="646331"/>
             </a:xfrm>
             <a:prstGeom prst="rect">
               <a:avLst/>
@@ -3959,508 +3880,188 @@
               <a:r>
                 <a:rPr lang="en-US" sz="1200" dirty="0">
                   <a:latin typeface="HelveticaNeueLT Std Cn" panose="020B0506030502030204" pitchFamily="34" charset="77"/>
-                  <a:ea typeface="Helvetica Neue" panose="02000503000000020004" pitchFamily="2" charset="0"/>
-                  <a:cs typeface="Helvetica Neue" panose="02000503000000020004" pitchFamily="2" charset="0"/>
                 </a:rPr>
-                <a:t>C. Dynamics</a:t>
+                <a:t>16 instances for E were generated by averaging three of</a:t>
               </a:r>
             </a:p>
             <a:p>
               <a:r>
                 <a:rPr lang="en-US" sz="1200" dirty="0">
                   <a:latin typeface="HelveticaNeueLT Std Cn" panose="020B0506030502030204" pitchFamily="34" charset="77"/>
-                  <a:ea typeface="Helvetica Neue" panose="02000503000000020004" pitchFamily="2" charset="0"/>
-                  <a:cs typeface="Helvetica Neue" panose="02000503000000020004" pitchFamily="2" charset="0"/>
                 </a:rPr>
-                <a:t>(velocity profiles)</a:t>
+                <a:t>the dynamics performance feature of </a:t>
+              </a:r>
+              <a:r>
+                <a:rPr lang="en-US" sz="1200" b="1" dirty="0">
+                  <a:latin typeface="Helvetica Neue Condensed" panose="02000503000000020004" pitchFamily="2" charset="0"/>
+                  <a:ea typeface="Helvetica Neue Condensed" panose="02000503000000020004" pitchFamily="2" charset="0"/>
+                  <a:cs typeface="Helvetica Neue Condensed" panose="02000503000000020004" pitchFamily="2" charset="0"/>
+                </a:rPr>
+                <a:t>dynamics performances</a:t>
               </a:r>
             </a:p>
           </p:txBody>
         </p:sp>
       </p:grpSp>
-      <p:sp>
-        <p:nvSpPr>
-          <p:cNvPr id="30" name="TextBox 29">
+      <p:grpSp>
+        <p:nvGrpSpPr>
+          <p:cNvPr id="34" name="Group 33">
             <a:extLst>
               <a:ext uri="{FF2B5EF4-FFF2-40B4-BE49-F238E27FC236}">
-                <a16:creationId xmlns:a16="http://schemas.microsoft.com/office/drawing/2014/main" id="{0341CDE9-3827-A566-6110-8695142AD759}"/>
+                <a16:creationId xmlns:a16="http://schemas.microsoft.com/office/drawing/2014/main" id="{0CCF7B59-B72C-AF92-3D9E-DF33B5A8ECB5}"/>
               </a:ext>
             </a:extLst>
           </p:cNvPr>
-          <p:cNvSpPr txBox="1"/>
+          <p:cNvGrpSpPr/>
           <p:nvPr/>
-        </p:nvSpPr>
-        <p:spPr>
+        </p:nvGrpSpPr>
+        <p:grpSpPr>
           <a:xfrm>
-            <a:off x="3408737" y="2581657"/>
-            <a:ext cx="1473860" cy="461665"/>
+            <a:off x="2602552" y="1076362"/>
+            <a:ext cx="648638" cy="730506"/>
+            <a:chOff x="2537929" y="1058415"/>
+            <a:chExt cx="648638" cy="730506"/>
           </a:xfrm>
-          <a:prstGeom prst="rect">
-            <a:avLst/>
-          </a:prstGeom>
-          <a:noFill/>
-        </p:spPr>
-        <p:txBody>
-          <a:bodyPr wrap="square" rtlCol="0">
-            <a:spAutoFit/>
-          </a:bodyPr>
-          <a:lstStyle/>
-          <a:p>
-            <a:r>
-              <a:rPr lang="en-US" sz="1200" dirty="0">
-                <a:latin typeface="HelveticaNeueLT Std Cn" panose="020B0506030502030204" pitchFamily="34" charset="77"/>
-                <a:ea typeface="Helvetica Neue" panose="02000503000000020004" pitchFamily="2" charset="0"/>
-                <a:cs typeface="Helvetica Neue" panose="02000503000000020004" pitchFamily="2" charset="0"/>
-              </a:rPr>
-              <a:t>D. Articulation</a:t>
-            </a:r>
-          </a:p>
-          <a:p>
-            <a:r>
-              <a:rPr lang="en-US" sz="1200" dirty="0">
-                <a:latin typeface="HelveticaNeueLT Std Cn" panose="020B0506030502030204" pitchFamily="34" charset="77"/>
-                <a:ea typeface="Helvetica Neue" panose="02000503000000020004" pitchFamily="2" charset="0"/>
-                <a:cs typeface="Helvetica Neue" panose="02000503000000020004" pitchFamily="2" charset="0"/>
-              </a:rPr>
-              <a:t>(sound duration)</a:t>
-            </a:r>
-          </a:p>
-        </p:txBody>
-      </p:sp>
-      <p:sp>
-        <p:nvSpPr>
-          <p:cNvPr id="32" name="TextBox 31">
-            <a:extLst>
-              <a:ext uri="{FF2B5EF4-FFF2-40B4-BE49-F238E27FC236}">
-                <a16:creationId xmlns:a16="http://schemas.microsoft.com/office/drawing/2014/main" id="{278168D9-9198-98CC-3B75-97413476FB48}"/>
-              </a:ext>
-            </a:extLst>
-          </p:cNvPr>
-          <p:cNvSpPr txBox="1"/>
-          <p:nvPr/>
-        </p:nvSpPr>
-        <p:spPr>
-          <a:xfrm>
-            <a:off x="3400236" y="4006824"/>
-            <a:ext cx="1473860" cy="461665"/>
-          </a:xfrm>
-          <a:prstGeom prst="rect">
-            <a:avLst/>
-          </a:prstGeom>
-          <a:noFill/>
-        </p:spPr>
-        <p:txBody>
-          <a:bodyPr wrap="square" rtlCol="0">
-            <a:spAutoFit/>
-          </a:bodyPr>
-          <a:lstStyle/>
-          <a:p>
-            <a:r>
-              <a:rPr lang="en-US" sz="1200" dirty="0">
-                <a:latin typeface="HelveticaNeueLT Std Cn" panose="020B0506030502030204" pitchFamily="34" charset="77"/>
-                <a:ea typeface="Helvetica Neue" panose="02000503000000020004" pitchFamily="2" charset="0"/>
-                <a:cs typeface="Helvetica Neue" panose="02000503000000020004" pitchFamily="2" charset="0"/>
-              </a:rPr>
-              <a:t>E. Dynamics</a:t>
-            </a:r>
-          </a:p>
-          <a:p>
-            <a:r>
-              <a:rPr lang="en-US" sz="1200" dirty="0">
-                <a:latin typeface="HelveticaNeueLT Std Cn" panose="020B0506030502030204" pitchFamily="34" charset="77"/>
-                <a:ea typeface="Helvetica Neue" panose="02000503000000020004" pitchFamily="2" charset="0"/>
-                <a:cs typeface="Helvetica Neue" panose="02000503000000020004" pitchFamily="2" charset="0"/>
-              </a:rPr>
-              <a:t>(velocity profiles)</a:t>
-            </a:r>
-          </a:p>
-        </p:txBody>
-      </p:sp>
-      <p:sp>
-        <p:nvSpPr>
-          <p:cNvPr id="33" name="TextBox 32">
-            <a:extLst>
-              <a:ext uri="{FF2B5EF4-FFF2-40B4-BE49-F238E27FC236}">
-                <a16:creationId xmlns:a16="http://schemas.microsoft.com/office/drawing/2014/main" id="{81B9C5F0-743B-3AA1-E8BE-DAADF742B755}"/>
-              </a:ext>
-            </a:extLst>
-          </p:cNvPr>
-          <p:cNvSpPr txBox="1"/>
-          <p:nvPr/>
-        </p:nvSpPr>
-        <p:spPr>
-          <a:xfrm>
-            <a:off x="5244353" y="1036818"/>
-            <a:ext cx="2178539" cy="2123658"/>
-          </a:xfrm>
-          <a:prstGeom prst="rect">
-            <a:avLst/>
-          </a:prstGeom>
-          <a:noFill/>
-          <a:ln w="38100">
-            <a:noFill/>
-          </a:ln>
-        </p:spPr>
-        <p:txBody>
-          <a:bodyPr wrap="square" rtlCol="0">
-            <a:spAutoFit/>
-          </a:bodyPr>
-          <a:lstStyle/>
-          <a:p>
-            <a:r>
-              <a:rPr lang="en-US" sz="1200" dirty="0">
-                <a:latin typeface="HelveticaNeueLT Std Cn" panose="020B0506030502030204" pitchFamily="34" charset="77"/>
-                <a:ea typeface="Helvetica Neue" panose="02000503000000020004" pitchFamily="2" charset="0"/>
-                <a:cs typeface="Helvetica Neue" panose="02000503000000020004" pitchFamily="2" charset="0"/>
-              </a:rPr>
-              <a:t>None recordings (16 instances)</a:t>
-            </a:r>
-          </a:p>
-          <a:p>
-            <a:r>
-              <a:rPr lang="en-US" sz="1200" dirty="0">
-                <a:latin typeface="HelveticaNeueLT Std Cn" panose="020B0506030502030204" pitchFamily="34" charset="77"/>
-                <a:ea typeface="Helvetica Neue" panose="02000503000000020004" pitchFamily="2" charset="0"/>
-                <a:cs typeface="Helvetica Neue" panose="02000503000000020004" pitchFamily="2" charset="0"/>
-              </a:rPr>
-              <a:t> - Combine A, B, C</a:t>
-            </a:r>
-          </a:p>
-          <a:p>
-            <a:endParaRPr lang="en-US" sz="1200" dirty="0">
-              <a:latin typeface="HelveticaNeueLT Std Cn" panose="020B0506030502030204" pitchFamily="34" charset="77"/>
-              <a:ea typeface="Helvetica Neue" panose="02000503000000020004" pitchFamily="2" charset="0"/>
-              <a:cs typeface="Helvetica Neue" panose="02000503000000020004" pitchFamily="2" charset="0"/>
-            </a:endParaRPr>
-          </a:p>
-          <a:p>
-            <a:r>
-              <a:rPr lang="en-US" sz="1200" dirty="0">
-                <a:latin typeface="HelveticaNeueLT Std Cn" panose="020B0506030502030204" pitchFamily="34" charset="77"/>
-                <a:ea typeface="Helvetica Neue" panose="02000503000000020004" pitchFamily="2" charset="0"/>
-                <a:cs typeface="Helvetica Neue" panose="02000503000000020004" pitchFamily="2" charset="0"/>
-              </a:rPr>
-              <a:t>Art-only recordings (16 instances)</a:t>
-            </a:r>
-          </a:p>
-          <a:p>
-            <a:r>
-              <a:rPr lang="en-US" sz="1200" dirty="0">
-                <a:latin typeface="HelveticaNeueLT Std Cn" panose="020B0506030502030204" pitchFamily="34" charset="77"/>
-                <a:ea typeface="Helvetica Neue" panose="02000503000000020004" pitchFamily="2" charset="0"/>
-                <a:cs typeface="Helvetica Neue" panose="02000503000000020004" pitchFamily="2" charset="0"/>
-              </a:rPr>
-              <a:t> - Combine A, </a:t>
-            </a:r>
-            <a:r>
-              <a:rPr lang="en-US" sz="1200" dirty="0">
-                <a:solidFill>
-                  <a:srgbClr val="FF0000"/>
-                </a:solidFill>
-                <a:latin typeface="HelveticaNeueLT Std Cn" panose="020B0506030502030204" pitchFamily="34" charset="77"/>
-                <a:ea typeface="Helvetica Neue" panose="02000503000000020004" pitchFamily="2" charset="0"/>
-                <a:cs typeface="Helvetica Neue" panose="02000503000000020004" pitchFamily="2" charset="0"/>
-              </a:rPr>
-              <a:t>D</a:t>
-            </a:r>
-            <a:r>
-              <a:rPr lang="en-US" sz="1200" dirty="0">
-                <a:latin typeface="HelveticaNeueLT Std Cn" panose="020B0506030502030204" pitchFamily="34" charset="77"/>
-                <a:ea typeface="Helvetica Neue" panose="02000503000000020004" pitchFamily="2" charset="0"/>
-                <a:cs typeface="Helvetica Neue" panose="02000503000000020004" pitchFamily="2" charset="0"/>
-              </a:rPr>
-              <a:t>, C</a:t>
-            </a:r>
-          </a:p>
-          <a:p>
-            <a:endParaRPr lang="en-US" sz="1200" dirty="0">
-              <a:latin typeface="HelveticaNeueLT Std Cn" panose="020B0506030502030204" pitchFamily="34" charset="77"/>
-              <a:ea typeface="Helvetica Neue" panose="02000503000000020004" pitchFamily="2" charset="0"/>
-              <a:cs typeface="Helvetica Neue" panose="02000503000000020004" pitchFamily="2" charset="0"/>
-            </a:endParaRPr>
-          </a:p>
-          <a:p>
-            <a:r>
-              <a:rPr lang="en-US" sz="1200" dirty="0" err="1">
-                <a:latin typeface="HelveticaNeueLT Std Cn" panose="020B0506030502030204" pitchFamily="34" charset="77"/>
-                <a:ea typeface="Helvetica Neue" panose="02000503000000020004" pitchFamily="2" charset="0"/>
-                <a:cs typeface="Helvetica Neue" panose="02000503000000020004" pitchFamily="2" charset="0"/>
-              </a:rPr>
-              <a:t>Dyn</a:t>
-            </a:r>
-            <a:r>
-              <a:rPr lang="en-US" sz="1200" dirty="0">
-                <a:latin typeface="HelveticaNeueLT Std Cn" panose="020B0506030502030204" pitchFamily="34" charset="77"/>
-                <a:ea typeface="Helvetica Neue" panose="02000503000000020004" pitchFamily="2" charset="0"/>
-                <a:cs typeface="Helvetica Neue" panose="02000503000000020004" pitchFamily="2" charset="0"/>
-              </a:rPr>
-              <a:t>-only recordings (16 instances)</a:t>
-            </a:r>
-          </a:p>
-          <a:p>
-            <a:r>
-              <a:rPr lang="en-US" sz="1200" dirty="0">
-                <a:latin typeface="HelveticaNeueLT Std Cn" panose="020B0506030502030204" pitchFamily="34" charset="77"/>
-                <a:ea typeface="Helvetica Neue" panose="02000503000000020004" pitchFamily="2" charset="0"/>
-                <a:cs typeface="Helvetica Neue" panose="02000503000000020004" pitchFamily="2" charset="0"/>
-              </a:rPr>
-              <a:t> - Combine A, B, </a:t>
-            </a:r>
-            <a:r>
-              <a:rPr lang="en-US" sz="1200" dirty="0">
-                <a:solidFill>
-                  <a:srgbClr val="FF0000"/>
-                </a:solidFill>
-                <a:latin typeface="HelveticaNeueLT Std Cn" panose="020B0506030502030204" pitchFamily="34" charset="77"/>
-                <a:ea typeface="Helvetica Neue" panose="02000503000000020004" pitchFamily="2" charset="0"/>
-                <a:cs typeface="Helvetica Neue" panose="02000503000000020004" pitchFamily="2" charset="0"/>
-              </a:rPr>
-              <a:t>E</a:t>
-            </a:r>
-          </a:p>
-          <a:p>
-            <a:endParaRPr lang="en-US" sz="1200" dirty="0">
+        </p:grpSpPr>
+        <p:cxnSp>
+          <p:nvCxnSpPr>
+            <p:cNvPr id="14" name="Straight Arrow Connector 13">
+              <a:extLst>
+                <a:ext uri="{FF2B5EF4-FFF2-40B4-BE49-F238E27FC236}">
+                  <a16:creationId xmlns:a16="http://schemas.microsoft.com/office/drawing/2014/main" id="{271DC662-046B-DE20-DFE4-33E17E4A707A}"/>
+                </a:ext>
+              </a:extLst>
+            </p:cNvPr>
+            <p:cNvCxnSpPr>
+              <a:cxnSpLocks/>
+            </p:cNvCxnSpPr>
+            <p:nvPr/>
+          </p:nvCxnSpPr>
+          <p:spPr>
+            <a:xfrm>
+              <a:off x="2537929" y="1420411"/>
+              <a:ext cx="639673" cy="0"/>
+            </a:xfrm>
+            <a:prstGeom prst="straightConnector1">
+              <a:avLst/>
+            </a:prstGeom>
+            <a:ln w="76200">
               <a:solidFill>
-                <a:srgbClr val="FF0000"/>
+                <a:schemeClr val="bg1">
+                  <a:lumMod val="50000"/>
+                </a:schemeClr>
               </a:solidFill>
-              <a:latin typeface="HelveticaNeueLT Std Cn" panose="020B0506030502030204" pitchFamily="34" charset="77"/>
-              <a:ea typeface="Helvetica Neue" panose="02000503000000020004" pitchFamily="2" charset="0"/>
-              <a:cs typeface="Helvetica Neue" panose="02000503000000020004" pitchFamily="2" charset="0"/>
-            </a:endParaRPr>
-          </a:p>
-          <a:p>
-            <a:r>
-              <a:rPr lang="en-US" sz="1200" dirty="0">
-                <a:latin typeface="HelveticaNeueLT Std Cn" panose="020B0506030502030204" pitchFamily="34" charset="77"/>
-                <a:ea typeface="Helvetica Neue" panose="02000503000000020004" pitchFamily="2" charset="0"/>
-                <a:cs typeface="Helvetica Neue" panose="02000503000000020004" pitchFamily="2" charset="0"/>
-              </a:rPr>
-              <a:t>Both recordings (16 instances)</a:t>
-            </a:r>
-          </a:p>
-          <a:p>
-            <a:r>
-              <a:rPr lang="en-US" sz="1200" dirty="0">
-                <a:latin typeface="HelveticaNeueLT Std Cn" panose="020B0506030502030204" pitchFamily="34" charset="77"/>
-                <a:ea typeface="Helvetica Neue" panose="02000503000000020004" pitchFamily="2" charset="0"/>
-                <a:cs typeface="Helvetica Neue" panose="02000503000000020004" pitchFamily="2" charset="0"/>
-              </a:rPr>
-              <a:t> - Combine A, </a:t>
-            </a:r>
-            <a:r>
-              <a:rPr lang="en-US" sz="1200" dirty="0">
-                <a:solidFill>
-                  <a:srgbClr val="FF0000"/>
-                </a:solidFill>
-                <a:latin typeface="HelveticaNeueLT Std Cn" panose="020B0506030502030204" pitchFamily="34" charset="77"/>
-                <a:ea typeface="Helvetica Neue" panose="02000503000000020004" pitchFamily="2" charset="0"/>
-                <a:cs typeface="Helvetica Neue" panose="02000503000000020004" pitchFamily="2" charset="0"/>
-              </a:rPr>
-              <a:t>D</a:t>
-            </a:r>
-            <a:r>
-              <a:rPr lang="en-US" sz="1200" dirty="0">
-                <a:latin typeface="HelveticaNeueLT Std Cn" panose="020B0506030502030204" pitchFamily="34" charset="77"/>
-                <a:ea typeface="Helvetica Neue" panose="02000503000000020004" pitchFamily="2" charset="0"/>
-                <a:cs typeface="Helvetica Neue" panose="02000503000000020004" pitchFamily="2" charset="0"/>
-              </a:rPr>
-              <a:t>, </a:t>
-            </a:r>
-            <a:r>
-              <a:rPr lang="en-US" sz="1200" dirty="0">
-                <a:solidFill>
-                  <a:srgbClr val="FF0000"/>
-                </a:solidFill>
-                <a:latin typeface="HelveticaNeueLT Std Cn" panose="020B0506030502030204" pitchFamily="34" charset="77"/>
-                <a:ea typeface="Helvetica Neue" panose="02000503000000020004" pitchFamily="2" charset="0"/>
-                <a:cs typeface="Helvetica Neue" panose="02000503000000020004" pitchFamily="2" charset="0"/>
-              </a:rPr>
-              <a:t>E</a:t>
-            </a:r>
-          </a:p>
-        </p:txBody>
-      </p:sp>
-      <p:sp>
-        <p:nvSpPr>
-          <p:cNvPr id="46" name="TextBox 45">
-            <a:extLst>
-              <a:ext uri="{FF2B5EF4-FFF2-40B4-BE49-F238E27FC236}">
-                <a16:creationId xmlns:a16="http://schemas.microsoft.com/office/drawing/2014/main" id="{A12B3245-4E7F-2995-6833-C60B8FBEEA32}"/>
-              </a:ext>
-            </a:extLst>
-          </p:cNvPr>
-          <p:cNvSpPr txBox="1"/>
-          <p:nvPr/>
-        </p:nvSpPr>
-        <p:spPr>
-          <a:xfrm>
-            <a:off x="3413696" y="1429827"/>
-            <a:ext cx="1473860" cy="900246"/>
-          </a:xfrm>
-          <a:prstGeom prst="rect">
-            <a:avLst/>
-          </a:prstGeom>
-          <a:noFill/>
-        </p:spPr>
-        <p:txBody>
-          <a:bodyPr wrap="square" rtlCol="0">
-            <a:spAutoFit/>
-          </a:bodyPr>
-          <a:lstStyle/>
-          <a:p>
-            <a:r>
-              <a:rPr lang="en-US" sz="1050" dirty="0">
-                <a:latin typeface="HelveticaNeueLT Std Cn" panose="020B0506030502030204" pitchFamily="34" charset="77"/>
-              </a:rPr>
-              <a:t>16 instances for A, B, C were generated by averaging three of each performance feature of </a:t>
-            </a:r>
-            <a:r>
-              <a:rPr lang="en-US" sz="1050" b="1" dirty="0">
-                <a:latin typeface="Helvetica Neue Condensed" panose="02000503000000020004" pitchFamily="2" charset="0"/>
-                <a:ea typeface="Helvetica Neue Condensed" panose="02000503000000020004" pitchFamily="2" charset="0"/>
-                <a:cs typeface="Helvetica Neue Condensed" panose="02000503000000020004" pitchFamily="2" charset="0"/>
-              </a:rPr>
-              <a:t>baseline performances</a:t>
-            </a:r>
-          </a:p>
-        </p:txBody>
-      </p:sp>
-      <p:sp>
-        <p:nvSpPr>
-          <p:cNvPr id="47" name="TextBox 46">
-            <a:extLst>
-              <a:ext uri="{FF2B5EF4-FFF2-40B4-BE49-F238E27FC236}">
-                <a16:creationId xmlns:a16="http://schemas.microsoft.com/office/drawing/2014/main" id="{1EC7812E-6DFD-90D3-AF5D-6D71FBAF4671}"/>
-              </a:ext>
-            </a:extLst>
-          </p:cNvPr>
-          <p:cNvSpPr txBox="1"/>
-          <p:nvPr/>
-        </p:nvSpPr>
-        <p:spPr>
-          <a:xfrm>
-            <a:off x="3404506" y="3021052"/>
-            <a:ext cx="1839847" cy="738664"/>
-          </a:xfrm>
-          <a:prstGeom prst="rect">
-            <a:avLst/>
-          </a:prstGeom>
-          <a:noFill/>
-        </p:spPr>
-        <p:txBody>
-          <a:bodyPr wrap="square" rtlCol="0">
-            <a:spAutoFit/>
-          </a:bodyPr>
-          <a:lstStyle/>
-          <a:p>
-            <a:r>
-              <a:rPr lang="en-US" sz="1050" dirty="0">
-                <a:latin typeface="HelveticaNeueLT Std Cn" panose="020B0506030502030204" pitchFamily="34" charset="77"/>
-              </a:rPr>
-              <a:t>16 instances for D were generated by averaging the articulation performance feature of </a:t>
-            </a:r>
-            <a:r>
-              <a:rPr lang="en-US" sz="1050" b="1" dirty="0">
-                <a:latin typeface="Helvetica Neue Condensed" panose="02000503000000020004" pitchFamily="2" charset="0"/>
-                <a:ea typeface="Helvetica Neue Condensed" panose="02000503000000020004" pitchFamily="2" charset="0"/>
-                <a:cs typeface="Helvetica Neue Condensed" panose="02000503000000020004" pitchFamily="2" charset="0"/>
-              </a:rPr>
-              <a:t>articulation performances</a:t>
-            </a:r>
-          </a:p>
-        </p:txBody>
-      </p:sp>
-      <p:sp>
-        <p:nvSpPr>
-          <p:cNvPr id="48" name="TextBox 47">
-            <a:extLst>
-              <a:ext uri="{FF2B5EF4-FFF2-40B4-BE49-F238E27FC236}">
-                <a16:creationId xmlns:a16="http://schemas.microsoft.com/office/drawing/2014/main" id="{CF181584-C2CF-4F4C-CB02-993675972139}"/>
-              </a:ext>
-            </a:extLst>
-          </p:cNvPr>
-          <p:cNvSpPr txBox="1"/>
-          <p:nvPr/>
-        </p:nvSpPr>
-        <p:spPr>
-          <a:xfrm>
-            <a:off x="3399987" y="4468491"/>
-            <a:ext cx="1709895" cy="738664"/>
-          </a:xfrm>
-          <a:prstGeom prst="rect">
-            <a:avLst/>
-          </a:prstGeom>
-          <a:noFill/>
-        </p:spPr>
-        <p:txBody>
-          <a:bodyPr wrap="square" rtlCol="0">
-            <a:spAutoFit/>
-          </a:bodyPr>
-          <a:lstStyle/>
-          <a:p>
-            <a:r>
-              <a:rPr lang="en-US" sz="1050" dirty="0">
-                <a:latin typeface="HelveticaNeueLT Std Cn" panose="020B0506030502030204" pitchFamily="34" charset="77"/>
-              </a:rPr>
-              <a:t>16 instances for E were generated by averaging the dynamics performance feature of </a:t>
-            </a:r>
-            <a:r>
-              <a:rPr lang="en-US" sz="1050" b="1" dirty="0">
-                <a:latin typeface="Helvetica Neue Condensed" panose="02000503000000020004" pitchFamily="2" charset="0"/>
-                <a:ea typeface="Helvetica Neue Condensed" panose="02000503000000020004" pitchFamily="2" charset="0"/>
-                <a:cs typeface="Helvetica Neue Condensed" panose="02000503000000020004" pitchFamily="2" charset="0"/>
-              </a:rPr>
-              <a:t>dynamics performances</a:t>
-            </a:r>
-          </a:p>
-        </p:txBody>
-      </p:sp>
-      <p:cxnSp>
-        <p:nvCxnSpPr>
-          <p:cNvPr id="3" name="Straight Arrow Connector 2">
-            <a:extLst>
-              <a:ext uri="{FF2B5EF4-FFF2-40B4-BE49-F238E27FC236}">
-                <a16:creationId xmlns:a16="http://schemas.microsoft.com/office/drawing/2014/main" id="{D9D58CE8-1A82-D980-E3C0-18F2A8B5878E}"/>
-              </a:ext>
-            </a:extLst>
-          </p:cNvPr>
-          <p:cNvCxnSpPr>
-            <a:cxnSpLocks/>
-          </p:cNvCxnSpPr>
-          <p:nvPr/>
-        </p:nvCxnSpPr>
-        <p:spPr>
-          <a:xfrm flipV="1">
-            <a:off x="2550843" y="1058415"/>
-            <a:ext cx="635724" cy="355674"/>
-          </a:xfrm>
-          <a:prstGeom prst="straightConnector1">
-            <a:avLst/>
-          </a:prstGeom>
-          <a:ln w="76200">
-            <a:solidFill>
-              <a:schemeClr val="bg1">
-                <a:lumMod val="50000"/>
-              </a:schemeClr>
-            </a:solidFill>
-            <a:tailEnd type="triangle"/>
-          </a:ln>
-        </p:spPr>
-        <p:style>
-          <a:lnRef idx="1">
-            <a:schemeClr val="accent1"/>
-          </a:lnRef>
-          <a:fillRef idx="0">
-            <a:schemeClr val="accent1"/>
-          </a:fillRef>
-          <a:effectRef idx="0">
-            <a:schemeClr val="accent1"/>
-          </a:effectRef>
-          <a:fontRef idx="minor">
-            <a:schemeClr val="tx1"/>
-          </a:fontRef>
-        </p:style>
-      </p:cxnSp>
+              <a:tailEnd type="triangle"/>
+            </a:ln>
+          </p:spPr>
+          <p:style>
+            <a:lnRef idx="1">
+              <a:schemeClr val="accent1"/>
+            </a:lnRef>
+            <a:fillRef idx="0">
+              <a:schemeClr val="accent1"/>
+            </a:fillRef>
+            <a:effectRef idx="0">
+              <a:schemeClr val="accent1"/>
+            </a:effectRef>
+            <a:fontRef idx="minor">
+              <a:schemeClr val="tx1"/>
+            </a:fontRef>
+          </p:style>
+        </p:cxnSp>
+        <p:cxnSp>
+          <p:nvCxnSpPr>
+            <p:cNvPr id="15" name="Straight Arrow Connector 14">
+              <a:extLst>
+                <a:ext uri="{FF2B5EF4-FFF2-40B4-BE49-F238E27FC236}">
+                  <a16:creationId xmlns:a16="http://schemas.microsoft.com/office/drawing/2014/main" id="{F239648D-000F-A74B-8F3E-63B6F6E12E7A}"/>
+                </a:ext>
+              </a:extLst>
+            </p:cNvPr>
+            <p:cNvCxnSpPr>
+              <a:cxnSpLocks/>
+            </p:cNvCxnSpPr>
+            <p:nvPr/>
+          </p:nvCxnSpPr>
+          <p:spPr>
+            <a:xfrm>
+              <a:off x="2550843" y="1433247"/>
+              <a:ext cx="635724" cy="355674"/>
+            </a:xfrm>
+            <a:prstGeom prst="straightConnector1">
+              <a:avLst/>
+            </a:prstGeom>
+            <a:ln w="76200">
+              <a:solidFill>
+                <a:schemeClr val="bg1">
+                  <a:lumMod val="50000"/>
+                </a:schemeClr>
+              </a:solidFill>
+              <a:tailEnd type="triangle"/>
+            </a:ln>
+          </p:spPr>
+          <p:style>
+            <a:lnRef idx="1">
+              <a:schemeClr val="accent1"/>
+            </a:lnRef>
+            <a:fillRef idx="0">
+              <a:schemeClr val="accent1"/>
+            </a:fillRef>
+            <a:effectRef idx="0">
+              <a:schemeClr val="accent1"/>
+            </a:effectRef>
+            <a:fontRef idx="minor">
+              <a:schemeClr val="tx1"/>
+            </a:fontRef>
+          </p:style>
+        </p:cxnSp>
+        <p:cxnSp>
+          <p:nvCxnSpPr>
+            <p:cNvPr id="3" name="Straight Arrow Connector 2">
+              <a:extLst>
+                <a:ext uri="{FF2B5EF4-FFF2-40B4-BE49-F238E27FC236}">
+                  <a16:creationId xmlns:a16="http://schemas.microsoft.com/office/drawing/2014/main" id="{D9D58CE8-1A82-D980-E3C0-18F2A8B5878E}"/>
+                </a:ext>
+              </a:extLst>
+            </p:cNvPr>
+            <p:cNvCxnSpPr>
+              <a:cxnSpLocks/>
+            </p:cNvCxnSpPr>
+            <p:nvPr/>
+          </p:nvCxnSpPr>
+          <p:spPr>
+            <a:xfrm flipV="1">
+              <a:off x="2550843" y="1058415"/>
+              <a:ext cx="635724" cy="355674"/>
+            </a:xfrm>
+            <a:prstGeom prst="straightConnector1">
+              <a:avLst/>
+            </a:prstGeom>
+            <a:ln w="76200">
+              <a:solidFill>
+                <a:schemeClr val="bg1">
+                  <a:lumMod val="50000"/>
+                </a:schemeClr>
+              </a:solidFill>
+              <a:tailEnd type="triangle"/>
+            </a:ln>
+          </p:spPr>
+          <p:style>
+            <a:lnRef idx="1">
+              <a:schemeClr val="accent1"/>
+            </a:lnRef>
+            <a:fillRef idx="0">
+              <a:schemeClr val="accent1"/>
+            </a:fillRef>
+            <a:effectRef idx="0">
+              <a:schemeClr val="accent1"/>
+            </a:effectRef>
+            <a:fontRef idx="minor">
+              <a:schemeClr val="tx1"/>
+            </a:fontRef>
+          </p:style>
+        </p:cxnSp>
+      </p:grpSp>
       <p:cxnSp>
         <p:nvCxnSpPr>
           <p:cNvPr id="6" name="Straight Arrow Connector 5">
@@ -4477,7 +4078,7 @@
         </p:nvCxnSpPr>
         <p:spPr>
           <a:xfrm>
-            <a:off x="2532328" y="4155310"/>
+            <a:off x="2611517" y="5129831"/>
             <a:ext cx="639673" cy="0"/>
           </a:xfrm>
           <a:prstGeom prst="straightConnector1">
@@ -4523,7 +4124,7 @@
         </p:nvCxnSpPr>
         <p:spPr>
           <a:xfrm>
-            <a:off x="2537929" y="2787654"/>
+            <a:off x="2611517" y="3320795"/>
             <a:ext cx="639673" cy="0"/>
           </a:xfrm>
           <a:prstGeom prst="straightConnector1">
@@ -4553,248 +4154,968 @@
           </a:fontRef>
         </p:style>
       </p:cxnSp>
-      <p:sp>
-        <p:nvSpPr>
-          <p:cNvPr id="8" name="TextBox 7">
+      <p:grpSp>
+        <p:nvGrpSpPr>
+          <p:cNvPr id="39" name="Group 38">
             <a:extLst>
               <a:ext uri="{FF2B5EF4-FFF2-40B4-BE49-F238E27FC236}">
-                <a16:creationId xmlns:a16="http://schemas.microsoft.com/office/drawing/2014/main" id="{425D7385-4E21-390F-D351-49A6CDEE953C}"/>
+                <a16:creationId xmlns:a16="http://schemas.microsoft.com/office/drawing/2014/main" id="{688CCF93-AFC5-A09C-48F5-16244DBFD013}"/>
               </a:ext>
             </a:extLst>
           </p:cNvPr>
-          <p:cNvSpPr txBox="1"/>
+          <p:cNvGrpSpPr/>
           <p:nvPr/>
-        </p:nvSpPr>
-        <p:spPr>
+        </p:nvGrpSpPr>
+        <p:grpSpPr>
           <a:xfrm>
-            <a:off x="5244353" y="214012"/>
-            <a:ext cx="2168988" cy="584775"/>
+            <a:off x="7153835" y="164112"/>
+            <a:ext cx="2178539" cy="2838886"/>
+            <a:chOff x="5244353" y="214012"/>
+            <a:chExt cx="2178539" cy="2838886"/>
           </a:xfrm>
-          <a:prstGeom prst="rect">
-            <a:avLst/>
-          </a:prstGeom>
-          <a:noFill/>
-        </p:spPr>
-        <p:txBody>
-          <a:bodyPr wrap="square" rtlCol="0">
-            <a:spAutoFit/>
-          </a:bodyPr>
-          <a:lstStyle/>
-          <a:p>
-            <a:r>
-              <a:rPr lang="en-US" sz="1600" b="1" dirty="0">
-                <a:latin typeface="Helvetica Neue Condensed" panose="02000503000000020004" pitchFamily="2" charset="0"/>
-                <a:ea typeface="Helvetica Neue Condensed" panose="02000503000000020004" pitchFamily="2" charset="0"/>
-                <a:cs typeface="Helvetica Neue Condensed" panose="02000503000000020004" pitchFamily="2" charset="0"/>
-              </a:rPr>
-              <a:t>(II) Combine</a:t>
-            </a:r>
-          </a:p>
-          <a:p>
-            <a:r>
-              <a:rPr lang="en-US" sz="1600" b="1" dirty="0">
-                <a:latin typeface="Helvetica Neue Condensed" panose="02000503000000020004" pitchFamily="2" charset="0"/>
-                <a:ea typeface="Helvetica Neue Condensed" panose="02000503000000020004" pitchFamily="2" charset="0"/>
-                <a:cs typeface="Helvetica Neue Condensed" panose="02000503000000020004" pitchFamily="2" charset="0"/>
-              </a:rPr>
-              <a:t>extracted features</a:t>
-            </a:r>
-          </a:p>
-        </p:txBody>
-      </p:sp>
-      <p:sp>
-        <p:nvSpPr>
-          <p:cNvPr id="9" name="TextBox 8">
+        </p:grpSpPr>
+        <p:sp>
+          <p:nvSpPr>
+            <p:cNvPr id="33" name="TextBox 32">
+              <a:extLst>
+                <a:ext uri="{FF2B5EF4-FFF2-40B4-BE49-F238E27FC236}">
+                  <a16:creationId xmlns:a16="http://schemas.microsoft.com/office/drawing/2014/main" id="{81B9C5F0-743B-3AA1-E8BE-DAADF742B755}"/>
+                </a:ext>
+              </a:extLst>
+            </p:cNvPr>
+            <p:cNvSpPr txBox="1"/>
+            <p:nvPr/>
+          </p:nvSpPr>
+          <p:spPr>
+            <a:xfrm>
+              <a:off x="5244353" y="929240"/>
+              <a:ext cx="2178539" cy="2123658"/>
+            </a:xfrm>
+            <a:prstGeom prst="rect">
+              <a:avLst/>
+            </a:prstGeom>
+            <a:noFill/>
+            <a:ln w="38100">
+              <a:noFill/>
+            </a:ln>
+          </p:spPr>
+          <p:txBody>
+            <a:bodyPr wrap="square" rtlCol="0">
+              <a:spAutoFit/>
+            </a:bodyPr>
+            <a:lstStyle/>
+            <a:p>
+              <a:r>
+                <a:rPr lang="en-US" sz="1200" dirty="0">
+                  <a:latin typeface="HelveticaNeueLT Std Cn" panose="020B0506030502030204" pitchFamily="34" charset="77"/>
+                  <a:ea typeface="Helvetica Neue" panose="02000503000000020004" pitchFamily="2" charset="0"/>
+                  <a:cs typeface="Helvetica Neue" panose="02000503000000020004" pitchFamily="2" charset="0"/>
+                </a:rPr>
+                <a:t>None recordings (16 instances)</a:t>
+              </a:r>
+            </a:p>
+            <a:p>
+              <a:r>
+                <a:rPr lang="en-US" sz="1200" dirty="0">
+                  <a:latin typeface="HelveticaNeueLT Std Cn" panose="020B0506030502030204" pitchFamily="34" charset="77"/>
+                  <a:ea typeface="Helvetica Neue" panose="02000503000000020004" pitchFamily="2" charset="0"/>
+                  <a:cs typeface="Helvetica Neue" panose="02000503000000020004" pitchFamily="2" charset="0"/>
+                </a:rPr>
+                <a:t> - Combine A, B, C</a:t>
+              </a:r>
+            </a:p>
+            <a:p>
+              <a:endParaRPr lang="en-US" sz="1200" dirty="0">
+                <a:latin typeface="HelveticaNeueLT Std Cn" panose="020B0506030502030204" pitchFamily="34" charset="77"/>
+                <a:ea typeface="Helvetica Neue" panose="02000503000000020004" pitchFamily="2" charset="0"/>
+                <a:cs typeface="Helvetica Neue" panose="02000503000000020004" pitchFamily="2" charset="0"/>
+              </a:endParaRPr>
+            </a:p>
+            <a:p>
+              <a:r>
+                <a:rPr lang="en-US" sz="1200" dirty="0">
+                  <a:latin typeface="HelveticaNeueLT Std Cn" panose="020B0506030502030204" pitchFamily="34" charset="77"/>
+                  <a:ea typeface="Helvetica Neue" panose="02000503000000020004" pitchFamily="2" charset="0"/>
+                  <a:cs typeface="Helvetica Neue" panose="02000503000000020004" pitchFamily="2" charset="0"/>
+                </a:rPr>
+                <a:t>Art-only recordings (16 instances)</a:t>
+              </a:r>
+            </a:p>
+            <a:p>
+              <a:r>
+                <a:rPr lang="en-US" sz="1200" dirty="0">
+                  <a:latin typeface="HelveticaNeueLT Std Cn" panose="020B0506030502030204" pitchFamily="34" charset="77"/>
+                  <a:ea typeface="Helvetica Neue" panose="02000503000000020004" pitchFamily="2" charset="0"/>
+                  <a:cs typeface="Helvetica Neue" panose="02000503000000020004" pitchFamily="2" charset="0"/>
+                </a:rPr>
+                <a:t> - Combine A, </a:t>
+              </a:r>
+              <a:r>
+                <a:rPr lang="en-US" sz="1200" dirty="0">
+                  <a:solidFill>
+                    <a:srgbClr val="FF0000"/>
+                  </a:solidFill>
+                  <a:latin typeface="HelveticaNeueLT Std Cn" panose="020B0506030502030204" pitchFamily="34" charset="77"/>
+                  <a:ea typeface="Helvetica Neue" panose="02000503000000020004" pitchFamily="2" charset="0"/>
+                  <a:cs typeface="Helvetica Neue" panose="02000503000000020004" pitchFamily="2" charset="0"/>
+                </a:rPr>
+                <a:t>D</a:t>
+              </a:r>
+              <a:r>
+                <a:rPr lang="en-US" sz="1200" dirty="0">
+                  <a:latin typeface="HelveticaNeueLT Std Cn" panose="020B0506030502030204" pitchFamily="34" charset="77"/>
+                  <a:ea typeface="Helvetica Neue" panose="02000503000000020004" pitchFamily="2" charset="0"/>
+                  <a:cs typeface="Helvetica Neue" panose="02000503000000020004" pitchFamily="2" charset="0"/>
+                </a:rPr>
+                <a:t>, C</a:t>
+              </a:r>
+            </a:p>
+            <a:p>
+              <a:endParaRPr lang="en-US" sz="1200" dirty="0">
+                <a:latin typeface="HelveticaNeueLT Std Cn" panose="020B0506030502030204" pitchFamily="34" charset="77"/>
+                <a:ea typeface="Helvetica Neue" panose="02000503000000020004" pitchFamily="2" charset="0"/>
+                <a:cs typeface="Helvetica Neue" panose="02000503000000020004" pitchFamily="2" charset="0"/>
+              </a:endParaRPr>
+            </a:p>
+            <a:p>
+              <a:r>
+                <a:rPr lang="en-US" sz="1200" dirty="0" err="1">
+                  <a:latin typeface="HelveticaNeueLT Std Cn" panose="020B0506030502030204" pitchFamily="34" charset="77"/>
+                  <a:ea typeface="Helvetica Neue" panose="02000503000000020004" pitchFamily="2" charset="0"/>
+                  <a:cs typeface="Helvetica Neue" panose="02000503000000020004" pitchFamily="2" charset="0"/>
+                </a:rPr>
+                <a:t>Dyn</a:t>
+              </a:r>
+              <a:r>
+                <a:rPr lang="en-US" sz="1200" dirty="0">
+                  <a:latin typeface="HelveticaNeueLT Std Cn" panose="020B0506030502030204" pitchFamily="34" charset="77"/>
+                  <a:ea typeface="Helvetica Neue" panose="02000503000000020004" pitchFamily="2" charset="0"/>
+                  <a:cs typeface="Helvetica Neue" panose="02000503000000020004" pitchFamily="2" charset="0"/>
+                </a:rPr>
+                <a:t>-only recordings (16 instances)</a:t>
+              </a:r>
+            </a:p>
+            <a:p>
+              <a:r>
+                <a:rPr lang="en-US" sz="1200" dirty="0">
+                  <a:latin typeface="HelveticaNeueLT Std Cn" panose="020B0506030502030204" pitchFamily="34" charset="77"/>
+                  <a:ea typeface="Helvetica Neue" panose="02000503000000020004" pitchFamily="2" charset="0"/>
+                  <a:cs typeface="Helvetica Neue" panose="02000503000000020004" pitchFamily="2" charset="0"/>
+                </a:rPr>
+                <a:t> - Combine A, B, </a:t>
+              </a:r>
+              <a:r>
+                <a:rPr lang="en-US" sz="1200" dirty="0">
+                  <a:solidFill>
+                    <a:srgbClr val="FF0000"/>
+                  </a:solidFill>
+                  <a:latin typeface="HelveticaNeueLT Std Cn" panose="020B0506030502030204" pitchFamily="34" charset="77"/>
+                  <a:ea typeface="Helvetica Neue" panose="02000503000000020004" pitchFamily="2" charset="0"/>
+                  <a:cs typeface="Helvetica Neue" panose="02000503000000020004" pitchFamily="2" charset="0"/>
+                </a:rPr>
+                <a:t>E</a:t>
+              </a:r>
+            </a:p>
+            <a:p>
+              <a:endParaRPr lang="en-US" sz="1200" dirty="0">
+                <a:solidFill>
+                  <a:srgbClr val="FF0000"/>
+                </a:solidFill>
+                <a:latin typeface="HelveticaNeueLT Std Cn" panose="020B0506030502030204" pitchFamily="34" charset="77"/>
+                <a:ea typeface="Helvetica Neue" panose="02000503000000020004" pitchFamily="2" charset="0"/>
+                <a:cs typeface="Helvetica Neue" panose="02000503000000020004" pitchFamily="2" charset="0"/>
+              </a:endParaRPr>
+            </a:p>
+            <a:p>
+              <a:r>
+                <a:rPr lang="en-US" sz="1200" dirty="0">
+                  <a:latin typeface="HelveticaNeueLT Std Cn" panose="020B0506030502030204" pitchFamily="34" charset="77"/>
+                  <a:ea typeface="Helvetica Neue" panose="02000503000000020004" pitchFamily="2" charset="0"/>
+                  <a:cs typeface="Helvetica Neue" panose="02000503000000020004" pitchFamily="2" charset="0"/>
+                </a:rPr>
+                <a:t>Both recordings (16 instances)</a:t>
+              </a:r>
+            </a:p>
+            <a:p>
+              <a:r>
+                <a:rPr lang="en-US" sz="1200" dirty="0">
+                  <a:latin typeface="HelveticaNeueLT Std Cn" panose="020B0506030502030204" pitchFamily="34" charset="77"/>
+                  <a:ea typeface="Helvetica Neue" panose="02000503000000020004" pitchFamily="2" charset="0"/>
+                  <a:cs typeface="Helvetica Neue" panose="02000503000000020004" pitchFamily="2" charset="0"/>
+                </a:rPr>
+                <a:t> - Combine A, </a:t>
+              </a:r>
+              <a:r>
+                <a:rPr lang="en-US" sz="1200" dirty="0">
+                  <a:solidFill>
+                    <a:srgbClr val="FF0000"/>
+                  </a:solidFill>
+                  <a:latin typeface="HelveticaNeueLT Std Cn" panose="020B0506030502030204" pitchFamily="34" charset="77"/>
+                  <a:ea typeface="Helvetica Neue" panose="02000503000000020004" pitchFamily="2" charset="0"/>
+                  <a:cs typeface="Helvetica Neue" panose="02000503000000020004" pitchFamily="2" charset="0"/>
+                </a:rPr>
+                <a:t>D</a:t>
+              </a:r>
+              <a:r>
+                <a:rPr lang="en-US" sz="1200" dirty="0">
+                  <a:latin typeface="HelveticaNeueLT Std Cn" panose="020B0506030502030204" pitchFamily="34" charset="77"/>
+                  <a:ea typeface="Helvetica Neue" panose="02000503000000020004" pitchFamily="2" charset="0"/>
+                  <a:cs typeface="Helvetica Neue" panose="02000503000000020004" pitchFamily="2" charset="0"/>
+                </a:rPr>
+                <a:t>, </a:t>
+              </a:r>
+              <a:r>
+                <a:rPr lang="en-US" sz="1200" dirty="0">
+                  <a:solidFill>
+                    <a:srgbClr val="FF0000"/>
+                  </a:solidFill>
+                  <a:latin typeface="HelveticaNeueLT Std Cn" panose="020B0506030502030204" pitchFamily="34" charset="77"/>
+                  <a:ea typeface="Helvetica Neue" panose="02000503000000020004" pitchFamily="2" charset="0"/>
+                  <a:cs typeface="Helvetica Neue" panose="02000503000000020004" pitchFamily="2" charset="0"/>
+                </a:rPr>
+                <a:t>E</a:t>
+              </a:r>
+            </a:p>
+          </p:txBody>
+        </p:sp>
+        <p:sp>
+          <p:nvSpPr>
+            <p:cNvPr id="8" name="TextBox 7">
+              <a:extLst>
+                <a:ext uri="{FF2B5EF4-FFF2-40B4-BE49-F238E27FC236}">
+                  <a16:creationId xmlns:a16="http://schemas.microsoft.com/office/drawing/2014/main" id="{425D7385-4E21-390F-D351-49A6CDEE953C}"/>
+                </a:ext>
+              </a:extLst>
+            </p:cNvPr>
+            <p:cNvSpPr txBox="1"/>
+            <p:nvPr/>
+          </p:nvSpPr>
+          <p:spPr>
+            <a:xfrm>
+              <a:off x="5244353" y="214012"/>
+              <a:ext cx="2168988" cy="584775"/>
+            </a:xfrm>
+            <a:prstGeom prst="rect">
+              <a:avLst/>
+            </a:prstGeom>
+            <a:noFill/>
+          </p:spPr>
+          <p:txBody>
+            <a:bodyPr wrap="square" rtlCol="0">
+              <a:spAutoFit/>
+            </a:bodyPr>
+            <a:lstStyle/>
+            <a:p>
+              <a:r>
+                <a:rPr lang="en-US" sz="1600" b="1" dirty="0">
+                  <a:latin typeface="Helvetica Neue Condensed" panose="02000503000000020004" pitchFamily="2" charset="0"/>
+                  <a:ea typeface="Helvetica Neue Condensed" panose="02000503000000020004" pitchFamily="2" charset="0"/>
+                  <a:cs typeface="Helvetica Neue Condensed" panose="02000503000000020004" pitchFamily="2" charset="0"/>
+                </a:rPr>
+                <a:t>(II) Combine</a:t>
+              </a:r>
+            </a:p>
+            <a:p>
+              <a:r>
+                <a:rPr lang="en-US" sz="1600" b="1" dirty="0">
+                  <a:latin typeface="Helvetica Neue Condensed" panose="02000503000000020004" pitchFamily="2" charset="0"/>
+                  <a:ea typeface="Helvetica Neue Condensed" panose="02000503000000020004" pitchFamily="2" charset="0"/>
+                  <a:cs typeface="Helvetica Neue Condensed" panose="02000503000000020004" pitchFamily="2" charset="0"/>
+                </a:rPr>
+                <a:t>extracted features</a:t>
+              </a:r>
+            </a:p>
+          </p:txBody>
+        </p:sp>
+      </p:grpSp>
+      <p:grpSp>
+        <p:nvGrpSpPr>
+          <p:cNvPr id="38" name="Group 37">
             <a:extLst>
               <a:ext uri="{FF2B5EF4-FFF2-40B4-BE49-F238E27FC236}">
-                <a16:creationId xmlns:a16="http://schemas.microsoft.com/office/drawing/2014/main" id="{1A9BDF46-7610-C991-C960-56E55F483F30}"/>
+                <a16:creationId xmlns:a16="http://schemas.microsoft.com/office/drawing/2014/main" id="{98E0041B-FFB7-E162-362E-5E4F57E5EAE4}"/>
               </a:ext>
             </a:extLst>
           </p:cNvPr>
-          <p:cNvSpPr txBox="1"/>
+          <p:cNvGrpSpPr/>
           <p:nvPr/>
-        </p:nvSpPr>
-        <p:spPr>
+        </p:nvGrpSpPr>
+        <p:grpSpPr>
           <a:xfrm>
-            <a:off x="7529187" y="1036818"/>
-            <a:ext cx="2178539" cy="2677656"/>
+            <a:off x="7144284" y="3208116"/>
+            <a:ext cx="2178539" cy="3406325"/>
+            <a:chOff x="7529187" y="209535"/>
+            <a:chExt cx="2178539" cy="3406325"/>
           </a:xfrm>
-          <a:prstGeom prst="rect">
-            <a:avLst/>
-          </a:prstGeom>
-          <a:noFill/>
-          <a:ln w="38100">
+        </p:grpSpPr>
+        <p:sp>
+          <p:nvSpPr>
+            <p:cNvPr id="9" name="TextBox 8">
+              <a:extLst>
+                <a:ext uri="{FF2B5EF4-FFF2-40B4-BE49-F238E27FC236}">
+                  <a16:creationId xmlns:a16="http://schemas.microsoft.com/office/drawing/2014/main" id="{1A9BDF46-7610-C991-C960-56E55F483F30}"/>
+                </a:ext>
+              </a:extLst>
+            </p:cNvPr>
+            <p:cNvSpPr txBox="1"/>
+            <p:nvPr/>
+          </p:nvSpPr>
+          <p:spPr>
+            <a:xfrm>
+              <a:off x="7529187" y="938204"/>
+              <a:ext cx="2178539" cy="2677656"/>
+            </a:xfrm>
+            <a:prstGeom prst="rect">
+              <a:avLst/>
+            </a:prstGeom>
             <a:noFill/>
-          </a:ln>
-        </p:spPr>
-        <p:txBody>
-          <a:bodyPr wrap="square" rtlCol="0">
-            <a:spAutoFit/>
-          </a:bodyPr>
-          <a:lstStyle/>
-          <a:p>
-            <a:r>
-              <a:rPr lang="en-US" sz="1200" dirty="0">
+            <a:ln w="38100">
+              <a:noFill/>
+            </a:ln>
+          </p:spPr>
+          <p:txBody>
+            <a:bodyPr wrap="square" rtlCol="0">
+              <a:spAutoFit/>
+            </a:bodyPr>
+            <a:lstStyle/>
+            <a:p>
+              <a:r>
+                <a:rPr lang="en-US" sz="1200" dirty="0">
+                  <a:latin typeface="HelveticaNeueLT Std Cn" panose="020B0506030502030204" pitchFamily="34" charset="77"/>
+                  <a:ea typeface="Helvetica Neue" panose="02000503000000020004" pitchFamily="2" charset="0"/>
+                  <a:cs typeface="Helvetica Neue" panose="02000503000000020004" pitchFamily="2" charset="0"/>
+                </a:rPr>
+                <a:t>None recordings (4 instances)</a:t>
+              </a:r>
+            </a:p>
+            <a:p>
+              <a:r>
+                <a:rPr lang="en-US" sz="1200" dirty="0">
+                  <a:latin typeface="HelveticaNeueLT Std Cn" panose="020B0506030502030204" pitchFamily="34" charset="77"/>
+                  <a:ea typeface="Helvetica Neue" panose="02000503000000020004" pitchFamily="2" charset="0"/>
+                  <a:cs typeface="Helvetica Neue" panose="02000503000000020004" pitchFamily="2" charset="0"/>
+                </a:rPr>
+                <a:t> - none_1, none_2, none_3, none_4</a:t>
+              </a:r>
+            </a:p>
+            <a:p>
+              <a:endParaRPr lang="en-US" sz="1200" dirty="0">
                 <a:latin typeface="HelveticaNeueLT Std Cn" panose="020B0506030502030204" pitchFamily="34" charset="77"/>
                 <a:ea typeface="Helvetica Neue" panose="02000503000000020004" pitchFamily="2" charset="0"/>
                 <a:cs typeface="Helvetica Neue" panose="02000503000000020004" pitchFamily="2" charset="0"/>
-              </a:rPr>
-              <a:t>None recordings (4 instances)</a:t>
-            </a:r>
-          </a:p>
-          <a:p>
-            <a:r>
-              <a:rPr lang="en-US" sz="1200" dirty="0">
+              </a:endParaRPr>
+            </a:p>
+            <a:p>
+              <a:r>
+                <a:rPr lang="en-US" sz="1200" dirty="0">
+                  <a:latin typeface="HelveticaNeueLT Std Cn" panose="020B0506030502030204" pitchFamily="34" charset="77"/>
+                  <a:ea typeface="Helvetica Neue" panose="02000503000000020004" pitchFamily="2" charset="0"/>
+                  <a:cs typeface="Helvetica Neue" panose="02000503000000020004" pitchFamily="2" charset="0"/>
+                </a:rPr>
+                <a:t>Art-only recordings (4 instances)</a:t>
+              </a:r>
+            </a:p>
+            <a:p>
+              <a:r>
+                <a:rPr lang="en-US" sz="1200" dirty="0">
+                  <a:latin typeface="HelveticaNeueLT Std Cn" panose="020B0506030502030204" pitchFamily="34" charset="77"/>
+                  <a:ea typeface="Helvetica Neue" panose="02000503000000020004" pitchFamily="2" charset="0"/>
+                  <a:cs typeface="Helvetica Neue" panose="02000503000000020004" pitchFamily="2" charset="0"/>
+                </a:rPr>
+                <a:t> - art_only_1, art_only_2, art_only_3, art_only_4</a:t>
+              </a:r>
+            </a:p>
+            <a:p>
+              <a:endParaRPr lang="en-US" sz="1200" dirty="0">
                 <a:latin typeface="HelveticaNeueLT Std Cn" panose="020B0506030502030204" pitchFamily="34" charset="77"/>
                 <a:ea typeface="Helvetica Neue" panose="02000503000000020004" pitchFamily="2" charset="0"/>
                 <a:cs typeface="Helvetica Neue" panose="02000503000000020004" pitchFamily="2" charset="0"/>
-              </a:rPr>
-              <a:t> - none_1, none_2, none_3, none_4</a:t>
-            </a:r>
-          </a:p>
-          <a:p>
-            <a:endParaRPr lang="en-US" sz="1200" dirty="0">
-              <a:latin typeface="HelveticaNeueLT Std Cn" panose="020B0506030502030204" pitchFamily="34" charset="77"/>
-              <a:ea typeface="Helvetica Neue" panose="02000503000000020004" pitchFamily="2" charset="0"/>
-              <a:cs typeface="Helvetica Neue" panose="02000503000000020004" pitchFamily="2" charset="0"/>
-            </a:endParaRPr>
-          </a:p>
-          <a:p>
-            <a:r>
-              <a:rPr lang="en-US" sz="1200" dirty="0">
+              </a:endParaRPr>
+            </a:p>
+            <a:p>
+              <a:r>
+                <a:rPr lang="en-US" sz="1200" dirty="0" err="1">
+                  <a:latin typeface="HelveticaNeueLT Std Cn" panose="020B0506030502030204" pitchFamily="34" charset="77"/>
+                  <a:ea typeface="Helvetica Neue" panose="02000503000000020004" pitchFamily="2" charset="0"/>
+                  <a:cs typeface="Helvetica Neue" panose="02000503000000020004" pitchFamily="2" charset="0"/>
+                </a:rPr>
+                <a:t>Dyn</a:t>
+              </a:r>
+              <a:r>
+                <a:rPr lang="en-US" sz="1200" dirty="0">
+                  <a:latin typeface="HelveticaNeueLT Std Cn" panose="020B0506030502030204" pitchFamily="34" charset="77"/>
+                  <a:ea typeface="Helvetica Neue" panose="02000503000000020004" pitchFamily="2" charset="0"/>
+                  <a:cs typeface="Helvetica Neue" panose="02000503000000020004" pitchFamily="2" charset="0"/>
+                </a:rPr>
+                <a:t>-only recordings (4 instances)</a:t>
+              </a:r>
+            </a:p>
+            <a:p>
+              <a:r>
+                <a:rPr lang="en-US" sz="1200" dirty="0">
+                  <a:latin typeface="HelveticaNeueLT Std Cn" panose="020B0506030502030204" pitchFamily="34" charset="77"/>
+                  <a:ea typeface="Helvetica Neue" panose="02000503000000020004" pitchFamily="2" charset="0"/>
+                  <a:cs typeface="Helvetica Neue" panose="02000503000000020004" pitchFamily="2" charset="0"/>
+                </a:rPr>
+                <a:t> - dyn_only_1, dyn_only_2, dyn_only_3, dyn_only_4</a:t>
+              </a:r>
+            </a:p>
+            <a:p>
+              <a:endParaRPr lang="en-US" sz="1200" dirty="0">
+                <a:solidFill>
+                  <a:srgbClr val="FF0000"/>
+                </a:solidFill>
                 <a:latin typeface="HelveticaNeueLT Std Cn" panose="020B0506030502030204" pitchFamily="34" charset="77"/>
                 <a:ea typeface="Helvetica Neue" panose="02000503000000020004" pitchFamily="2" charset="0"/>
                 <a:cs typeface="Helvetica Neue" panose="02000503000000020004" pitchFamily="2" charset="0"/>
-              </a:rPr>
-              <a:t>Art-only recordings (4 instances)</a:t>
-            </a:r>
-          </a:p>
-          <a:p>
-            <a:r>
-              <a:rPr lang="en-US" sz="1200" dirty="0">
-                <a:latin typeface="HelveticaNeueLT Std Cn" panose="020B0506030502030204" pitchFamily="34" charset="77"/>
-                <a:ea typeface="Helvetica Neue" panose="02000503000000020004" pitchFamily="2" charset="0"/>
-                <a:cs typeface="Helvetica Neue" panose="02000503000000020004" pitchFamily="2" charset="0"/>
-              </a:rPr>
-              <a:t> - art_only_1, art_only_2, art_only_3, art_only_4</a:t>
-            </a:r>
-          </a:p>
-          <a:p>
-            <a:endParaRPr lang="en-US" sz="1200" dirty="0">
-              <a:latin typeface="HelveticaNeueLT Std Cn" panose="020B0506030502030204" pitchFamily="34" charset="77"/>
-              <a:ea typeface="Helvetica Neue" panose="02000503000000020004" pitchFamily="2" charset="0"/>
-              <a:cs typeface="Helvetica Neue" panose="02000503000000020004" pitchFamily="2" charset="0"/>
-            </a:endParaRPr>
-          </a:p>
-          <a:p>
-            <a:r>
-              <a:rPr lang="en-US" sz="1200" dirty="0" err="1">
-                <a:latin typeface="HelveticaNeueLT Std Cn" panose="020B0506030502030204" pitchFamily="34" charset="77"/>
-                <a:ea typeface="Helvetica Neue" panose="02000503000000020004" pitchFamily="2" charset="0"/>
-                <a:cs typeface="Helvetica Neue" panose="02000503000000020004" pitchFamily="2" charset="0"/>
-              </a:rPr>
-              <a:t>Dyn</a:t>
-            </a:r>
-            <a:r>
-              <a:rPr lang="en-US" sz="1200" dirty="0">
-                <a:latin typeface="HelveticaNeueLT Std Cn" panose="020B0506030502030204" pitchFamily="34" charset="77"/>
-                <a:ea typeface="Helvetica Neue" panose="02000503000000020004" pitchFamily="2" charset="0"/>
-                <a:cs typeface="Helvetica Neue" panose="02000503000000020004" pitchFamily="2" charset="0"/>
-              </a:rPr>
-              <a:t>-only recordings (4 instances)</a:t>
-            </a:r>
-          </a:p>
-          <a:p>
-            <a:r>
-              <a:rPr lang="en-US" sz="1200" dirty="0">
-                <a:latin typeface="HelveticaNeueLT Std Cn" panose="020B0506030502030204" pitchFamily="34" charset="77"/>
-                <a:ea typeface="Helvetica Neue" panose="02000503000000020004" pitchFamily="2" charset="0"/>
-                <a:cs typeface="Helvetica Neue" panose="02000503000000020004" pitchFamily="2" charset="0"/>
-              </a:rPr>
-              <a:t> - dyn_only_1, dyn_only_2, dyn_only_3, dyn_only_4</a:t>
-            </a:r>
-          </a:p>
-          <a:p>
-            <a:endParaRPr lang="en-US" sz="1200" dirty="0">
-              <a:solidFill>
-                <a:srgbClr val="FF0000"/>
-              </a:solidFill>
-              <a:latin typeface="HelveticaNeueLT Std Cn" panose="020B0506030502030204" pitchFamily="34" charset="77"/>
-              <a:ea typeface="Helvetica Neue" panose="02000503000000020004" pitchFamily="2" charset="0"/>
-              <a:cs typeface="Helvetica Neue" panose="02000503000000020004" pitchFamily="2" charset="0"/>
-            </a:endParaRPr>
-          </a:p>
-          <a:p>
-            <a:r>
-              <a:rPr lang="en-US" sz="1200" dirty="0">
-                <a:latin typeface="HelveticaNeueLT Std Cn" panose="020B0506030502030204" pitchFamily="34" charset="77"/>
-                <a:ea typeface="Helvetica Neue" panose="02000503000000020004" pitchFamily="2" charset="0"/>
-                <a:cs typeface="Helvetica Neue" panose="02000503000000020004" pitchFamily="2" charset="0"/>
-              </a:rPr>
-              <a:t>Both recordings (4 instances)</a:t>
-            </a:r>
-          </a:p>
-          <a:p>
-            <a:r>
-              <a:rPr lang="en-US" sz="1200" dirty="0">
-                <a:latin typeface="HelveticaNeueLT Std Cn" panose="020B0506030502030204" pitchFamily="34" charset="77"/>
-                <a:ea typeface="Helvetica Neue" panose="02000503000000020004" pitchFamily="2" charset="0"/>
-                <a:cs typeface="Helvetica Neue" panose="02000503000000020004" pitchFamily="2" charset="0"/>
-              </a:rPr>
-              <a:t> - both_1, both_2, both_3, both_4</a:t>
-            </a:r>
-          </a:p>
-        </p:txBody>
-      </p:sp>
-      <p:sp>
-        <p:nvSpPr>
-          <p:cNvPr id="10" name="TextBox 9">
+              </a:endParaRPr>
+            </a:p>
+            <a:p>
+              <a:r>
+                <a:rPr lang="en-US" sz="1200" dirty="0">
+                  <a:latin typeface="HelveticaNeueLT Std Cn" panose="020B0506030502030204" pitchFamily="34" charset="77"/>
+                  <a:ea typeface="Helvetica Neue" panose="02000503000000020004" pitchFamily="2" charset="0"/>
+                  <a:cs typeface="Helvetica Neue" panose="02000503000000020004" pitchFamily="2" charset="0"/>
+                </a:rPr>
+                <a:t>Both recordings (4 instances)</a:t>
+              </a:r>
+            </a:p>
+            <a:p>
+              <a:r>
+                <a:rPr lang="en-US" sz="1200" dirty="0">
+                  <a:latin typeface="HelveticaNeueLT Std Cn" panose="020B0506030502030204" pitchFamily="34" charset="77"/>
+                  <a:ea typeface="Helvetica Neue" panose="02000503000000020004" pitchFamily="2" charset="0"/>
+                  <a:cs typeface="Helvetica Neue" panose="02000503000000020004" pitchFamily="2" charset="0"/>
+                </a:rPr>
+                <a:t> - both_1, both_2, both_3, both_4</a:t>
+              </a:r>
+            </a:p>
+          </p:txBody>
+        </p:sp>
+        <p:sp>
+          <p:nvSpPr>
+            <p:cNvPr id="10" name="TextBox 9">
+              <a:extLst>
+                <a:ext uri="{FF2B5EF4-FFF2-40B4-BE49-F238E27FC236}">
+                  <a16:creationId xmlns:a16="http://schemas.microsoft.com/office/drawing/2014/main" id="{AB339157-2AE4-C9FE-513D-379850AA659D}"/>
+                </a:ext>
+              </a:extLst>
+            </p:cNvPr>
+            <p:cNvSpPr txBox="1"/>
+            <p:nvPr/>
+          </p:nvSpPr>
+          <p:spPr>
+            <a:xfrm>
+              <a:off x="7529187" y="209535"/>
+              <a:ext cx="2168988" cy="523220"/>
+            </a:xfrm>
+            <a:prstGeom prst="rect">
+              <a:avLst/>
+            </a:prstGeom>
+            <a:noFill/>
+          </p:spPr>
+          <p:txBody>
+            <a:bodyPr wrap="square" rtlCol="0">
+              <a:spAutoFit/>
+            </a:bodyPr>
+            <a:lstStyle/>
+            <a:p>
+              <a:r>
+                <a:rPr lang="en-US" sz="1600" b="1" dirty="0">
+                  <a:latin typeface="Helvetica Neue Condensed" panose="02000503000000020004" pitchFamily="2" charset="0"/>
+                  <a:ea typeface="Helvetica Neue Condensed" panose="02000503000000020004" pitchFamily="2" charset="0"/>
+                  <a:cs typeface="Helvetica Neue Condensed" panose="02000503000000020004" pitchFamily="2" charset="0"/>
+                </a:rPr>
+                <a:t>(III) Selected recordings</a:t>
+              </a:r>
+            </a:p>
+            <a:p>
+              <a:r>
+                <a:rPr lang="en-US" sz="1200" dirty="0">
+                  <a:latin typeface="HelveticaNeueLT Std Cn" panose="020B0506030502030204" pitchFamily="34" charset="77"/>
+                  <a:ea typeface="HELVETICA NEUE CONDENSED" panose="02000503000000020004" pitchFamily="2" charset="0"/>
+                  <a:cs typeface="HELVETICA NEUE CONDENSED" panose="02000503000000020004" pitchFamily="2" charset="0"/>
+                </a:rPr>
+                <a:t>(Fig. S2 – Fig. S5 for details)</a:t>
+              </a:r>
+            </a:p>
+          </p:txBody>
+        </p:sp>
+      </p:grpSp>
+      <p:grpSp>
+        <p:nvGrpSpPr>
+          <p:cNvPr id="4" name="Group 3">
             <a:extLst>
               <a:ext uri="{FF2B5EF4-FFF2-40B4-BE49-F238E27FC236}">
-                <a16:creationId xmlns:a16="http://schemas.microsoft.com/office/drawing/2014/main" id="{AB339157-2AE4-C9FE-513D-379850AA659D}"/>
+                <a16:creationId xmlns:a16="http://schemas.microsoft.com/office/drawing/2014/main" id="{856C14B4-5D8C-28D4-E22B-4320E8B92DA6}"/>
               </a:ext>
             </a:extLst>
           </p:cNvPr>
-          <p:cNvSpPr txBox="1"/>
+          <p:cNvGrpSpPr/>
           <p:nvPr/>
-        </p:nvSpPr>
-        <p:spPr>
+        </p:nvGrpSpPr>
+        <p:grpSpPr>
           <a:xfrm>
-            <a:off x="7529187" y="209535"/>
-            <a:ext cx="2168988" cy="523220"/>
+            <a:off x="207825" y="1027805"/>
+            <a:ext cx="2236723" cy="1427626"/>
+            <a:chOff x="207825" y="1027805"/>
+            <a:chExt cx="2236723" cy="1427626"/>
           </a:xfrm>
-          <a:prstGeom prst="rect">
-            <a:avLst/>
-          </a:prstGeom>
-          <a:noFill/>
-        </p:spPr>
-        <p:txBody>
-          <a:bodyPr wrap="square" rtlCol="0">
-            <a:spAutoFit/>
-          </a:bodyPr>
-          <a:lstStyle/>
-          <a:p>
-            <a:r>
-              <a:rPr lang="en-US" sz="1600" b="1" dirty="0">
-                <a:latin typeface="Helvetica Neue Condensed" panose="02000503000000020004" pitchFamily="2" charset="0"/>
-                <a:ea typeface="Helvetica Neue Condensed" panose="02000503000000020004" pitchFamily="2" charset="0"/>
-                <a:cs typeface="Helvetica Neue Condensed" panose="02000503000000020004" pitchFamily="2" charset="0"/>
-              </a:rPr>
-              <a:t>(III) Selected recordings</a:t>
-            </a:r>
-          </a:p>
-          <a:p>
-            <a:r>
-              <a:rPr lang="en-US" sz="1200" dirty="0">
-                <a:latin typeface="HelveticaNeueLT Std Cn" panose="020B0506030502030204" pitchFamily="34" charset="77"/>
-                <a:ea typeface="HELVETICA NEUE CONDENSED" panose="02000503000000020004" pitchFamily="2" charset="0"/>
-                <a:cs typeface="HELVETICA NEUE CONDENSED" panose="02000503000000020004" pitchFamily="2" charset="0"/>
-              </a:rPr>
-              <a:t>(Fig. S2 – Fig. S5 for details)</a:t>
-            </a:r>
-          </a:p>
-        </p:txBody>
-      </p:sp>
+        </p:grpSpPr>
+        <p:pic>
+          <p:nvPicPr>
+            <p:cNvPr id="13" name="Picture 12" descr="A picture containing antenna&#10;&#10;Description automatically generated">
+              <a:extLst>
+                <a:ext uri="{FF2B5EF4-FFF2-40B4-BE49-F238E27FC236}">
+                  <a16:creationId xmlns:a16="http://schemas.microsoft.com/office/drawing/2014/main" id="{90FD4727-8997-8CF2-4D77-D47CA5572DAD}"/>
+                </a:ext>
+              </a:extLst>
+            </p:cNvPr>
+            <p:cNvPicPr>
+              <a:picLocks noChangeAspect="1"/>
+            </p:cNvPicPr>
+            <p:nvPr/>
+          </p:nvPicPr>
+          <p:blipFill>
+            <a:blip r:embed="rId3"/>
+            <a:stretch>
+              <a:fillRect/>
+            </a:stretch>
+          </p:blipFill>
+          <p:spPr>
+            <a:xfrm>
+              <a:off x="303594" y="1076362"/>
+              <a:ext cx="2002190" cy="712559"/>
+            </a:xfrm>
+            <a:prstGeom prst="rect">
+              <a:avLst/>
+            </a:prstGeom>
+          </p:spPr>
+        </p:pic>
+        <p:sp>
+          <p:nvSpPr>
+            <p:cNvPr id="21" name="TextBox 20">
+              <a:extLst>
+                <a:ext uri="{FF2B5EF4-FFF2-40B4-BE49-F238E27FC236}">
+                  <a16:creationId xmlns:a16="http://schemas.microsoft.com/office/drawing/2014/main" id="{86097BA7-1DBE-CF8A-722C-4928E5F8A25F}"/>
+                </a:ext>
+              </a:extLst>
+            </p:cNvPr>
+            <p:cNvSpPr txBox="1"/>
+            <p:nvPr/>
+          </p:nvSpPr>
+          <p:spPr>
+            <a:xfrm>
+              <a:off x="303594" y="1788921"/>
+              <a:ext cx="1997040" cy="643786"/>
+            </a:xfrm>
+            <a:prstGeom prst="rect">
+              <a:avLst/>
+            </a:prstGeom>
+            <a:noFill/>
+          </p:spPr>
+          <p:txBody>
+            <a:bodyPr wrap="square" rtlCol="0">
+              <a:spAutoFit/>
+            </a:bodyPr>
+            <a:lstStyle/>
+            <a:p>
+              <a:r>
+                <a:rPr lang="en-US" sz="1200" dirty="0">
+                  <a:latin typeface="HelveticaNeueLT Std Cn" panose="020B0506030502030204" pitchFamily="34" charset="77"/>
+                </a:rPr>
+                <a:t>Performances </a:t>
+              </a:r>
+            </a:p>
+            <a:p>
+              <a:r>
+                <a:rPr lang="en-US" sz="1200" dirty="0">
+                  <a:latin typeface="HelveticaNeueLT Std Cn" panose="020B0506030502030204" pitchFamily="34" charset="77"/>
+                </a:rPr>
+                <a:t>without expressive notations</a:t>
+              </a:r>
+            </a:p>
+            <a:p>
+              <a:r>
+                <a:rPr lang="en-US" sz="1200" b="1" dirty="0">
+                  <a:latin typeface="Helvetica Neue Condensed" panose="02000503000000020004" pitchFamily="2" charset="0"/>
+                  <a:ea typeface="Helvetica Neue Condensed" panose="02000503000000020004" pitchFamily="2" charset="0"/>
+                  <a:cs typeface="Helvetica Neue Condensed" panose="02000503000000020004" pitchFamily="2" charset="0"/>
+                </a:rPr>
+                <a:t>- baseline performances</a:t>
+              </a:r>
+            </a:p>
+          </p:txBody>
+        </p:sp>
+        <p:sp>
+          <p:nvSpPr>
+            <p:cNvPr id="2" name="Rectangle 1">
+              <a:extLst>
+                <a:ext uri="{FF2B5EF4-FFF2-40B4-BE49-F238E27FC236}">
+                  <a16:creationId xmlns:a16="http://schemas.microsoft.com/office/drawing/2014/main" id="{CC83EE2F-0F76-34B4-ED37-A67CA289FA0D}"/>
+                </a:ext>
+              </a:extLst>
+            </p:cNvPr>
+            <p:cNvSpPr/>
+            <p:nvPr/>
+          </p:nvSpPr>
+          <p:spPr>
+            <a:xfrm>
+              <a:off x="207825" y="1027805"/>
+              <a:ext cx="2236723" cy="1427626"/>
+            </a:xfrm>
+            <a:prstGeom prst="rect">
+              <a:avLst/>
+            </a:prstGeom>
+            <a:noFill/>
+            <a:ln>
+              <a:solidFill>
+                <a:schemeClr val="tx1"/>
+              </a:solidFill>
+            </a:ln>
+          </p:spPr>
+          <p:style>
+            <a:lnRef idx="2">
+              <a:schemeClr val="accent1">
+                <a:shade val="50000"/>
+              </a:schemeClr>
+            </a:lnRef>
+            <a:fillRef idx="1">
+              <a:schemeClr val="accent1"/>
+            </a:fillRef>
+            <a:effectRef idx="0">
+              <a:schemeClr val="accent1"/>
+            </a:effectRef>
+            <a:fontRef idx="minor">
+              <a:schemeClr val="lt1"/>
+            </a:fontRef>
+          </p:style>
+          <p:txBody>
+            <a:bodyPr rtlCol="0" anchor="ctr"/>
+            <a:lstStyle/>
+            <a:p>
+              <a:pPr algn="ctr"/>
+              <a:endParaRPr lang="en-US"/>
+            </a:p>
+          </p:txBody>
+        </p:sp>
+      </p:grpSp>
+      <p:grpSp>
+        <p:nvGrpSpPr>
+          <p:cNvPr id="12" name="Group 11">
+            <a:extLst>
+              <a:ext uri="{FF2B5EF4-FFF2-40B4-BE49-F238E27FC236}">
+                <a16:creationId xmlns:a16="http://schemas.microsoft.com/office/drawing/2014/main" id="{14C1EDE9-7C4F-8158-2235-EB24D37942F5}"/>
+              </a:ext>
+            </a:extLst>
+          </p:cNvPr>
+          <p:cNvGrpSpPr/>
+          <p:nvPr/>
+        </p:nvGrpSpPr>
+        <p:grpSpPr>
+          <a:xfrm>
+            <a:off x="207825" y="2855750"/>
+            <a:ext cx="2236723" cy="1427626"/>
+            <a:chOff x="207825" y="3747280"/>
+            <a:chExt cx="2236723" cy="1427626"/>
+          </a:xfrm>
+        </p:grpSpPr>
+        <p:pic>
+          <p:nvPicPr>
+            <p:cNvPr id="23" name="Picture 22" descr="A picture containing antenna&#10;&#10;Description automatically generated">
+              <a:extLst>
+                <a:ext uri="{FF2B5EF4-FFF2-40B4-BE49-F238E27FC236}">
+                  <a16:creationId xmlns:a16="http://schemas.microsoft.com/office/drawing/2014/main" id="{803B9327-81B3-46DF-1239-C2CD62D86962}"/>
+                </a:ext>
+              </a:extLst>
+            </p:cNvPr>
+            <p:cNvPicPr>
+              <a:picLocks noChangeAspect="1"/>
+            </p:cNvPicPr>
+            <p:nvPr/>
+          </p:nvPicPr>
+          <p:blipFill>
+            <a:blip r:embed="rId4"/>
+            <a:stretch>
+              <a:fillRect/>
+            </a:stretch>
+          </p:blipFill>
+          <p:spPr>
+            <a:xfrm>
+              <a:off x="301906" y="3793267"/>
+              <a:ext cx="1998728" cy="712559"/>
+            </a:xfrm>
+            <a:prstGeom prst="rect">
+              <a:avLst/>
+            </a:prstGeom>
+          </p:spPr>
+        </p:pic>
+        <p:sp>
+          <p:nvSpPr>
+            <p:cNvPr id="26" name="TextBox 25">
+              <a:extLst>
+                <a:ext uri="{FF2B5EF4-FFF2-40B4-BE49-F238E27FC236}">
+                  <a16:creationId xmlns:a16="http://schemas.microsoft.com/office/drawing/2014/main" id="{BF68C1FE-A95F-E94D-E45B-7D79B729051D}"/>
+                </a:ext>
+              </a:extLst>
+            </p:cNvPr>
+            <p:cNvSpPr txBox="1"/>
+            <p:nvPr/>
+          </p:nvSpPr>
+          <p:spPr>
+            <a:xfrm>
+              <a:off x="301906" y="4528575"/>
+              <a:ext cx="1998728" cy="646331"/>
+            </a:xfrm>
+            <a:prstGeom prst="rect">
+              <a:avLst/>
+            </a:prstGeom>
+            <a:noFill/>
+          </p:spPr>
+          <p:txBody>
+            <a:bodyPr wrap="square" rtlCol="0">
+              <a:spAutoFit/>
+            </a:bodyPr>
+            <a:lstStyle/>
+            <a:p>
+              <a:r>
+                <a:rPr lang="en-US" sz="1200" dirty="0">
+                  <a:latin typeface="HelveticaNeueLT Std Cn" panose="020B0506030502030204" pitchFamily="34" charset="77"/>
+                </a:rPr>
+                <a:t>Performances </a:t>
+              </a:r>
+            </a:p>
+            <a:p>
+              <a:r>
+                <a:rPr lang="en-US" sz="1200" dirty="0">
+                  <a:latin typeface="HelveticaNeueLT Std Cn" panose="020B0506030502030204" pitchFamily="34" charset="77"/>
+                </a:rPr>
+                <a:t>with notated articulation</a:t>
+              </a:r>
+            </a:p>
+            <a:p>
+              <a:r>
+                <a:rPr lang="en-US" sz="1200" b="1" dirty="0">
+                  <a:latin typeface="Helvetica Neue Condensed" panose="02000503000000020004" pitchFamily="2" charset="0"/>
+                  <a:ea typeface="Helvetica Neue Condensed" panose="02000503000000020004" pitchFamily="2" charset="0"/>
+                  <a:cs typeface="Helvetica Neue Condensed" panose="02000503000000020004" pitchFamily="2" charset="0"/>
+                </a:rPr>
+                <a:t>- articulation performances</a:t>
+              </a:r>
+            </a:p>
+          </p:txBody>
+        </p:sp>
+        <p:sp>
+          <p:nvSpPr>
+            <p:cNvPr id="11" name="Rectangle 10">
+              <a:extLst>
+                <a:ext uri="{FF2B5EF4-FFF2-40B4-BE49-F238E27FC236}">
+                  <a16:creationId xmlns:a16="http://schemas.microsoft.com/office/drawing/2014/main" id="{04C4C42A-A2A4-EB90-7E47-92CD4E01D434}"/>
+                </a:ext>
+              </a:extLst>
+            </p:cNvPr>
+            <p:cNvSpPr/>
+            <p:nvPr/>
+          </p:nvSpPr>
+          <p:spPr>
+            <a:xfrm>
+              <a:off x="207825" y="3747280"/>
+              <a:ext cx="2236723" cy="1427626"/>
+            </a:xfrm>
+            <a:prstGeom prst="rect">
+              <a:avLst/>
+            </a:prstGeom>
+            <a:noFill/>
+            <a:ln>
+              <a:solidFill>
+                <a:schemeClr val="tx1"/>
+              </a:solidFill>
+            </a:ln>
+          </p:spPr>
+          <p:style>
+            <a:lnRef idx="2">
+              <a:schemeClr val="accent1">
+                <a:shade val="50000"/>
+              </a:schemeClr>
+            </a:lnRef>
+            <a:fillRef idx="1">
+              <a:schemeClr val="accent1"/>
+            </a:fillRef>
+            <a:effectRef idx="0">
+              <a:schemeClr val="accent1"/>
+            </a:effectRef>
+            <a:fontRef idx="minor">
+              <a:schemeClr val="lt1"/>
+            </a:fontRef>
+          </p:style>
+          <p:txBody>
+            <a:bodyPr rtlCol="0" anchor="ctr"/>
+            <a:lstStyle/>
+            <a:p>
+              <a:pPr algn="ctr"/>
+              <a:endParaRPr lang="en-US"/>
+            </a:p>
+          </p:txBody>
+        </p:sp>
+      </p:grpSp>
+      <p:grpSp>
+        <p:nvGrpSpPr>
+          <p:cNvPr id="35" name="Group 34">
+            <a:extLst>
+              <a:ext uri="{FF2B5EF4-FFF2-40B4-BE49-F238E27FC236}">
+                <a16:creationId xmlns:a16="http://schemas.microsoft.com/office/drawing/2014/main" id="{F66FFC73-408A-D779-90FE-0418B57FC2C0}"/>
+              </a:ext>
+            </a:extLst>
+          </p:cNvPr>
+          <p:cNvGrpSpPr/>
+          <p:nvPr/>
+        </p:nvGrpSpPr>
+        <p:grpSpPr>
+          <a:xfrm>
+            <a:off x="207825" y="4683696"/>
+            <a:ext cx="2236723" cy="1427626"/>
+            <a:chOff x="207825" y="4683696"/>
+            <a:chExt cx="2236723" cy="1427626"/>
+          </a:xfrm>
+        </p:grpSpPr>
+        <p:pic>
+          <p:nvPicPr>
+            <p:cNvPr id="25" name="Picture 24" descr="A picture containing object, antenna&#10;&#10;Description automatically generated">
+              <a:extLst>
+                <a:ext uri="{FF2B5EF4-FFF2-40B4-BE49-F238E27FC236}">
+                  <a16:creationId xmlns:a16="http://schemas.microsoft.com/office/drawing/2014/main" id="{10CAFC32-F9C7-7229-7036-16DB6685029A}"/>
+                </a:ext>
+              </a:extLst>
+            </p:cNvPr>
+            <p:cNvPicPr>
+              <a:picLocks noChangeAspect="1"/>
+            </p:cNvPicPr>
+            <p:nvPr/>
+          </p:nvPicPr>
+          <p:blipFill>
+            <a:blip r:embed="rId5"/>
+            <a:stretch>
+              <a:fillRect/>
+            </a:stretch>
+          </p:blipFill>
+          <p:spPr>
+            <a:xfrm>
+              <a:off x="308155" y="4727182"/>
+              <a:ext cx="2002187" cy="712559"/>
+            </a:xfrm>
+            <a:prstGeom prst="rect">
+              <a:avLst/>
+            </a:prstGeom>
+          </p:spPr>
+        </p:pic>
+        <p:sp>
+          <p:nvSpPr>
+            <p:cNvPr id="27" name="TextBox 26">
+              <a:extLst>
+                <a:ext uri="{FF2B5EF4-FFF2-40B4-BE49-F238E27FC236}">
+                  <a16:creationId xmlns:a16="http://schemas.microsoft.com/office/drawing/2014/main" id="{D97E2954-4C04-CAD3-CD25-02FA6BFE5AA9}"/>
+                </a:ext>
+              </a:extLst>
+            </p:cNvPr>
+            <p:cNvSpPr txBox="1"/>
+            <p:nvPr/>
+          </p:nvSpPr>
+          <p:spPr>
+            <a:xfrm>
+              <a:off x="304696" y="5454438"/>
+              <a:ext cx="2002187" cy="646331"/>
+            </a:xfrm>
+            <a:prstGeom prst="rect">
+              <a:avLst/>
+            </a:prstGeom>
+            <a:noFill/>
+          </p:spPr>
+          <p:txBody>
+            <a:bodyPr wrap="square" rtlCol="0">
+              <a:spAutoFit/>
+            </a:bodyPr>
+            <a:lstStyle/>
+            <a:p>
+              <a:r>
+                <a:rPr lang="en-US" sz="1200" dirty="0">
+                  <a:latin typeface="HelveticaNeueLT Std Cn" panose="020B0506030502030204" pitchFamily="34" charset="77"/>
+                </a:rPr>
+                <a:t>Performances </a:t>
+              </a:r>
+            </a:p>
+            <a:p>
+              <a:r>
+                <a:rPr lang="en-US" sz="1200" dirty="0">
+                  <a:latin typeface="HelveticaNeueLT Std Cn" panose="020B0506030502030204" pitchFamily="34" charset="77"/>
+                </a:rPr>
+                <a:t>with notated dynamics</a:t>
+              </a:r>
+            </a:p>
+            <a:p>
+              <a:r>
+                <a:rPr lang="en-US" sz="1200" b="1" dirty="0">
+                  <a:latin typeface="Helvetica Neue Condensed" panose="02000503000000020004" pitchFamily="2" charset="0"/>
+                  <a:ea typeface="Helvetica Neue Condensed" panose="02000503000000020004" pitchFamily="2" charset="0"/>
+                  <a:cs typeface="Helvetica Neue Condensed" panose="02000503000000020004" pitchFamily="2" charset="0"/>
+                </a:rPr>
+                <a:t>- dynamics performances</a:t>
+              </a:r>
+            </a:p>
+          </p:txBody>
+        </p:sp>
+        <p:sp>
+          <p:nvSpPr>
+            <p:cNvPr id="31" name="Rectangle 30">
+              <a:extLst>
+                <a:ext uri="{FF2B5EF4-FFF2-40B4-BE49-F238E27FC236}">
+                  <a16:creationId xmlns:a16="http://schemas.microsoft.com/office/drawing/2014/main" id="{492893D3-323A-8DAD-1EBC-EDB3A000ED75}"/>
+                </a:ext>
+              </a:extLst>
+            </p:cNvPr>
+            <p:cNvSpPr/>
+            <p:nvPr/>
+          </p:nvSpPr>
+          <p:spPr>
+            <a:xfrm>
+              <a:off x="207825" y="4683696"/>
+              <a:ext cx="2236723" cy="1427626"/>
+            </a:xfrm>
+            <a:prstGeom prst="rect">
+              <a:avLst/>
+            </a:prstGeom>
+            <a:noFill/>
+            <a:ln>
+              <a:solidFill>
+                <a:schemeClr val="tx1"/>
+              </a:solidFill>
+            </a:ln>
+          </p:spPr>
+          <p:style>
+            <a:lnRef idx="2">
+              <a:schemeClr val="accent1">
+                <a:shade val="50000"/>
+              </a:schemeClr>
+            </a:lnRef>
+            <a:fillRef idx="1">
+              <a:schemeClr val="accent1"/>
+            </a:fillRef>
+            <a:effectRef idx="0">
+              <a:schemeClr val="accent1"/>
+            </a:effectRef>
+            <a:fontRef idx="minor">
+              <a:schemeClr val="lt1"/>
+            </a:fontRef>
+          </p:style>
+          <p:txBody>
+            <a:bodyPr rtlCol="0" anchor="ctr"/>
+            <a:lstStyle/>
+            <a:p>
+              <a:pPr algn="ctr"/>
+              <a:endParaRPr lang="en-US"/>
+            </a:p>
+          </p:txBody>
+        </p:sp>
+      </p:grpSp>
     </p:spTree>
     <p:extLst>
       <p:ext uri="{BB962C8B-B14F-4D97-AF65-F5344CB8AC3E}">

</xml_diff>